<commit_message>
poster and article modifications
</commit_message>
<xml_diff>
--- a/Verslagen/poster_BP_INF_Gielkens.pptx
+++ b/Verslagen/poster_BP_INF_Gielkens.pptx
@@ -230,7 +230,7 @@
           <a:p>
             <a:fld id="{A5A46936-730D-204E-AB52-3BEB64B90A85}" type="datetimeFigureOut">
               <a:rPr lang="nl-NL" smtClean="0"/>
-              <a:t>27-8-2024</a:t>
+              <a:t>11-5-2025</a:t>
             </a:fld>
             <a:endParaRPr lang="nl-NL"/>
           </a:p>
@@ -395,7 +395,7 @@
           <a:p>
             <a:fld id="{97349249-6D1C-0748-B1D9-2AF3A057365D}" type="datetimeFigureOut">
               <a:rPr lang="nl-NL" smtClean="0"/>
-              <a:t>27-8-2024</a:t>
+              <a:t>11-5-2025</a:t>
             </a:fld>
             <a:endParaRPr lang="nl-NL"/>
           </a:p>
@@ -1585,7 +1585,7 @@
           <a:p>
             <a:fld id="{A72B7129-FE34-674B-A2EC-97FC337DE4A7}" type="datetimeFigureOut">
               <a:rPr lang="nl-NL" smtClean="0"/>
-              <a:t>27-8-2024</a:t>
+              <a:t>11-5-2025</a:t>
             </a:fld>
             <a:endParaRPr lang="nl-NL"/>
           </a:p>
@@ -1983,8 +1983,8 @@
         </p:nvCxnSpPr>
         <p:spPr>
           <a:xfrm>
-            <a:off x="10514283" y="21550537"/>
-            <a:ext cx="0" cy="183302"/>
+            <a:off x="10514283" y="21863813"/>
+            <a:ext cx="0" cy="120285"/>
           </a:xfrm>
           <a:prstGeom prst="line">
             <a:avLst/>
@@ -2027,8 +2027,8 @@
         </p:nvCxnSpPr>
         <p:spPr>
           <a:xfrm>
-            <a:off x="10526007" y="24350932"/>
-            <a:ext cx="0" cy="147203"/>
+            <a:off x="10526007" y="24743612"/>
+            <a:ext cx="0" cy="129910"/>
           </a:xfrm>
           <a:prstGeom prst="line">
             <a:avLst/>
@@ -2069,7 +2069,7 @@
         <p:spPr>
           <a:xfrm>
             <a:off x="165120" y="9844150"/>
-            <a:ext cx="20961170" cy="11706387"/>
+            <a:ext cx="20961170" cy="12019663"/>
           </a:xfrm>
           <a:prstGeom prst="roundRect">
             <a:avLst/>
@@ -2139,8 +2139,8 @@
         </p:nvCxnSpPr>
         <p:spPr>
           <a:xfrm>
-            <a:off x="10611773" y="8998862"/>
-            <a:ext cx="0" cy="484919"/>
+            <a:off x="10611773" y="9383958"/>
+            <a:ext cx="0" cy="234577"/>
           </a:xfrm>
           <a:prstGeom prst="line">
             <a:avLst/>
@@ -2181,7 +2181,7 @@
         <p:spPr>
           <a:xfrm>
             <a:off x="266781" y="6268900"/>
-            <a:ext cx="20859509" cy="2729962"/>
+            <a:ext cx="20859509" cy="3115058"/>
           </a:xfrm>
           <a:prstGeom prst="roundRect">
             <a:avLst/>
@@ -2262,86 +2262,16 @@
               </a:spcAft>
             </a:pPr>
             <a:r>
-              <a:rPr lang="en-GB" sz="1800" b="1" kern="100" dirty="0">
-                <a:solidFill>
-                  <a:srgbClr val="FF0000"/>
-                </a:solidFill>
-                <a:effectLst/>
-                <a:latin typeface="Aptos" panose="020B0004020202020204" pitchFamily="34" charset="0"/>
-                <a:ea typeface="Aptos" panose="020B0004020202020204" pitchFamily="34" charset="0"/>
-                <a:cs typeface="Times New Roman" panose="02020603050405020304" pitchFamily="18" charset="0"/>
-              </a:rPr>
-              <a:t>Building Information </a:t>
-            </a:r>
-            <a:r>
-              <a:rPr lang="en-GB" sz="1800" b="1" kern="100" dirty="0" err="1">
-                <a:solidFill>
-                  <a:srgbClr val="FF0000"/>
-                </a:solidFill>
-                <a:effectLst/>
-                <a:latin typeface="Aptos" panose="020B0004020202020204" pitchFamily="34" charset="0"/>
-                <a:ea typeface="Aptos" panose="020B0004020202020204" pitchFamily="34" charset="0"/>
-                <a:cs typeface="Times New Roman" panose="02020603050405020304" pitchFamily="18" charset="0"/>
-              </a:rPr>
-              <a:t>Modeling</a:t>
-            </a:r>
-            <a:r>
-              <a:rPr lang="en-GB" sz="1800" b="1" kern="100" dirty="0">
-                <a:solidFill>
-                  <a:srgbClr val="FF0000"/>
-                </a:solidFill>
-                <a:effectLst/>
-                <a:latin typeface="Aptos" panose="020B0004020202020204" pitchFamily="34" charset="0"/>
-                <a:ea typeface="Aptos" panose="020B0004020202020204" pitchFamily="34" charset="0"/>
-                <a:cs typeface="Times New Roman" panose="02020603050405020304" pitchFamily="18" charset="0"/>
-              </a:rPr>
-              <a:t> (BIM) </a:t>
-            </a:r>
-            <a:r>
-              <a:rPr lang="en-GB" sz="1800" kern="100" dirty="0">
-                <a:solidFill>
-                  <a:sysClr val="windowText" lastClr="000000"/>
-                </a:solidFill>
-                <a:effectLst/>
-                <a:latin typeface="Aptos" panose="020B0004020202020204" pitchFamily="34" charset="0"/>
-                <a:ea typeface="Aptos" panose="020B0004020202020204" pitchFamily="34" charset="0"/>
-                <a:cs typeface="Times New Roman" panose="02020603050405020304" pitchFamily="18" charset="0"/>
-              </a:rPr>
-              <a:t>is one of the central technologies in architecture, engineering, and construction, enabling detailed digital modelling of buildings [1]. As the BIM models change through multiple design stages, it gets difficult to manage or keep track of those changes. </a:t>
-            </a:r>
-            <a:r>
-              <a:rPr lang="en-GB" sz="1800" b="1" kern="100" dirty="0">
-                <a:solidFill>
-                  <a:srgbClr val="FF0000"/>
-                </a:solidFill>
-                <a:effectLst/>
-                <a:latin typeface="Aptos" panose="020B0004020202020204" pitchFamily="34" charset="0"/>
-                <a:ea typeface="Aptos" panose="020B0004020202020204" pitchFamily="34" charset="0"/>
-                <a:cs typeface="Times New Roman" panose="02020603050405020304" pitchFamily="18" charset="0"/>
-              </a:rPr>
-              <a:t>Version traceability</a:t>
-            </a:r>
-            <a:r>
-              <a:rPr lang="en-GB" sz="1800" kern="100" dirty="0">
-                <a:solidFill>
-                  <a:sysClr val="windowText" lastClr="000000"/>
-                </a:solidFill>
-                <a:effectLst/>
-                <a:latin typeface="Aptos" panose="020B0004020202020204" pitchFamily="34" charset="0"/>
-                <a:ea typeface="Aptos" panose="020B0004020202020204" pitchFamily="34" charset="0"/>
-                <a:cs typeface="Times New Roman" panose="02020603050405020304" pitchFamily="18" charset="0"/>
-              </a:rPr>
-              <a:t>, the exact history of modifications, is critical to maintaining the integrity of a project and avoiding huge mistakes.</a:t>
-            </a:r>
-            <a:endParaRPr lang="nl-BE" sz="1800" kern="100" dirty="0">
-              <a:solidFill>
-                <a:sysClr val="windowText" lastClr="000000"/>
-              </a:solidFill>
-              <a:effectLst/>
-              <a:latin typeface="Aptos" panose="020B0004020202020204" pitchFamily="34" charset="0"/>
-              <a:ea typeface="Aptos" panose="020B0004020202020204" pitchFamily="34" charset="0"/>
-              <a:cs typeface="Times New Roman" panose="02020603050405020304" pitchFamily="18" charset="0"/>
-            </a:endParaRPr>
+              <a:rPr lang="en-US" sz="1800" kern="100" dirty="0">
+                <a:solidFill>
+                  <a:schemeClr val="tx1"/>
+                </a:solidFill>
+                <a:latin typeface="Aptos" panose="020B0004020202020204" pitchFamily="34" charset="0"/>
+                <a:ea typeface="Aptos" panose="020B0004020202020204" pitchFamily="34" charset="0"/>
+                <a:cs typeface="Times New Roman" panose="02020603050405020304" pitchFamily="18" charset="0"/>
+              </a:rPr>
+              <a:t>In today’s workplace, stress is one of the leading causes of discomfort and reduced productivity. This bachelor thesis presents a compact and portable system designed to monitor stress-related physiological parameters in real time, with the aim of improving workplace well-being.</a:t>
+            </a:r>
           </a:p>
           <a:p>
             <a:pPr>
@@ -2353,32 +2283,97 @@
               </a:spcAft>
             </a:pPr>
             <a:r>
-              <a:rPr lang="en-GB" sz="1800" kern="100" dirty="0">
-                <a:solidFill>
-                  <a:sysClr val="windowText" lastClr="000000"/>
-                </a:solidFill>
-                <a:latin typeface="Aptos" panose="020B0004020202020204" pitchFamily="34" charset="0"/>
-                <a:ea typeface="Aptos" panose="020B0004020202020204" pitchFamily="34" charset="0"/>
-                <a:cs typeface="Times New Roman" panose="02020603050405020304" pitchFamily="18" charset="0"/>
-              </a:rPr>
-              <a:t>T</a:t>
-            </a:r>
-            <a:r>
-              <a:rPr lang="en-GB" sz="1800" kern="100" dirty="0">
-                <a:solidFill>
-                  <a:sysClr val="windowText" lastClr="000000"/>
-                </a:solidFill>
-                <a:effectLst/>
-                <a:latin typeface="Aptos" panose="020B0004020202020204" pitchFamily="34" charset="0"/>
-                <a:ea typeface="Aptos" panose="020B0004020202020204" pitchFamily="34" charset="0"/>
-                <a:cs typeface="Times New Roman" panose="02020603050405020304" pitchFamily="18" charset="0"/>
-              </a:rPr>
-              <a:t>his project</a:t>
-            </a:r>
-            <a:r>
-              <a:rPr lang="en-GB" sz="1800" kern="100" dirty="0">
-                <a:solidFill>
-                  <a:sysClr val="windowText" lastClr="000000"/>
+              <a:rPr lang="en-US" sz="1800" kern="100" dirty="0">
+                <a:solidFill>
+                  <a:schemeClr val="tx1"/>
+                </a:solidFill>
+                <a:latin typeface="Aptos" panose="020B0004020202020204" pitchFamily="34" charset="0"/>
+                <a:ea typeface="Aptos" panose="020B0004020202020204" pitchFamily="34" charset="0"/>
+                <a:cs typeface="Times New Roman" panose="02020603050405020304" pitchFamily="18" charset="0"/>
+              </a:rPr>
+              <a:t>At the core of the system is the </a:t>
+            </a:r>
+            <a:r>
+              <a:rPr lang="en-US" sz="1800" b="1" kern="100" dirty="0">
+                <a:solidFill>
+                  <a:srgbClr val="FF0000"/>
+                </a:solidFill>
+                <a:latin typeface="Aptos" panose="020B0004020202020204" pitchFamily="34" charset="0"/>
+                <a:ea typeface="Aptos" panose="020B0004020202020204" pitchFamily="34" charset="0"/>
+                <a:cs typeface="Times New Roman" panose="02020603050405020304" pitchFamily="18" charset="0"/>
+              </a:rPr>
+              <a:t>Arduino Nano ESP32</a:t>
+            </a:r>
+            <a:r>
+              <a:rPr lang="en-US" sz="1800" kern="100" dirty="0">
+                <a:solidFill>
+                  <a:schemeClr val="tx1"/>
+                </a:solidFill>
+                <a:latin typeface="Aptos" panose="020B0004020202020204" pitchFamily="34" charset="0"/>
+                <a:ea typeface="Aptos" panose="020B0004020202020204" pitchFamily="34" charset="0"/>
+                <a:cs typeface="Times New Roman" panose="02020603050405020304" pitchFamily="18" charset="0"/>
+              </a:rPr>
+              <a:t>, connected to a </a:t>
+            </a:r>
+            <a:r>
+              <a:rPr lang="en-US" sz="1800" b="1" kern="100" dirty="0">
+                <a:solidFill>
+                  <a:srgbClr val="FF0000"/>
+                </a:solidFill>
+                <a:latin typeface="Aptos" panose="020B0004020202020204" pitchFamily="34" charset="0"/>
+                <a:ea typeface="Aptos" panose="020B0004020202020204" pitchFamily="34" charset="0"/>
+                <a:cs typeface="Times New Roman" panose="02020603050405020304" pitchFamily="18" charset="0"/>
+              </a:rPr>
+              <a:t>MAX30102</a:t>
+            </a:r>
+            <a:r>
+              <a:rPr lang="en-US" sz="1800" kern="100" dirty="0">
+                <a:solidFill>
+                  <a:schemeClr val="tx1"/>
+                </a:solidFill>
+                <a:latin typeface="Aptos" panose="020B0004020202020204" pitchFamily="34" charset="0"/>
+                <a:ea typeface="Aptos" panose="020B0004020202020204" pitchFamily="34" charset="0"/>
+                <a:cs typeface="Times New Roman" panose="02020603050405020304" pitchFamily="18" charset="0"/>
+              </a:rPr>
+              <a:t>, a </a:t>
+            </a:r>
+            <a:r>
+              <a:rPr lang="en-US" sz="1800" b="1" kern="100" dirty="0">
+                <a:solidFill>
+                  <a:srgbClr val="FF0000"/>
+                </a:solidFill>
+                <a:latin typeface="Aptos" panose="020B0004020202020204" pitchFamily="34" charset="0"/>
+                <a:ea typeface="Aptos" panose="020B0004020202020204" pitchFamily="34" charset="0"/>
+                <a:cs typeface="Times New Roman" panose="02020603050405020304" pitchFamily="18" charset="0"/>
+              </a:rPr>
+              <a:t>Grove GSR </a:t>
+            </a:r>
+            <a:r>
+              <a:rPr lang="en-US" sz="1800" kern="100" dirty="0">
+                <a:solidFill>
+                  <a:schemeClr val="tx1"/>
+                </a:solidFill>
+                <a:latin typeface="Aptos" panose="020B0004020202020204" pitchFamily="34" charset="0"/>
+                <a:ea typeface="Aptos" panose="020B0004020202020204" pitchFamily="34" charset="0"/>
+                <a:cs typeface="Times New Roman" panose="02020603050405020304" pitchFamily="18" charset="0"/>
+              </a:rPr>
+              <a:t>and a </a:t>
+            </a:r>
+            <a:r>
+              <a:rPr lang="fr-FR" sz="1800" b="1" kern="100" dirty="0" err="1">
+                <a:solidFill>
+                  <a:srgbClr val="FF0000"/>
+                </a:solidFill>
+                <a:latin typeface="Aptos" panose="020B0004020202020204" pitchFamily="34" charset="0"/>
+                <a:ea typeface="Aptos" panose="020B0004020202020204" pitchFamily="34" charset="0"/>
+                <a:cs typeface="Times New Roman" panose="02020603050405020304" pitchFamily="18" charset="0"/>
+              </a:rPr>
+              <a:t>Plux</a:t>
+            </a:r>
+            <a:r>
+              <a:rPr lang="fr-FR" sz="1800" b="1" kern="100" dirty="0">
+                <a:solidFill>
+                  <a:srgbClr val="FF0000"/>
                 </a:solidFill>
                 <a:latin typeface="Aptos" panose="020B0004020202020204" pitchFamily="34" charset="0"/>
                 <a:ea typeface="Aptos" panose="020B0004020202020204" pitchFamily="34" charset="0"/>
@@ -2387,31 +2382,18 @@
               <a:t> </a:t>
             </a:r>
             <a:r>
-              <a:rPr lang="en-GB" sz="1800" kern="100" dirty="0">
-                <a:solidFill>
-                  <a:sysClr val="windowText" lastClr="000000"/>
-                </a:solidFill>
-                <a:effectLst/>
-                <a:latin typeface="Aptos" panose="020B0004020202020204" pitchFamily="34" charset="0"/>
-                <a:ea typeface="Aptos" panose="020B0004020202020204" pitchFamily="34" charset="0"/>
-                <a:cs typeface="Times New Roman" panose="02020603050405020304" pitchFamily="18" charset="0"/>
-              </a:rPr>
-              <a:t>looks at how </a:t>
-            </a:r>
-            <a:r>
-              <a:rPr lang="en-GB" sz="1800" b="1" kern="100" dirty="0">
+              <a:rPr lang="fr-FR" sz="1800" b="1" kern="100" dirty="0" err="1">
                 <a:solidFill>
                   <a:srgbClr val="FF0000"/>
                 </a:solidFill>
-                <a:effectLst/>
-                <a:latin typeface="Aptos" panose="020B0004020202020204" pitchFamily="34" charset="0"/>
-                <a:ea typeface="Aptos" panose="020B0004020202020204" pitchFamily="34" charset="0"/>
-                <a:cs typeface="Times New Roman" panose="02020603050405020304" pitchFamily="18" charset="0"/>
-              </a:rPr>
-              <a:t>Augmented </a:t>
-            </a:r>
-            <a:r>
-              <a:rPr lang="en-GB" sz="1800" b="1" kern="100" dirty="0">
+                <a:latin typeface="Aptos" panose="020B0004020202020204" pitchFamily="34" charset="0"/>
+                <a:ea typeface="Aptos" panose="020B0004020202020204" pitchFamily="34" charset="0"/>
+                <a:cs typeface="Times New Roman" panose="02020603050405020304" pitchFamily="18" charset="0"/>
+              </a:rPr>
+              <a:t>Piezo-Electric</a:t>
+            </a:r>
+            <a:r>
+              <a:rPr lang="fr-FR" sz="1800" b="1" kern="100" dirty="0">
                 <a:solidFill>
                   <a:srgbClr val="FF0000"/>
                 </a:solidFill>
@@ -2419,55 +2401,40 @@
                 <a:ea typeface="Aptos" panose="020B0004020202020204" pitchFamily="34" charset="0"/>
                 <a:cs typeface="Times New Roman" panose="02020603050405020304" pitchFamily="18" charset="0"/>
               </a:rPr>
-              <a:t>R</a:t>
-            </a:r>
-            <a:r>
-              <a:rPr lang="en-GB" sz="1800" b="1" kern="100" dirty="0">
+              <a:t> Respiration (PZT) </a:t>
+            </a:r>
+            <a:r>
+              <a:rPr lang="fr-FR" sz="1800" b="1" kern="100" dirty="0" err="1">
                 <a:solidFill>
                   <a:srgbClr val="FF0000"/>
                 </a:solidFill>
-                <a:effectLst/>
-                <a:latin typeface="Aptos" panose="020B0004020202020204" pitchFamily="34" charset="0"/>
-                <a:ea typeface="Aptos" panose="020B0004020202020204" pitchFamily="34" charset="0"/>
-                <a:cs typeface="Times New Roman" panose="02020603050405020304" pitchFamily="18" charset="0"/>
-              </a:rPr>
-              <a:t>eality (AR)</a:t>
-            </a:r>
-            <a:r>
-              <a:rPr lang="en-GB" sz="1800" b="1" kern="100" dirty="0">
-                <a:solidFill>
-                  <a:sysClr val="windowText" lastClr="000000"/>
-                </a:solidFill>
-                <a:effectLst/>
-                <a:latin typeface="Aptos" panose="020B0004020202020204" pitchFamily="34" charset="0"/>
-                <a:ea typeface="Aptos" panose="020B0004020202020204" pitchFamily="34" charset="0"/>
-                <a:cs typeface="Times New Roman" panose="02020603050405020304" pitchFamily="18" charset="0"/>
-              </a:rPr>
-              <a:t> </a:t>
-            </a:r>
-            <a:r>
-              <a:rPr lang="en-GB" sz="1800" kern="100" dirty="0">
-                <a:solidFill>
-                  <a:sysClr val="windowText" lastClr="000000"/>
-                </a:solidFill>
-                <a:effectLst/>
-                <a:latin typeface="Aptos" panose="020B0004020202020204" pitchFamily="34" charset="0"/>
-                <a:ea typeface="Aptos" panose="020B0004020202020204" pitchFamily="34" charset="0"/>
-                <a:cs typeface="Times New Roman" panose="02020603050405020304" pitchFamily="18" charset="0"/>
-              </a:rPr>
-              <a:t>can be used to enhance version traceability in BIM. The BIM models are integrated into Unity using </a:t>
-            </a:r>
-            <a:r>
-              <a:rPr lang="en-GB" sz="1800" b="1" kern="100" dirty="0">
+                <a:latin typeface="Aptos" panose="020B0004020202020204" pitchFamily="34" charset="0"/>
+                <a:ea typeface="Aptos" panose="020B0004020202020204" pitchFamily="34" charset="0"/>
+                <a:cs typeface="Times New Roman" panose="02020603050405020304" pitchFamily="18" charset="0"/>
+              </a:rPr>
+              <a:t>sensor</a:t>
+            </a:r>
+            <a:r>
+              <a:rPr lang="en-US" sz="1800" kern="100" dirty="0">
+                <a:solidFill>
+                  <a:schemeClr val="tx1"/>
+                </a:solidFill>
+                <a:latin typeface="Aptos" panose="020B0004020202020204" pitchFamily="34" charset="0"/>
+                <a:ea typeface="Aptos" panose="020B0004020202020204" pitchFamily="34" charset="0"/>
+                <a:cs typeface="Times New Roman" panose="02020603050405020304" pitchFamily="18" charset="0"/>
+              </a:rPr>
+              <a:t>. These sensors capture biometric data known to correlate with stress levels. The device transmits this data wirelessly via Bluetooth to a custom-built </a:t>
+            </a:r>
+            <a:r>
+              <a:rPr lang="en-US" sz="1800" b="1" kern="100" dirty="0">
                 <a:solidFill>
                   <a:srgbClr val="FF0000"/>
                 </a:solidFill>
-                <a:effectLst/>
-                <a:latin typeface="Aptos" panose="020B0004020202020204" pitchFamily="34" charset="0"/>
-                <a:ea typeface="Aptos" panose="020B0004020202020204" pitchFamily="34" charset="0"/>
-                <a:cs typeface="Times New Roman" panose="02020603050405020304" pitchFamily="18" charset="0"/>
-              </a:rPr>
-              <a:t>Industry Foundation Classes (IFC). </a:t>
+                <a:latin typeface="Aptos" panose="020B0004020202020204" pitchFamily="34" charset="0"/>
+                <a:ea typeface="Aptos" panose="020B0004020202020204" pitchFamily="34" charset="0"/>
+                <a:cs typeface="Times New Roman" panose="02020603050405020304" pitchFamily="18" charset="0"/>
+              </a:rPr>
+              <a:t>mobile application</a:t>
             </a:r>
             <a:r>
               <a:rPr lang="en-US" sz="1800" kern="100" dirty="0">
@@ -2478,34 +2445,76 @@
                 <a:ea typeface="Aptos" panose="020B0004020202020204" pitchFamily="34" charset="0"/>
                 <a:cs typeface="Times New Roman" panose="02020603050405020304" pitchFamily="18" charset="0"/>
               </a:rPr>
-              <a:t>IFC is a standardized digital format for describing assets in the built environment. As an open, international standard, it promotes vendor-neutral functionality and ensures compatibility across various hardware devices, software platforms, and interfaces, supporting a wide range of use cases [2]. </a:t>
-            </a:r>
-            <a:r>
-              <a:rPr lang="en-GB" sz="1800" kern="100" dirty="0">
-                <a:solidFill>
-                  <a:sysClr val="windowText" lastClr="000000"/>
-                </a:solidFill>
-                <a:latin typeface="Aptos" panose="020B0004020202020204" pitchFamily="34" charset="0"/>
-                <a:ea typeface="Aptos" panose="020B0004020202020204" pitchFamily="34" charset="0"/>
-                <a:cs typeface="Times New Roman" panose="02020603050405020304" pitchFamily="18" charset="0"/>
-              </a:rPr>
-              <a:t>This research</a:t>
-            </a:r>
-            <a:r>
-              <a:rPr lang="en-GB" sz="1800" kern="100" dirty="0">
-                <a:solidFill>
-                  <a:sysClr val="windowText" lastClr="000000"/>
-                </a:solidFill>
-                <a:effectLst/>
-                <a:latin typeface="Aptos" panose="020B0004020202020204" pitchFamily="34" charset="0"/>
-                <a:ea typeface="Aptos" panose="020B0004020202020204" pitchFamily="34" charset="0"/>
-                <a:cs typeface="Times New Roman" panose="02020603050405020304" pitchFamily="18" charset="0"/>
-              </a:rPr>
-              <a:t> proposes an AR-based solution that tracks changes more visibly across different versions of a BIM model, making management of the project's updates easier and more intuitive.</a:t>
+              <a:t>. The accompanying application provides real-time feedback and historical tracking through intuitive visualizations, making the data easy to understand, even for non-technical users. Users can view their current </a:t>
+            </a:r>
+            <a:r>
+              <a:rPr lang="en-US" sz="1800" b="1" kern="100" dirty="0">
+                <a:solidFill>
+                  <a:srgbClr val="FF0000"/>
+                </a:solidFill>
+                <a:latin typeface="Aptos" panose="020B0004020202020204" pitchFamily="34" charset="0"/>
+                <a:ea typeface="Aptos" panose="020B0004020202020204" pitchFamily="34" charset="0"/>
+                <a:cs typeface="Times New Roman" panose="02020603050405020304" pitchFamily="18" charset="0"/>
+              </a:rPr>
+              <a:t>heart rate, SpO₂, skin conductance, and respiration rate,</a:t>
+            </a:r>
+            <a:r>
+              <a:rPr lang="en-US" sz="1800" kern="100" dirty="0">
+                <a:solidFill>
+                  <a:schemeClr val="tx1"/>
+                </a:solidFill>
+                <a:latin typeface="Aptos" panose="020B0004020202020204" pitchFamily="34" charset="0"/>
+                <a:ea typeface="Aptos" panose="020B0004020202020204" pitchFamily="34" charset="0"/>
+                <a:cs typeface="Times New Roman" panose="02020603050405020304" pitchFamily="18" charset="0"/>
+              </a:rPr>
+              <a:t> while the app estimates stress levels based on individual baseline values.</a:t>
+            </a:r>
+          </a:p>
+          <a:p>
+            <a:pPr>
+              <a:lnSpc>
+                <a:spcPct val="115000"/>
+              </a:lnSpc>
+              <a:spcAft>
+                <a:spcPts val="800"/>
+              </a:spcAft>
+            </a:pPr>
+            <a:r>
+              <a:rPr lang="en-US" sz="1800" kern="100" dirty="0">
+                <a:solidFill>
+                  <a:schemeClr val="tx1"/>
+                </a:solidFill>
+                <a:latin typeface="Aptos" panose="020B0004020202020204" pitchFamily="34" charset="0"/>
+                <a:ea typeface="Aptos" panose="020B0004020202020204" pitchFamily="34" charset="0"/>
+                <a:cs typeface="Times New Roman" panose="02020603050405020304" pitchFamily="18" charset="0"/>
+              </a:rPr>
+              <a:t>This system was developed to be </a:t>
+            </a:r>
+            <a:r>
+              <a:rPr lang="en-US" sz="1800" b="1" kern="100" dirty="0">
+                <a:solidFill>
+                  <a:srgbClr val="FF0000"/>
+                </a:solidFill>
+                <a:latin typeface="Aptos" panose="020B0004020202020204" pitchFamily="34" charset="0"/>
+                <a:ea typeface="Aptos" panose="020B0004020202020204" pitchFamily="34" charset="0"/>
+                <a:cs typeface="Times New Roman" panose="02020603050405020304" pitchFamily="18" charset="0"/>
+              </a:rPr>
+              <a:t>affordable, user-friendly, and scalable</a:t>
+            </a:r>
+            <a:r>
+              <a:rPr lang="en-US" sz="1800" kern="100" dirty="0">
+                <a:solidFill>
+                  <a:schemeClr val="tx1"/>
+                </a:solidFill>
+                <a:latin typeface="Aptos" panose="020B0004020202020204" pitchFamily="34" charset="0"/>
+                <a:ea typeface="Aptos" panose="020B0004020202020204" pitchFamily="34" charset="0"/>
+                <a:cs typeface="Times New Roman" panose="02020603050405020304" pitchFamily="18" charset="0"/>
+              </a:rPr>
+              <a:t>, making it suitable for shared use in workplace environments. The goal is to empower both individuals and organizations with actionable insights into stress, supporting healthier, more productive work settings.</a:t>
             </a:r>
             <a:endParaRPr lang="nl-BE" sz="1800" kern="100" dirty="0">
               <a:solidFill>
-                <a:sysClr val="windowText" lastClr="000000"/>
+                <a:schemeClr val="tx1"/>
               </a:solidFill>
               <a:effectLst/>
               <a:latin typeface="Aptos" panose="020B0004020202020204" pitchFamily="34" charset="0"/>
@@ -2568,7 +2577,7 @@
           <a:p>
             <a:r>
               <a:rPr lang="en-US" dirty="0"/>
-              <a:t>Traceability of changes within BIM in AR </a:t>
+              <a:t>Tool for measuring welfare parameters</a:t>
             </a:r>
             <a:endParaRPr lang="nl-BE" dirty="0"/>
           </a:p>
@@ -2598,39 +2607,39 @@
         </p:spPr>
         <p:txBody>
           <a:bodyPr>
-            <a:normAutofit fontScale="85000" lnSpcReduction="10000"/>
+            <a:normAutofit lnSpcReduction="10000"/>
           </a:bodyPr>
           <a:lstStyle/>
           <a:p>
             <a:r>
               <a:rPr lang="nl-BE" dirty="0"/>
-              <a:t>Prof. dr. Fabian Di </a:t>
+              <a:t>Dr. Eva Geurts </a:t>
+            </a:r>
+          </a:p>
+          <a:p>
+            <a:r>
+              <a:rPr lang="nl-BE" dirty="0"/>
+              <a:t>Prof. Dr. </a:t>
             </a:r>
             <a:r>
               <a:rPr lang="nl-BE" dirty="0" err="1"/>
-              <a:t>Fiore</a:t>
-            </a:r>
-            <a:endParaRPr lang="nl-BE" dirty="0"/>
-          </a:p>
-          <a:p>
+              <a:t>Gustavo</a:t>
+            </a:r>
             <a:r>
               <a:rPr lang="nl-BE" dirty="0"/>
-              <a:t>Prof. dr. Davy </a:t>
+              <a:t> </a:t>
             </a:r>
             <a:r>
               <a:rPr lang="nl-BE" dirty="0" err="1"/>
-              <a:t>Vanacken</a:t>
-            </a:r>
-            <a:endParaRPr lang="nl-BE" dirty="0"/>
-          </a:p>
-          <a:p>
+              <a:t>Rovelo</a:t>
+            </a:r>
             <a:r>
               <a:rPr lang="nl-BE" dirty="0"/>
-              <a:t>Jeroen </a:t>
+              <a:t> </a:t>
             </a:r>
             <a:r>
               <a:rPr lang="nl-BE" dirty="0" err="1"/>
-              <a:t>Ceyssens</a:t>
+              <a:t>Ruiz</a:t>
             </a:r>
             <a:endParaRPr lang="nl-BE" dirty="0"/>
           </a:p>
@@ -2738,8 +2747,8 @@
         </p:nvSpPr>
         <p:spPr>
           <a:xfrm>
-            <a:off x="8485022" y="9466077"/>
-            <a:ext cx="4270278" cy="750843"/>
+            <a:off x="7098986" y="9494951"/>
+            <a:ext cx="7021278" cy="750843"/>
           </a:xfrm>
           <a:prstGeom prst="roundRect">
             <a:avLst/>
@@ -2773,7 +2782,23 @@
                   <a:schemeClr val="bg2"/>
                 </a:solidFill>
               </a:rPr>
-              <a:t>Methodology</a:t>
+              <a:t>Materials</a:t>
+            </a:r>
+            <a:r>
+              <a:rPr lang="nl-BE" sz="4800" dirty="0">
+                <a:solidFill>
+                  <a:schemeClr val="bg2"/>
+                </a:solidFill>
+              </a:rPr>
+              <a:t> &amp; </a:t>
+            </a:r>
+            <a:r>
+              <a:rPr lang="nl-BE" sz="4800" dirty="0" err="1">
+                <a:solidFill>
+                  <a:schemeClr val="bg2"/>
+                </a:solidFill>
+              </a:rPr>
+              <a:t>methodology</a:t>
             </a:r>
             <a:endParaRPr lang="nl-BE" sz="4800" dirty="0">
               <a:solidFill>
@@ -2797,8 +2822,8 @@
         </p:nvSpPr>
         <p:spPr>
           <a:xfrm>
-            <a:off x="724487" y="10377005"/>
-            <a:ext cx="19769363" cy="2063011"/>
+            <a:off x="753362" y="10278851"/>
+            <a:ext cx="19769363" cy="3696388"/>
           </a:xfrm>
           <a:prstGeom prst="roundRect">
             <a:avLst/>
@@ -2836,12 +2861,28 @@
               <a:lnSpc>
                 <a:spcPct val="115000"/>
               </a:lnSpc>
+            </a:pPr>
+            <a:endParaRPr lang="nl-BE" sz="2400" b="1" kern="100" dirty="0">
+              <a:solidFill>
+                <a:sysClr val="windowText" lastClr="000000"/>
+              </a:solidFill>
+              <a:effectLst/>
+              <a:latin typeface="Aptos" panose="020B0004020202020204" pitchFamily="34" charset="0"/>
+              <a:ea typeface="Aptos" panose="020B0004020202020204" pitchFamily="34" charset="0"/>
+              <a:cs typeface="Times New Roman" panose="02020603050405020304" pitchFamily="18" charset="0"/>
+            </a:endParaRPr>
+          </a:p>
+          <a:p>
+            <a:pPr>
+              <a:lnSpc>
+                <a:spcPct val="115000"/>
+              </a:lnSpc>
               <a:spcAft>
                 <a:spcPts val="800"/>
               </a:spcAft>
             </a:pPr>
             <a:r>
-              <a:rPr lang="en-GB" sz="2400" b="1" kern="100" dirty="0">
+              <a:rPr lang="nl-BE" sz="2400" b="1" kern="100" dirty="0" err="1">
                 <a:solidFill>
                   <a:sysClr val="windowText" lastClr="000000"/>
                 </a:solidFill>
@@ -2850,7 +2891,7 @@
                 <a:ea typeface="Aptos" panose="020B0004020202020204" pitchFamily="34" charset="0"/>
                 <a:cs typeface="Times New Roman" panose="02020603050405020304" pitchFamily="18" charset="0"/>
               </a:rPr>
-              <a:t>Model loading and comparison</a:t>
+              <a:t>Materials</a:t>
             </a:r>
             <a:endParaRPr lang="nl-BE" sz="2000" kern="100" dirty="0">
               <a:solidFill>
@@ -2868,11 +2909,243 @@
                 <a:spcPct val="115000"/>
               </a:lnSpc>
               <a:spcAft>
+                <a:spcPts val="1200"/>
+              </a:spcAft>
+            </a:pPr>
+            <a:r>
+              <a:rPr lang="en-US" sz="2000" kern="100" dirty="0">
+                <a:solidFill>
+                  <a:sysClr val="windowText" lastClr="000000"/>
+                </a:solidFill>
+                <a:effectLst/>
+                <a:latin typeface="Aptos" panose="020B0004020202020204" pitchFamily="34" charset="0"/>
+                <a:ea typeface="Aptos" panose="020B0004020202020204" pitchFamily="34" charset="0"/>
+                <a:cs typeface="Times New Roman" panose="02020603050405020304" pitchFamily="18" charset="0"/>
+              </a:rPr>
+              <a:t>The portable stress measurement device is powered by the </a:t>
+            </a:r>
+            <a:r>
+              <a:rPr lang="en-US" sz="2000" b="1" kern="100" dirty="0">
+                <a:solidFill>
+                  <a:srgbClr val="0070C0"/>
+                </a:solidFill>
+                <a:effectLst/>
+                <a:latin typeface="Aptos" panose="020B0004020202020204" pitchFamily="34" charset="0"/>
+                <a:ea typeface="Aptos" panose="020B0004020202020204" pitchFamily="34" charset="0"/>
+                <a:cs typeface="Times New Roman" panose="02020603050405020304" pitchFamily="18" charset="0"/>
+              </a:rPr>
+              <a:t>Arduino Nano ESP32</a:t>
+            </a:r>
+            <a:r>
+              <a:rPr lang="en-US" sz="2000" kern="100" dirty="0">
+                <a:solidFill>
+                  <a:sysClr val="windowText" lastClr="000000"/>
+                </a:solidFill>
+                <a:effectLst/>
+                <a:latin typeface="Aptos" panose="020B0004020202020204" pitchFamily="34" charset="0"/>
+                <a:ea typeface="Aptos" panose="020B0004020202020204" pitchFamily="34" charset="0"/>
+                <a:cs typeface="Times New Roman" panose="02020603050405020304" pitchFamily="18" charset="0"/>
+              </a:rPr>
+              <a:t>, chosen for its compact size, low power consumption, and built-in Bluetooth, enabling real-time wireless data transmission to a smartphone. It collects data from three main sensors:</a:t>
+            </a:r>
+          </a:p>
+          <a:p>
+            <a:pPr marL="324000" indent="-342900">
+              <a:lnSpc>
+                <a:spcPct val="115000"/>
+              </a:lnSpc>
+              <a:buFont typeface="Arial" panose="020B0604020202020204" pitchFamily="34" charset="0"/>
+              <a:buChar char="•"/>
+            </a:pPr>
+            <a:r>
+              <a:rPr lang="en-US" sz="2000" b="1" kern="100" dirty="0">
+                <a:solidFill>
+                  <a:srgbClr val="0070C0"/>
+                </a:solidFill>
+                <a:effectLst/>
+                <a:latin typeface="Aptos" panose="020B0004020202020204" pitchFamily="34" charset="0"/>
+                <a:ea typeface="Aptos" panose="020B0004020202020204" pitchFamily="34" charset="0"/>
+                <a:cs typeface="Times New Roman" panose="02020603050405020304" pitchFamily="18" charset="0"/>
+              </a:rPr>
+              <a:t>MAX30102:</a:t>
+            </a:r>
+            <a:r>
+              <a:rPr lang="en-US" sz="2000" kern="100" dirty="0">
+                <a:solidFill>
+                  <a:sysClr val="windowText" lastClr="000000"/>
+                </a:solidFill>
+                <a:effectLst/>
+                <a:latin typeface="Aptos" panose="020B0004020202020204" pitchFamily="34" charset="0"/>
+                <a:ea typeface="Aptos" panose="020B0004020202020204" pitchFamily="34" charset="0"/>
+                <a:cs typeface="Times New Roman" panose="02020603050405020304" pitchFamily="18" charset="0"/>
+              </a:rPr>
+              <a:t> An optical sensor that measures </a:t>
+            </a:r>
+            <a:r>
+              <a:rPr lang="en-US" sz="2000" b="1" kern="100" dirty="0">
+                <a:solidFill>
+                  <a:srgbClr val="0070C0"/>
+                </a:solidFill>
+                <a:effectLst/>
+                <a:latin typeface="Aptos" panose="020B0004020202020204" pitchFamily="34" charset="0"/>
+                <a:ea typeface="Aptos" panose="020B0004020202020204" pitchFamily="34" charset="0"/>
+                <a:cs typeface="Times New Roman" panose="02020603050405020304" pitchFamily="18" charset="0"/>
+              </a:rPr>
+              <a:t>heart rate and blood oxygen saturation </a:t>
+            </a:r>
+            <a:r>
+              <a:rPr lang="en-US" sz="2000" kern="100" dirty="0">
+                <a:solidFill>
+                  <a:sysClr val="windowText" lastClr="000000"/>
+                </a:solidFill>
+                <a:effectLst/>
+                <a:latin typeface="Aptos" panose="020B0004020202020204" pitchFamily="34" charset="0"/>
+                <a:ea typeface="Aptos" panose="020B0004020202020204" pitchFamily="34" charset="0"/>
+                <a:cs typeface="Times New Roman" panose="02020603050405020304" pitchFamily="18" charset="0"/>
+              </a:rPr>
+              <a:t>(SpO₂) using red and infrared LEDs.</a:t>
+            </a:r>
+          </a:p>
+          <a:p>
+            <a:pPr marL="324000" indent="-342900">
+              <a:lnSpc>
+                <a:spcPct val="115000"/>
+              </a:lnSpc>
+              <a:buFont typeface="Arial" panose="020B0604020202020204" pitchFamily="34" charset="0"/>
+              <a:buChar char="•"/>
+            </a:pPr>
+            <a:r>
+              <a:rPr lang="en-US" sz="2000" b="1" kern="100" dirty="0">
+                <a:solidFill>
+                  <a:srgbClr val="0070C0"/>
+                </a:solidFill>
+                <a:effectLst/>
+                <a:latin typeface="Aptos" panose="020B0004020202020204" pitchFamily="34" charset="0"/>
+                <a:ea typeface="Aptos" panose="020B0004020202020204" pitchFamily="34" charset="0"/>
+                <a:cs typeface="Times New Roman" panose="02020603050405020304" pitchFamily="18" charset="0"/>
+              </a:rPr>
+              <a:t>Grove GSR Sensor: </a:t>
+            </a:r>
+            <a:r>
+              <a:rPr lang="en-US" sz="2000" kern="100" dirty="0">
+                <a:solidFill>
+                  <a:sysClr val="windowText" lastClr="000000"/>
+                </a:solidFill>
+                <a:effectLst/>
+                <a:latin typeface="Aptos" panose="020B0004020202020204" pitchFamily="34" charset="0"/>
+                <a:ea typeface="Aptos" panose="020B0004020202020204" pitchFamily="34" charset="0"/>
+                <a:cs typeface="Times New Roman" panose="02020603050405020304" pitchFamily="18" charset="0"/>
+              </a:rPr>
+              <a:t>Measures </a:t>
+            </a:r>
+            <a:r>
+              <a:rPr lang="en-US" sz="2000" b="1" kern="100" dirty="0">
+                <a:solidFill>
+                  <a:srgbClr val="0070C0"/>
+                </a:solidFill>
+                <a:effectLst/>
+                <a:latin typeface="Aptos" panose="020B0004020202020204" pitchFamily="34" charset="0"/>
+                <a:ea typeface="Aptos" panose="020B0004020202020204" pitchFamily="34" charset="0"/>
+                <a:cs typeface="Times New Roman" panose="02020603050405020304" pitchFamily="18" charset="0"/>
+              </a:rPr>
+              <a:t>skin conductance</a:t>
+            </a:r>
+            <a:r>
+              <a:rPr lang="en-US" sz="2000" kern="100" dirty="0">
+                <a:solidFill>
+                  <a:sysClr val="windowText" lastClr="000000"/>
+                </a:solidFill>
+                <a:effectLst/>
+                <a:latin typeface="Aptos" panose="020B0004020202020204" pitchFamily="34" charset="0"/>
+                <a:ea typeface="Aptos" panose="020B0004020202020204" pitchFamily="34" charset="0"/>
+                <a:cs typeface="Times New Roman" panose="02020603050405020304" pitchFamily="18" charset="0"/>
+              </a:rPr>
+              <a:t>, an indicator of stress, by detecting changes in sweat gland activity.</a:t>
+            </a:r>
+          </a:p>
+          <a:p>
+            <a:pPr marL="324000" indent="-342900">
+              <a:lnSpc>
+                <a:spcPct val="115000"/>
+              </a:lnSpc>
+              <a:spcAft>
+                <a:spcPts val="1200"/>
+              </a:spcAft>
+              <a:buFont typeface="Arial" panose="020B0604020202020204" pitchFamily="34" charset="0"/>
+              <a:buChar char="•"/>
+            </a:pPr>
+            <a:r>
+              <a:rPr lang="en-US" sz="2000" b="1" kern="100" dirty="0" err="1">
+                <a:solidFill>
+                  <a:srgbClr val="0070C0"/>
+                </a:solidFill>
+                <a:effectLst/>
+                <a:latin typeface="Aptos" panose="020B0004020202020204" pitchFamily="34" charset="0"/>
+                <a:ea typeface="Aptos" panose="020B0004020202020204" pitchFamily="34" charset="0"/>
+                <a:cs typeface="Times New Roman" panose="02020603050405020304" pitchFamily="18" charset="0"/>
+              </a:rPr>
+              <a:t>Plux</a:t>
+            </a:r>
+            <a:r>
+              <a:rPr lang="en-US" sz="2000" b="1" kern="100" dirty="0">
+                <a:solidFill>
+                  <a:srgbClr val="0070C0"/>
+                </a:solidFill>
+                <a:effectLst/>
+                <a:latin typeface="Aptos" panose="020B0004020202020204" pitchFamily="34" charset="0"/>
+                <a:ea typeface="Aptos" panose="020B0004020202020204" pitchFamily="34" charset="0"/>
+                <a:cs typeface="Times New Roman" panose="02020603050405020304" pitchFamily="18" charset="0"/>
+              </a:rPr>
+              <a:t> PZT Sensor: </a:t>
+            </a:r>
+            <a:r>
+              <a:rPr lang="en-US" sz="2000" kern="100" dirty="0">
+                <a:solidFill>
+                  <a:sysClr val="windowText" lastClr="000000"/>
+                </a:solidFill>
+                <a:effectLst/>
+                <a:latin typeface="Aptos" panose="020B0004020202020204" pitchFamily="34" charset="0"/>
+                <a:ea typeface="Aptos" panose="020B0004020202020204" pitchFamily="34" charset="0"/>
+                <a:cs typeface="Times New Roman" panose="02020603050405020304" pitchFamily="18" charset="0"/>
+              </a:rPr>
+              <a:t>Captures </a:t>
+            </a:r>
+            <a:r>
+              <a:rPr lang="en-US" sz="2000" b="1" kern="100" dirty="0">
+                <a:solidFill>
+                  <a:srgbClr val="0070C0"/>
+                </a:solidFill>
+                <a:effectLst/>
+                <a:latin typeface="Aptos" panose="020B0004020202020204" pitchFamily="34" charset="0"/>
+                <a:ea typeface="Aptos" panose="020B0004020202020204" pitchFamily="34" charset="0"/>
+                <a:cs typeface="Times New Roman" panose="02020603050405020304" pitchFamily="18" charset="0"/>
+              </a:rPr>
+              <a:t>respiration rate </a:t>
+            </a:r>
+            <a:r>
+              <a:rPr lang="en-US" sz="2000" kern="100" dirty="0">
+                <a:solidFill>
+                  <a:sysClr val="windowText" lastClr="000000"/>
+                </a:solidFill>
+                <a:effectLst/>
+                <a:latin typeface="Aptos" panose="020B0004020202020204" pitchFamily="34" charset="0"/>
+                <a:ea typeface="Aptos" panose="020B0004020202020204" pitchFamily="34" charset="0"/>
+                <a:cs typeface="Times New Roman" panose="02020603050405020304" pitchFamily="18" charset="0"/>
+              </a:rPr>
+              <a:t>using a piezoelectric belt that detects chest movement.</a:t>
+            </a:r>
+          </a:p>
+          <a:p>
+            <a:pPr>
+              <a:lnSpc>
+                <a:spcPct val="115000"/>
+              </a:lnSpc>
+              <a:spcAft>
                 <a:spcPts val="800"/>
               </a:spcAft>
             </a:pPr>
             <a:r>
-              <a:rPr lang="en-GB" sz="2000" kern="100" dirty="0">
+              <a:rPr lang="en-US" sz="2000" kern="100" dirty="0">
                 <a:solidFill>
                   <a:sysClr val="windowText" lastClr="000000"/>
                 </a:solidFill>
@@ -2881,89 +3154,18 @@
                 <a:ea typeface="Aptos" panose="020B0004020202020204" pitchFamily="34" charset="0"/>
                 <a:cs typeface="Times New Roman" panose="02020603050405020304" pitchFamily="18" charset="0"/>
               </a:rPr>
-              <a:t>Different versions of the BIM models are loaded into the </a:t>
-            </a:r>
-            <a:r>
-              <a:rPr lang="en-GB" sz="2000" b="1" kern="100" dirty="0">
-                <a:solidFill>
-                  <a:schemeClr val="accent1"/>
-                </a:solidFill>
-                <a:effectLst/>
-                <a:latin typeface="Aptos" panose="020B0004020202020204" pitchFamily="34" charset="0"/>
-                <a:ea typeface="Aptos" panose="020B0004020202020204" pitchFamily="34" charset="0"/>
-                <a:cs typeface="Times New Roman" panose="02020603050405020304" pitchFamily="18" charset="0"/>
-              </a:rPr>
-              <a:t>Unity-based program</a:t>
-            </a:r>
-            <a:r>
-              <a:rPr lang="en-GB" sz="2000" kern="100" dirty="0">
-                <a:solidFill>
-                  <a:schemeClr val="accent1"/>
-                </a:solidFill>
-                <a:latin typeface="Aptos" panose="020B0004020202020204" pitchFamily="34" charset="0"/>
-                <a:ea typeface="Aptos" panose="020B0004020202020204" pitchFamily="34" charset="0"/>
-                <a:cs typeface="Times New Roman" panose="02020603050405020304" pitchFamily="18" charset="0"/>
-              </a:rPr>
-              <a:t> </a:t>
-            </a:r>
-            <a:r>
-              <a:rPr lang="en-GB" sz="2000" kern="100" dirty="0">
-                <a:solidFill>
-                  <a:schemeClr val="tx1"/>
-                </a:solidFill>
-                <a:latin typeface="Aptos" panose="020B0004020202020204" pitchFamily="34" charset="0"/>
-                <a:ea typeface="Aptos" panose="020B0004020202020204" pitchFamily="34" charset="0"/>
-                <a:cs typeface="Times New Roman" panose="02020603050405020304" pitchFamily="18" charset="0"/>
-              </a:rPr>
-              <a:t>using an IFC importer add-on</a:t>
-            </a:r>
-            <a:r>
-              <a:rPr lang="en-GB" sz="2000" kern="100" dirty="0">
-                <a:solidFill>
-                  <a:sysClr val="windowText" lastClr="000000"/>
-                </a:solidFill>
-                <a:effectLst/>
-                <a:latin typeface="Aptos" panose="020B0004020202020204" pitchFamily="34" charset="0"/>
-                <a:ea typeface="Aptos" panose="020B0004020202020204" pitchFamily="34" charset="0"/>
-                <a:cs typeface="Times New Roman" panose="02020603050405020304" pitchFamily="18" charset="0"/>
-              </a:rPr>
-              <a:t>. The system </a:t>
-            </a:r>
-            <a:r>
-              <a:rPr lang="en-GB" sz="2000" kern="100" dirty="0">
-                <a:solidFill>
-                  <a:sysClr val="windowText" lastClr="000000"/>
-                </a:solidFill>
-                <a:latin typeface="Aptos" panose="020B0004020202020204" pitchFamily="34" charset="0"/>
-                <a:ea typeface="Aptos" panose="020B0004020202020204" pitchFamily="34" charset="0"/>
-                <a:cs typeface="Times New Roman" panose="02020603050405020304" pitchFamily="18" charset="0"/>
-              </a:rPr>
-              <a:t>identifies </a:t>
-            </a:r>
-            <a:r>
-              <a:rPr lang="en-GB" sz="2000" b="1" kern="100" dirty="0">
-                <a:solidFill>
-                  <a:schemeClr val="accent1"/>
-                </a:solidFill>
-                <a:effectLst/>
-                <a:latin typeface="Aptos" panose="020B0004020202020204" pitchFamily="34" charset="0"/>
-                <a:ea typeface="Aptos" panose="020B0004020202020204" pitchFamily="34" charset="0"/>
-                <a:cs typeface="Times New Roman" panose="02020603050405020304" pitchFamily="18" charset="0"/>
-              </a:rPr>
-              <a:t>differences </a:t>
-            </a:r>
-            <a:r>
-              <a:rPr lang="en-GB" sz="2000" kern="100" dirty="0">
-                <a:solidFill>
-                  <a:sysClr val="windowText" lastClr="000000"/>
-                </a:solidFill>
-                <a:effectLst/>
-                <a:latin typeface="Aptos" panose="020B0004020202020204" pitchFamily="34" charset="0"/>
-                <a:ea typeface="Aptos" panose="020B0004020202020204" pitchFamily="34" charset="0"/>
-                <a:cs typeface="Times New Roman" panose="02020603050405020304" pitchFamily="18" charset="0"/>
-              </a:rPr>
-              <a:t>between these versions. It focuses on changes such as the addition of objects, removals, relocated objects, and changes in materials. These changes are stored in maps within the program for easy access and visualization.</a:t>
-            </a:r>
+              <a:t>All sensor data is processed by the ESP32 in real-time and transmitted via Bluetooth Low Energy (BLE) using a custom GATT service. The firmware, written in C++, includes commands for starting/stopping individual or combined measurements. Sensor readings are combined into a single BLE message and sent to the smartphone for visualization.</a:t>
+            </a:r>
+          </a:p>
+          <a:p>
+            <a:pPr>
+              <a:lnSpc>
+                <a:spcPct val="115000"/>
+              </a:lnSpc>
+              <a:spcAft>
+                <a:spcPts val="800"/>
+              </a:spcAft>
+            </a:pPr>
             <a:endParaRPr lang="nl-BE" sz="2000" kern="100" dirty="0">
               <a:solidFill>
                 <a:sysClr val="windowText" lastClr="000000"/>
@@ -2990,11 +3192,13 @@
         </p:nvSpPr>
         <p:spPr>
           <a:xfrm>
-            <a:off x="724486" y="12611442"/>
-            <a:ext cx="19769363" cy="3978675"/>
+            <a:off x="809512" y="14057358"/>
+            <a:ext cx="19769364" cy="7624152"/>
           </a:xfrm>
           <a:prstGeom prst="roundRect">
-            <a:avLst/>
+            <a:avLst>
+              <a:gd name="adj" fmla="val 11945"/>
+            </a:avLst>
           </a:prstGeom>
           <a:solidFill>
             <a:srgbClr val="FF5757">
@@ -3033,6 +3237,30 @@
                 <a:spcPts val="800"/>
               </a:spcAft>
             </a:pPr>
+            <a:r>
+              <a:rPr lang="nl-BE" sz="2400" b="1" kern="100" dirty="0">
+                <a:solidFill>
+                  <a:schemeClr val="tx1"/>
+                </a:solidFill>
+                <a:effectLst/>
+                <a:latin typeface="Aptos" panose="020B0004020202020204" pitchFamily="34" charset="0"/>
+                <a:ea typeface="Aptos" panose="020B0004020202020204" pitchFamily="34" charset="0"/>
+                <a:cs typeface="Times New Roman" panose="02020603050405020304" pitchFamily="18" charset="0"/>
+              </a:rPr>
+              <a:t>Mobile </a:t>
+            </a:r>
+            <a:r>
+              <a:rPr lang="nl-BE" sz="2400" b="1" kern="100" dirty="0" err="1">
+                <a:solidFill>
+                  <a:schemeClr val="tx1"/>
+                </a:solidFill>
+                <a:effectLst/>
+                <a:latin typeface="Aptos" panose="020B0004020202020204" pitchFamily="34" charset="0"/>
+                <a:ea typeface="Aptos" panose="020B0004020202020204" pitchFamily="34" charset="0"/>
+                <a:cs typeface="Times New Roman" panose="02020603050405020304" pitchFamily="18" charset="0"/>
+              </a:rPr>
+              <a:t>application</a:t>
+            </a:r>
             <a:endParaRPr lang="nl-BE" sz="2000" kern="100" dirty="0">
               <a:solidFill>
                 <a:schemeClr val="tx1"/>
@@ -3043,56 +3271,6 @@
               <a:cs typeface="Times New Roman" panose="02020603050405020304" pitchFamily="18" charset="0"/>
             </a:endParaRPr>
           </a:p>
-        </p:txBody>
-      </p:sp>
-      <p:sp>
-        <p:nvSpPr>
-          <p:cNvPr id="24" name="Rechthoek: afgeronde hoeken 23">
-            <a:extLst>
-              <a:ext uri="{FF2B5EF4-FFF2-40B4-BE49-F238E27FC236}">
-                <a16:creationId xmlns:a16="http://schemas.microsoft.com/office/drawing/2014/main" id="{6641A083-6FA5-E703-99F3-2CBC72BD5D08}"/>
-              </a:ext>
-            </a:extLst>
-          </p:cNvPr>
-          <p:cNvSpPr/>
-          <p:nvPr/>
-        </p:nvSpPr>
-        <p:spPr>
-          <a:xfrm>
-            <a:off x="724487" y="16761544"/>
-            <a:ext cx="19769362" cy="4442579"/>
-          </a:xfrm>
-          <a:prstGeom prst="roundRect">
-            <a:avLst/>
-          </a:prstGeom>
-          <a:solidFill>
-            <a:srgbClr val="FF5757">
-              <a:alpha val="27843"/>
-            </a:srgbClr>
-          </a:solidFill>
-          <a:ln w="25400">
-            <a:solidFill>
-              <a:srgbClr val="FF0000"/>
-            </a:solidFill>
-          </a:ln>
-        </p:spPr>
-        <p:style>
-          <a:lnRef idx="1">
-            <a:schemeClr val="accent1"/>
-          </a:lnRef>
-          <a:fillRef idx="3">
-            <a:schemeClr val="accent1"/>
-          </a:fillRef>
-          <a:effectRef idx="2">
-            <a:schemeClr val="accent1"/>
-          </a:effectRef>
-          <a:fontRef idx="minor">
-            <a:schemeClr val="lt1"/>
-          </a:fontRef>
-        </p:style>
-        <p:txBody>
-          <a:bodyPr rtlCol="0" anchor="ctr"/>
-          <a:lstStyle/>
           <a:p>
             <a:pPr>
               <a:lnSpc>
@@ -3102,9 +3280,393 @@
                 <a:spcPts val="800"/>
               </a:spcAft>
             </a:pPr>
-            <a:endParaRPr lang="en-GB" sz="2400" b="1" kern="100" dirty="0">
+            <a:r>
+              <a:rPr lang="en-US" sz="2000" kern="100" dirty="0">
+                <a:solidFill>
+                  <a:schemeClr val="tx1"/>
+                </a:solidFill>
+                <a:effectLst/>
+                <a:latin typeface="Aptos" panose="020B0004020202020204" pitchFamily="34" charset="0"/>
+                <a:ea typeface="Aptos" panose="020B0004020202020204" pitchFamily="34" charset="0"/>
+                <a:cs typeface="Times New Roman" panose="02020603050405020304" pitchFamily="18" charset="0"/>
+              </a:rPr>
+              <a:t>To complement the stress measurement device, a mobile application was developed that focuses on </a:t>
+            </a:r>
+            <a:r>
+              <a:rPr lang="en-US" sz="2000" b="1" kern="100" dirty="0">
+                <a:solidFill>
+                  <a:srgbClr val="0070C0"/>
+                </a:solidFill>
+                <a:effectLst/>
+                <a:latin typeface="Aptos" panose="020B0004020202020204" pitchFamily="34" charset="0"/>
+                <a:ea typeface="Aptos" panose="020B0004020202020204" pitchFamily="34" charset="0"/>
+                <a:cs typeface="Times New Roman" panose="02020603050405020304" pitchFamily="18" charset="0"/>
+              </a:rPr>
+              <a:t>usability, personalization, and clear data presentation</a:t>
+            </a:r>
+            <a:r>
+              <a:rPr lang="en-US" sz="2000" kern="100" dirty="0">
+                <a:solidFill>
+                  <a:schemeClr val="tx1"/>
+                </a:solidFill>
+                <a:effectLst/>
+                <a:latin typeface="Aptos" panose="020B0004020202020204" pitchFamily="34" charset="0"/>
+                <a:ea typeface="Aptos" panose="020B0004020202020204" pitchFamily="34" charset="0"/>
+                <a:cs typeface="Times New Roman" panose="02020603050405020304" pitchFamily="18" charset="0"/>
+              </a:rPr>
+              <a:t>. The app enables real-time monitoring and historical tracking of key physiological signals, making stress and health data accessible and understandable, even for non-technical users. Below is a summary of the main features and the reasons behind each design choice:</a:t>
+            </a:r>
+          </a:p>
+          <a:p>
+            <a:pPr marL="342900" indent="-342900">
+              <a:lnSpc>
+                <a:spcPct val="115000"/>
+              </a:lnSpc>
+              <a:spcAft>
+                <a:spcPts val="800"/>
+              </a:spcAft>
+              <a:buFont typeface="Arial" panose="020B0604020202020204" pitchFamily="34" charset="0"/>
+              <a:buChar char="•"/>
+            </a:pPr>
+            <a:r>
+              <a:rPr lang="nl-BE" sz="2000" b="1" kern="100" dirty="0">
+                <a:solidFill>
+                  <a:srgbClr val="0070C0"/>
+                </a:solidFill>
+                <a:effectLst/>
+                <a:latin typeface="Aptos" panose="020B0004020202020204" pitchFamily="34" charset="0"/>
+                <a:ea typeface="Aptos" panose="020B0004020202020204" pitchFamily="34" charset="0"/>
+                <a:cs typeface="Times New Roman" panose="02020603050405020304" pitchFamily="18" charset="0"/>
+              </a:rPr>
+              <a:t>Shared Device, Multiple Users</a:t>
+            </a:r>
+            <a:r>
+              <a:rPr lang="nl-BE" sz="2000" kern="100" dirty="0">
+                <a:solidFill>
+                  <a:srgbClr val="0070C0"/>
+                </a:solidFill>
+                <a:effectLst/>
+                <a:latin typeface="Aptos" panose="020B0004020202020204" pitchFamily="34" charset="0"/>
+                <a:ea typeface="Aptos" panose="020B0004020202020204" pitchFamily="34" charset="0"/>
+                <a:cs typeface="Times New Roman" panose="02020603050405020304" pitchFamily="18" charset="0"/>
+              </a:rPr>
+              <a:t>: </a:t>
+            </a:r>
+            <a:r>
+              <a:rPr lang="en-US" sz="2000" kern="100" dirty="0">
+                <a:solidFill>
+                  <a:schemeClr val="tx1"/>
+                </a:solidFill>
+                <a:effectLst/>
+                <a:latin typeface="Aptos" panose="020B0004020202020204" pitchFamily="34" charset="0"/>
+                <a:ea typeface="Aptos" panose="020B0004020202020204" pitchFamily="34" charset="0"/>
+                <a:cs typeface="Times New Roman" panose="02020603050405020304" pitchFamily="18" charset="0"/>
+              </a:rPr>
+              <a:t>A multi-user login system allows organizations to use a single device for several users, minimizing hardware costs and improving accessibility in budget-constrained settings.</a:t>
+            </a:r>
+          </a:p>
+          <a:p>
+            <a:pPr marL="342900" indent="-342900">
+              <a:lnSpc>
+                <a:spcPct val="115000"/>
+              </a:lnSpc>
+              <a:spcAft>
+                <a:spcPts val="800"/>
+              </a:spcAft>
+              <a:buFont typeface="Arial" panose="020B0604020202020204" pitchFamily="34" charset="0"/>
+              <a:buChar char="•"/>
+            </a:pPr>
+            <a:r>
+              <a:rPr lang="nl-BE" sz="2000" b="1" kern="100" dirty="0" err="1">
+                <a:solidFill>
+                  <a:srgbClr val="0070C0"/>
+                </a:solidFill>
+                <a:effectLst/>
+                <a:latin typeface="Aptos" panose="020B0004020202020204" pitchFamily="34" charset="0"/>
+                <a:ea typeface="Aptos" panose="020B0004020202020204" pitchFamily="34" charset="0"/>
+                <a:cs typeface="Times New Roman" panose="02020603050405020304" pitchFamily="18" charset="0"/>
+              </a:rPr>
+              <a:t>Personalized</a:t>
+            </a:r>
+            <a:r>
+              <a:rPr lang="nl-BE" sz="2000" b="1" kern="100" dirty="0">
+                <a:solidFill>
+                  <a:srgbClr val="0070C0"/>
+                </a:solidFill>
+                <a:effectLst/>
+                <a:latin typeface="Aptos" panose="020B0004020202020204" pitchFamily="34" charset="0"/>
+                <a:ea typeface="Aptos" panose="020B0004020202020204" pitchFamily="34" charset="0"/>
+                <a:cs typeface="Times New Roman" panose="02020603050405020304" pitchFamily="18" charset="0"/>
+              </a:rPr>
+              <a:t> Setup:</a:t>
+            </a:r>
+            <a:r>
+              <a:rPr lang="nl-BE" sz="2000" kern="100" dirty="0">
+                <a:solidFill>
+                  <a:srgbClr val="0070C0"/>
+                </a:solidFill>
+                <a:effectLst/>
+                <a:latin typeface="Aptos" panose="020B0004020202020204" pitchFamily="34" charset="0"/>
+                <a:ea typeface="Aptos" panose="020B0004020202020204" pitchFamily="34" charset="0"/>
+                <a:cs typeface="Times New Roman" panose="02020603050405020304" pitchFamily="18" charset="0"/>
+              </a:rPr>
+              <a:t> </a:t>
+            </a:r>
+            <a:r>
+              <a:rPr lang="en-US" sz="2000" kern="100" dirty="0">
+                <a:solidFill>
+                  <a:schemeClr val="tx1"/>
+                </a:solidFill>
+                <a:effectLst/>
+                <a:latin typeface="Aptos" panose="020B0004020202020204" pitchFamily="34" charset="0"/>
+                <a:ea typeface="Aptos" panose="020B0004020202020204" pitchFamily="34" charset="0"/>
+                <a:cs typeface="Times New Roman" panose="02020603050405020304" pitchFamily="18" charset="0"/>
+              </a:rPr>
+              <a:t>New users enter their age to calculate personalized heart rate zones and complete a baseline measurement for heart rate, respiration, and GSR. This helps tailor the app’s feedback to individual physiology.</a:t>
+            </a:r>
+          </a:p>
+          <a:p>
+            <a:pPr marL="342900" indent="-342900">
+              <a:lnSpc>
+                <a:spcPct val="115000"/>
+              </a:lnSpc>
+              <a:spcAft>
+                <a:spcPts val="800"/>
+              </a:spcAft>
+              <a:buFont typeface="Arial" panose="020B0604020202020204" pitchFamily="34" charset="0"/>
+              <a:buChar char="•"/>
+            </a:pPr>
+            <a:r>
+              <a:rPr lang="nl-BE" sz="2000" b="1" kern="100" dirty="0" err="1">
+                <a:solidFill>
+                  <a:srgbClr val="0070C0"/>
+                </a:solidFill>
+                <a:effectLst/>
+                <a:latin typeface="Aptos" panose="020B0004020202020204" pitchFamily="34" charset="0"/>
+                <a:ea typeface="Aptos" panose="020B0004020202020204" pitchFamily="34" charset="0"/>
+                <a:cs typeface="Times New Roman" panose="02020603050405020304" pitchFamily="18" charset="0"/>
+              </a:rPr>
+              <a:t>Intuitive</a:t>
+            </a:r>
+            <a:r>
+              <a:rPr lang="nl-BE" sz="2000" b="1" kern="100" dirty="0">
+                <a:solidFill>
+                  <a:srgbClr val="0070C0"/>
+                </a:solidFill>
+                <a:effectLst/>
+                <a:latin typeface="Aptos" panose="020B0004020202020204" pitchFamily="34" charset="0"/>
+                <a:ea typeface="Aptos" panose="020B0004020202020204" pitchFamily="34" charset="0"/>
+                <a:cs typeface="Times New Roman" panose="02020603050405020304" pitchFamily="18" charset="0"/>
+              </a:rPr>
+              <a:t> </a:t>
+            </a:r>
+            <a:r>
+              <a:rPr lang="nl-BE" sz="2000" b="1" kern="100" dirty="0" err="1">
+                <a:solidFill>
+                  <a:srgbClr val="0070C0"/>
+                </a:solidFill>
+                <a:effectLst/>
+                <a:latin typeface="Aptos" panose="020B0004020202020204" pitchFamily="34" charset="0"/>
+                <a:ea typeface="Aptos" panose="020B0004020202020204" pitchFamily="34" charset="0"/>
+                <a:cs typeface="Times New Roman" panose="02020603050405020304" pitchFamily="18" charset="0"/>
+              </a:rPr>
+              <a:t>Visualizations</a:t>
+            </a:r>
+            <a:r>
+              <a:rPr lang="nl-BE" sz="2000" b="1" kern="100" dirty="0">
+                <a:solidFill>
+                  <a:srgbClr val="0070C0"/>
+                </a:solidFill>
+                <a:effectLst/>
+                <a:latin typeface="Aptos" panose="020B0004020202020204" pitchFamily="34" charset="0"/>
+                <a:ea typeface="Aptos" panose="020B0004020202020204" pitchFamily="34" charset="0"/>
+                <a:cs typeface="Times New Roman" panose="02020603050405020304" pitchFamily="18" charset="0"/>
+              </a:rPr>
+              <a:t>: </a:t>
+            </a:r>
+            <a:r>
+              <a:rPr lang="en-US" sz="2000" kern="100" dirty="0">
+                <a:solidFill>
+                  <a:schemeClr val="tx1"/>
+                </a:solidFill>
+                <a:effectLst/>
+                <a:latin typeface="Aptos" panose="020B0004020202020204" pitchFamily="34" charset="0"/>
+                <a:ea typeface="Aptos" panose="020B0004020202020204" pitchFamily="34" charset="0"/>
+                <a:cs typeface="Times New Roman" panose="02020603050405020304" pitchFamily="18" charset="0"/>
+              </a:rPr>
+              <a:t>Each parameter is shown using easy-to-read graphics: radial gauges for heart rate, GSR, and respiration and a progress bar for SpO₂ Color-coded zones to help users instantly understand their health status.</a:t>
+            </a:r>
+          </a:p>
+          <a:p>
+            <a:pPr marL="342900" indent="-342900">
+              <a:lnSpc>
+                <a:spcPct val="115000"/>
+              </a:lnSpc>
+              <a:spcAft>
+                <a:spcPts val="800"/>
+              </a:spcAft>
+              <a:buFont typeface="Arial" panose="020B0604020202020204" pitchFamily="34" charset="0"/>
+              <a:buChar char="•"/>
+            </a:pPr>
+            <a:r>
+              <a:rPr lang="nl-BE" sz="2000" b="1" kern="100" dirty="0">
+                <a:solidFill>
+                  <a:srgbClr val="0070C0"/>
+                </a:solidFill>
+                <a:effectLst/>
+                <a:latin typeface="Aptos" panose="020B0004020202020204" pitchFamily="34" charset="0"/>
+                <a:ea typeface="Aptos" panose="020B0004020202020204" pitchFamily="34" charset="0"/>
+                <a:cs typeface="Times New Roman" panose="02020603050405020304" pitchFamily="18" charset="0"/>
+              </a:rPr>
+              <a:t>Stress </a:t>
+            </a:r>
+            <a:r>
+              <a:rPr lang="nl-BE" sz="2000" b="1" kern="100" dirty="0" err="1">
+                <a:solidFill>
+                  <a:srgbClr val="0070C0"/>
+                </a:solidFill>
+                <a:effectLst/>
+                <a:latin typeface="Aptos" panose="020B0004020202020204" pitchFamily="34" charset="0"/>
+                <a:ea typeface="Aptos" panose="020B0004020202020204" pitchFamily="34" charset="0"/>
+                <a:cs typeface="Times New Roman" panose="02020603050405020304" pitchFamily="18" charset="0"/>
+              </a:rPr>
+              <a:t>Detection</a:t>
+            </a:r>
+            <a:r>
+              <a:rPr lang="nl-BE" sz="2000" b="1" kern="100" dirty="0">
+                <a:solidFill>
+                  <a:srgbClr val="0070C0"/>
+                </a:solidFill>
+                <a:effectLst/>
+                <a:latin typeface="Aptos" panose="020B0004020202020204" pitchFamily="34" charset="0"/>
+                <a:ea typeface="Aptos" panose="020B0004020202020204" pitchFamily="34" charset="0"/>
+                <a:cs typeface="Times New Roman" panose="02020603050405020304" pitchFamily="18" charset="0"/>
+              </a:rPr>
+              <a:t>:</a:t>
+            </a:r>
+            <a:r>
+              <a:rPr lang="nl-BE" sz="2000" kern="100" dirty="0">
+                <a:solidFill>
+                  <a:srgbClr val="0070C0"/>
+                </a:solidFill>
+                <a:effectLst/>
+                <a:latin typeface="Aptos" panose="020B0004020202020204" pitchFamily="34" charset="0"/>
+                <a:ea typeface="Aptos" panose="020B0004020202020204" pitchFamily="34" charset="0"/>
+                <a:cs typeface="Times New Roman" panose="02020603050405020304" pitchFamily="18" charset="0"/>
+              </a:rPr>
+              <a:t> </a:t>
+            </a:r>
+            <a:r>
+              <a:rPr lang="en-US" sz="2000" kern="100" dirty="0">
+                <a:solidFill>
+                  <a:schemeClr val="tx1"/>
+                </a:solidFill>
+                <a:effectLst/>
+                <a:latin typeface="Aptos" panose="020B0004020202020204" pitchFamily="34" charset="0"/>
+                <a:ea typeface="Aptos" panose="020B0004020202020204" pitchFamily="34" charset="0"/>
+                <a:cs typeface="Times New Roman" panose="02020603050405020304" pitchFamily="18" charset="0"/>
+              </a:rPr>
+              <a:t>A color-coded stress indicator combines respiration and GSR data. Although exact thresholds aren't the focus, this simplified system by using dummy thresholds allows the interface's usability to be tested and refined.</a:t>
+            </a:r>
+          </a:p>
+          <a:p>
+            <a:pPr marL="342900" indent="-342900">
+              <a:lnSpc>
+                <a:spcPct val="115000"/>
+              </a:lnSpc>
+              <a:spcAft>
+                <a:spcPts val="800"/>
+              </a:spcAft>
+              <a:buFont typeface="Arial" panose="020B0604020202020204" pitchFamily="34" charset="0"/>
+              <a:buChar char="•"/>
+            </a:pPr>
+            <a:r>
+              <a:rPr lang="nl-BE" sz="2000" b="1" kern="100" dirty="0">
+                <a:solidFill>
+                  <a:srgbClr val="0070C0"/>
+                </a:solidFill>
+                <a:effectLst/>
+                <a:latin typeface="Aptos" panose="020B0004020202020204" pitchFamily="34" charset="0"/>
+                <a:ea typeface="Aptos" panose="020B0004020202020204" pitchFamily="34" charset="0"/>
+                <a:cs typeface="Times New Roman" panose="02020603050405020304" pitchFamily="18" charset="0"/>
+              </a:rPr>
+              <a:t>Trend Tracking:</a:t>
+            </a:r>
+            <a:r>
+              <a:rPr lang="nl-BE" sz="2000" kern="100" dirty="0">
+                <a:solidFill>
+                  <a:srgbClr val="0070C0"/>
+                </a:solidFill>
+                <a:effectLst/>
+                <a:latin typeface="Aptos" panose="020B0004020202020204" pitchFamily="34" charset="0"/>
+                <a:ea typeface="Aptos" panose="020B0004020202020204" pitchFamily="34" charset="0"/>
+                <a:cs typeface="Times New Roman" panose="02020603050405020304" pitchFamily="18" charset="0"/>
+              </a:rPr>
+              <a:t> </a:t>
+            </a:r>
+            <a:r>
+              <a:rPr lang="en-US" sz="2000" kern="100" dirty="0">
+                <a:solidFill>
+                  <a:schemeClr val="tx1"/>
+                </a:solidFill>
+                <a:effectLst/>
+                <a:latin typeface="Aptos" panose="020B0004020202020204" pitchFamily="34" charset="0"/>
+                <a:ea typeface="Aptos" panose="020B0004020202020204" pitchFamily="34" charset="0"/>
+                <a:cs typeface="Times New Roman" panose="02020603050405020304" pitchFamily="18" charset="0"/>
+              </a:rPr>
+              <a:t>Users can review past data in a history view, with filters like “Today” or “Last 7 Days.” Bar graphs display daily min/max values to show trends without overwhelming detail—ideal for mobile screens.</a:t>
+            </a:r>
+          </a:p>
+          <a:p>
+            <a:pPr marL="342900" indent="-342900">
+              <a:lnSpc>
+                <a:spcPct val="115000"/>
+              </a:lnSpc>
+              <a:spcAft>
+                <a:spcPts val="800"/>
+              </a:spcAft>
+              <a:buFont typeface="Arial" panose="020B0604020202020204" pitchFamily="34" charset="0"/>
+              <a:buChar char="•"/>
+            </a:pPr>
+            <a:r>
+              <a:rPr lang="nl-BE" sz="2000" b="1" kern="100" dirty="0">
+                <a:solidFill>
+                  <a:srgbClr val="0070C0"/>
+                </a:solidFill>
+                <a:effectLst/>
+                <a:latin typeface="Aptos" panose="020B0004020202020204" pitchFamily="34" charset="0"/>
+                <a:ea typeface="Aptos" panose="020B0004020202020204" pitchFamily="34" charset="0"/>
+                <a:cs typeface="Times New Roman" panose="02020603050405020304" pitchFamily="18" charset="0"/>
+              </a:rPr>
+              <a:t>Info Panels:</a:t>
+            </a:r>
+            <a:r>
+              <a:rPr lang="nl-BE" sz="2000" kern="100" dirty="0">
+                <a:solidFill>
+                  <a:srgbClr val="0070C0"/>
+                </a:solidFill>
+                <a:effectLst/>
+                <a:latin typeface="Aptos" panose="020B0004020202020204" pitchFamily="34" charset="0"/>
+                <a:ea typeface="Aptos" panose="020B0004020202020204" pitchFamily="34" charset="0"/>
+                <a:cs typeface="Times New Roman" panose="02020603050405020304" pitchFamily="18" charset="0"/>
+              </a:rPr>
+              <a:t> </a:t>
+            </a:r>
+            <a:r>
+              <a:rPr lang="en-US" sz="2000" kern="100" dirty="0">
+                <a:solidFill>
+                  <a:schemeClr val="tx1"/>
+                </a:solidFill>
+                <a:effectLst/>
+                <a:latin typeface="Aptos" panose="020B0004020202020204" pitchFamily="34" charset="0"/>
+                <a:ea typeface="Aptos" panose="020B0004020202020204" pitchFamily="34" charset="0"/>
+                <a:cs typeface="Times New Roman" panose="02020603050405020304" pitchFamily="18" charset="0"/>
+              </a:rPr>
+              <a:t>Each health metric has an information button explaining what it measures, how it works, and why it matters. This improves understanding and builds trust in the system.</a:t>
+            </a:r>
+            <a:endParaRPr lang="nl-BE" sz="2000" b="1" kern="100" dirty="0">
               <a:solidFill>
-                <a:schemeClr val="tx1"/>
+                <a:srgbClr val="FF0000"/>
               </a:solidFill>
               <a:effectLst/>
               <a:latin typeface="Aptos" panose="020B0004020202020204" pitchFamily="34" charset="0"/>
@@ -3112,779 +3674,8 @@
               <a:cs typeface="Times New Roman" panose="02020603050405020304" pitchFamily="18" charset="0"/>
             </a:endParaRPr>
           </a:p>
-          <a:p>
-            <a:pPr>
-              <a:lnSpc>
-                <a:spcPct val="115000"/>
-              </a:lnSpc>
-              <a:spcAft>
-                <a:spcPts val="800"/>
-              </a:spcAft>
-            </a:pPr>
-            <a:endParaRPr lang="nl-BE" sz="1800" kern="100" dirty="0">
-              <a:effectLst/>
-              <a:latin typeface="Aptos" panose="020B0004020202020204" pitchFamily="34" charset="0"/>
-              <a:ea typeface="Aptos" panose="020B0004020202020204" pitchFamily="34" charset="0"/>
-              <a:cs typeface="Times New Roman" panose="02020603050405020304" pitchFamily="18" charset="0"/>
-            </a:endParaRPr>
-          </a:p>
         </p:txBody>
       </p:sp>
-      <p:pic>
-        <p:nvPicPr>
-          <p:cNvPr id="55" name="Afbeelding 54">
-            <a:extLst>
-              <a:ext uri="{FF2B5EF4-FFF2-40B4-BE49-F238E27FC236}">
-                <a16:creationId xmlns:a16="http://schemas.microsoft.com/office/drawing/2014/main" id="{1A93A1A4-97F9-0AC9-6E15-FADCB6A154BC}"/>
-              </a:ext>
-            </a:extLst>
-          </p:cNvPr>
-          <p:cNvPicPr>
-            <a:picLocks noChangeAspect="1"/>
-          </p:cNvPicPr>
-          <p:nvPr/>
-        </p:nvPicPr>
-        <p:blipFill rotWithShape="1">
-          <a:blip r:embed="rId3"/>
-          <a:srcRect l="1379" r="1917"/>
-          <a:stretch/>
-        </p:blipFill>
-        <p:spPr>
-          <a:xfrm>
-            <a:off x="13959840" y="12665664"/>
-            <a:ext cx="5631180" cy="3726439"/>
-          </a:xfrm>
-          <a:prstGeom prst="rect">
-            <a:avLst/>
-          </a:prstGeom>
-        </p:spPr>
-      </p:pic>
-      <p:sp>
-        <p:nvSpPr>
-          <p:cNvPr id="56" name="Tekstvak 55">
-            <a:extLst>
-              <a:ext uri="{FF2B5EF4-FFF2-40B4-BE49-F238E27FC236}">
-                <a16:creationId xmlns:a16="http://schemas.microsoft.com/office/drawing/2014/main" id="{A17EDF10-4F9A-60E7-CCE0-3052B49D320E}"/>
-              </a:ext>
-            </a:extLst>
-          </p:cNvPr>
-          <p:cNvSpPr txBox="1"/>
-          <p:nvPr/>
-        </p:nvSpPr>
-        <p:spPr>
-          <a:xfrm>
-            <a:off x="797264" y="12786709"/>
-            <a:ext cx="12164037" cy="3256276"/>
-          </a:xfrm>
-          <a:prstGeom prst="rect">
-            <a:avLst/>
-          </a:prstGeom>
-        </p:spPr>
-        <p:txBody>
-          <a:bodyPr vert="horz" wrap="square" rtlCol="0">
-            <a:spAutoFit/>
-          </a:bodyPr>
-          <a:lstStyle/>
-          <a:p>
-            <a:pPr>
-              <a:lnSpc>
-                <a:spcPct val="115000"/>
-              </a:lnSpc>
-              <a:spcAft>
-                <a:spcPts val="800"/>
-              </a:spcAft>
-            </a:pPr>
-            <a:r>
-              <a:rPr lang="en-GB" sz="2400" b="1" kern="100" dirty="0">
-                <a:solidFill>
-                  <a:schemeClr val="tx1"/>
-                </a:solidFill>
-                <a:effectLst/>
-                <a:latin typeface="Aptos" panose="020B0004020202020204" pitchFamily="34" charset="0"/>
-                <a:ea typeface="Aptos" panose="020B0004020202020204" pitchFamily="34" charset="0"/>
-                <a:cs typeface="Times New Roman" panose="02020603050405020304" pitchFamily="18" charset="0"/>
-              </a:rPr>
-              <a:t>Change visualization and interaction</a:t>
-            </a:r>
-            <a:endParaRPr lang="nl-BE" sz="2400" kern="100" dirty="0">
-              <a:solidFill>
-                <a:schemeClr val="tx1"/>
-              </a:solidFill>
-              <a:effectLst/>
-              <a:latin typeface="Aptos" panose="020B0004020202020204" pitchFamily="34" charset="0"/>
-              <a:ea typeface="Aptos" panose="020B0004020202020204" pitchFamily="34" charset="0"/>
-              <a:cs typeface="Times New Roman" panose="02020603050405020304" pitchFamily="18" charset="0"/>
-            </a:endParaRPr>
-          </a:p>
-          <a:p>
-            <a:pPr>
-              <a:lnSpc>
-                <a:spcPct val="115000"/>
-              </a:lnSpc>
-              <a:spcAft>
-                <a:spcPts val="800"/>
-              </a:spcAft>
-            </a:pPr>
-            <a:r>
-              <a:rPr lang="en-GB" sz="2000" kern="100" dirty="0">
-                <a:solidFill>
-                  <a:schemeClr val="tx1"/>
-                </a:solidFill>
-                <a:effectLst/>
-                <a:latin typeface="Aptos" panose="020B0004020202020204" pitchFamily="34" charset="0"/>
-                <a:ea typeface="Aptos" panose="020B0004020202020204" pitchFamily="34" charset="0"/>
-                <a:cs typeface="Times New Roman" panose="02020603050405020304" pitchFamily="18" charset="0"/>
-              </a:rPr>
-              <a:t>The system provides an </a:t>
-            </a:r>
-            <a:r>
-              <a:rPr lang="en-GB" sz="2000" b="1" kern="100" dirty="0">
-                <a:solidFill>
-                  <a:schemeClr val="accent1"/>
-                </a:solidFill>
-                <a:effectLst/>
-                <a:latin typeface="Aptos" panose="020B0004020202020204" pitchFamily="34" charset="0"/>
-                <a:ea typeface="Aptos" panose="020B0004020202020204" pitchFamily="34" charset="0"/>
-                <a:cs typeface="Times New Roman" panose="02020603050405020304" pitchFamily="18" charset="0"/>
-              </a:rPr>
-              <a:t>interactive list </a:t>
-            </a:r>
-            <a:r>
-              <a:rPr lang="en-GB" sz="2000" kern="100" dirty="0">
-                <a:solidFill>
-                  <a:schemeClr val="tx1"/>
-                </a:solidFill>
-                <a:effectLst/>
-                <a:latin typeface="Aptos" panose="020B0004020202020204" pitchFamily="34" charset="0"/>
-                <a:ea typeface="Aptos" panose="020B0004020202020204" pitchFamily="34" charset="0"/>
-                <a:cs typeface="Times New Roman" panose="02020603050405020304" pitchFamily="18" charset="0"/>
-              </a:rPr>
-              <a:t>of detected changes. When a change is selected, the corresponding game object gets marked with a specific </a:t>
-            </a:r>
-            <a:r>
-              <a:rPr lang="en-GB" sz="2000" kern="100" dirty="0" err="1">
-                <a:solidFill>
-                  <a:schemeClr val="tx1"/>
-                </a:solidFill>
-                <a:effectLst/>
-                <a:latin typeface="Aptos" panose="020B0004020202020204" pitchFamily="34" charset="0"/>
-                <a:ea typeface="Aptos" panose="020B0004020202020204" pitchFamily="34" charset="0"/>
-                <a:cs typeface="Times New Roman" panose="02020603050405020304" pitchFamily="18" charset="0"/>
-              </a:rPr>
-              <a:t>color</a:t>
-            </a:r>
-            <a:r>
-              <a:rPr lang="en-GB" sz="2000" kern="100" dirty="0">
-                <a:solidFill>
-                  <a:schemeClr val="tx1"/>
-                </a:solidFill>
-                <a:effectLst/>
-                <a:latin typeface="Aptos" panose="020B0004020202020204" pitchFamily="34" charset="0"/>
-                <a:ea typeface="Aptos" panose="020B0004020202020204" pitchFamily="34" charset="0"/>
-                <a:cs typeface="Times New Roman" panose="02020603050405020304" pitchFamily="18" charset="0"/>
-              </a:rPr>
-              <a:t> to show the type of change made. </a:t>
-            </a:r>
-            <a:r>
-              <a:rPr lang="en-GB" sz="2000" kern="100" dirty="0">
-                <a:latin typeface="Aptos" panose="020B0004020202020204" pitchFamily="34" charset="0"/>
-                <a:ea typeface="Aptos" panose="020B0004020202020204" pitchFamily="34" charset="0"/>
-                <a:cs typeface="Times New Roman" panose="02020603050405020304" pitchFamily="18" charset="0"/>
-              </a:rPr>
-              <a:t>The </a:t>
-            </a:r>
-            <a:r>
-              <a:rPr lang="en-GB" sz="2000" b="1" kern="100" dirty="0" err="1">
-                <a:solidFill>
-                  <a:schemeClr val="accent1"/>
-                </a:solidFill>
-                <a:latin typeface="Aptos" panose="020B0004020202020204" pitchFamily="34" charset="0"/>
-                <a:ea typeface="Aptos" panose="020B0004020202020204" pitchFamily="34" charset="0"/>
-                <a:cs typeface="Times New Roman" panose="02020603050405020304" pitchFamily="18" charset="0"/>
-              </a:rPr>
-              <a:t>color</a:t>
-            </a:r>
-            <a:r>
-              <a:rPr lang="en-GB" sz="2000" b="1" kern="100" dirty="0">
-                <a:solidFill>
-                  <a:schemeClr val="accent1"/>
-                </a:solidFill>
-                <a:latin typeface="Aptos" panose="020B0004020202020204" pitchFamily="34" charset="0"/>
-                <a:ea typeface="Aptos" panose="020B0004020202020204" pitchFamily="34" charset="0"/>
-                <a:cs typeface="Times New Roman" panose="02020603050405020304" pitchFamily="18" charset="0"/>
-              </a:rPr>
-              <a:t> coding </a:t>
-            </a:r>
-            <a:r>
-              <a:rPr lang="en-GB" sz="2000" kern="100" dirty="0">
-                <a:latin typeface="Aptos" panose="020B0004020202020204" pitchFamily="34" charset="0"/>
-                <a:ea typeface="Aptos" panose="020B0004020202020204" pitchFamily="34" charset="0"/>
-                <a:cs typeface="Times New Roman" panose="02020603050405020304" pitchFamily="18" charset="0"/>
-              </a:rPr>
-              <a:t>is:</a:t>
-            </a:r>
-            <a:endParaRPr lang="nl-BE" sz="2000" kern="100" dirty="0">
-              <a:solidFill>
-                <a:schemeClr val="tx1"/>
-              </a:solidFill>
-              <a:effectLst/>
-              <a:latin typeface="Aptos" panose="020B0004020202020204" pitchFamily="34" charset="0"/>
-              <a:ea typeface="Aptos" panose="020B0004020202020204" pitchFamily="34" charset="0"/>
-              <a:cs typeface="Times New Roman" panose="02020603050405020304" pitchFamily="18" charset="0"/>
-            </a:endParaRPr>
-          </a:p>
-          <a:p>
-            <a:pPr marL="342900" lvl="0" indent="-342900">
-              <a:lnSpc>
-                <a:spcPct val="115000"/>
-              </a:lnSpc>
-              <a:buFont typeface="Symbol" panose="05050102010706020507" pitchFamily="18" charset="2"/>
-              <a:buChar char=""/>
-            </a:pPr>
-            <a:r>
-              <a:rPr lang="en-GB" sz="2000" kern="100" dirty="0">
-                <a:solidFill>
-                  <a:schemeClr val="tx1"/>
-                </a:solidFill>
-                <a:effectLst/>
-                <a:latin typeface="Aptos" panose="020B0004020202020204" pitchFamily="34" charset="0"/>
-                <a:ea typeface="Aptos" panose="020B0004020202020204" pitchFamily="34" charset="0"/>
-                <a:cs typeface="Times New Roman" panose="02020603050405020304" pitchFamily="18" charset="0"/>
-              </a:rPr>
-              <a:t>Red: The object has been </a:t>
-            </a:r>
-            <a:r>
-              <a:rPr lang="en-GB" sz="2000" b="1" kern="100" dirty="0">
-                <a:solidFill>
-                  <a:schemeClr val="accent1"/>
-                </a:solidFill>
-                <a:effectLst/>
-                <a:latin typeface="Aptos" panose="020B0004020202020204" pitchFamily="34" charset="0"/>
-                <a:ea typeface="Aptos" panose="020B0004020202020204" pitchFamily="34" charset="0"/>
-                <a:cs typeface="Times New Roman" panose="02020603050405020304" pitchFamily="18" charset="0"/>
-              </a:rPr>
-              <a:t>removed</a:t>
-            </a:r>
-            <a:r>
-              <a:rPr lang="en-GB" sz="2000" kern="100" dirty="0">
-                <a:solidFill>
-                  <a:schemeClr val="tx1"/>
-                </a:solidFill>
-                <a:effectLst/>
-                <a:latin typeface="Aptos" panose="020B0004020202020204" pitchFamily="34" charset="0"/>
-                <a:ea typeface="Aptos" panose="020B0004020202020204" pitchFamily="34" charset="0"/>
-                <a:cs typeface="Times New Roman" panose="02020603050405020304" pitchFamily="18" charset="0"/>
-              </a:rPr>
-              <a:t>.</a:t>
-            </a:r>
-            <a:endParaRPr lang="nl-BE" sz="2000" kern="100" dirty="0">
-              <a:solidFill>
-                <a:schemeClr val="tx1"/>
-              </a:solidFill>
-              <a:effectLst/>
-              <a:latin typeface="Aptos" panose="020B0004020202020204" pitchFamily="34" charset="0"/>
-              <a:ea typeface="Aptos" panose="020B0004020202020204" pitchFamily="34" charset="0"/>
-              <a:cs typeface="Times New Roman" panose="02020603050405020304" pitchFamily="18" charset="0"/>
-            </a:endParaRPr>
-          </a:p>
-          <a:p>
-            <a:pPr marL="342900" lvl="0" indent="-342900">
-              <a:lnSpc>
-                <a:spcPct val="115000"/>
-              </a:lnSpc>
-              <a:buFont typeface="Symbol" panose="05050102010706020507" pitchFamily="18" charset="2"/>
-              <a:buChar char=""/>
-            </a:pPr>
-            <a:r>
-              <a:rPr lang="en-GB" sz="2000" kern="100" dirty="0">
-                <a:solidFill>
-                  <a:schemeClr val="tx1"/>
-                </a:solidFill>
-                <a:effectLst/>
-                <a:latin typeface="Aptos" panose="020B0004020202020204" pitchFamily="34" charset="0"/>
-                <a:ea typeface="Aptos" panose="020B0004020202020204" pitchFamily="34" charset="0"/>
-                <a:cs typeface="Times New Roman" panose="02020603050405020304" pitchFamily="18" charset="0"/>
-              </a:rPr>
-              <a:t>Green: The object has been </a:t>
-            </a:r>
-            <a:r>
-              <a:rPr lang="en-GB" sz="2000" b="1" kern="100" dirty="0">
-                <a:solidFill>
-                  <a:schemeClr val="accent1"/>
-                </a:solidFill>
-                <a:effectLst/>
-                <a:latin typeface="Aptos" panose="020B0004020202020204" pitchFamily="34" charset="0"/>
-                <a:ea typeface="Aptos" panose="020B0004020202020204" pitchFamily="34" charset="0"/>
-                <a:cs typeface="Times New Roman" panose="02020603050405020304" pitchFamily="18" charset="0"/>
-              </a:rPr>
-              <a:t>added</a:t>
-            </a:r>
-            <a:r>
-              <a:rPr lang="en-GB" sz="2000" kern="100" dirty="0">
-                <a:solidFill>
-                  <a:schemeClr val="tx1"/>
-                </a:solidFill>
-                <a:effectLst/>
-                <a:latin typeface="Aptos" panose="020B0004020202020204" pitchFamily="34" charset="0"/>
-                <a:ea typeface="Aptos" panose="020B0004020202020204" pitchFamily="34" charset="0"/>
-                <a:cs typeface="Times New Roman" panose="02020603050405020304" pitchFamily="18" charset="0"/>
-              </a:rPr>
-              <a:t>.</a:t>
-            </a:r>
-            <a:endParaRPr lang="nl-BE" sz="2000" kern="100" dirty="0">
-              <a:solidFill>
-                <a:schemeClr val="tx1"/>
-              </a:solidFill>
-              <a:effectLst/>
-              <a:latin typeface="Aptos" panose="020B0004020202020204" pitchFamily="34" charset="0"/>
-              <a:ea typeface="Aptos" panose="020B0004020202020204" pitchFamily="34" charset="0"/>
-              <a:cs typeface="Times New Roman" panose="02020603050405020304" pitchFamily="18" charset="0"/>
-            </a:endParaRPr>
-          </a:p>
-          <a:p>
-            <a:pPr marL="342900" lvl="0" indent="-342900">
-              <a:lnSpc>
-                <a:spcPct val="115000"/>
-              </a:lnSpc>
-              <a:buFont typeface="Symbol" panose="05050102010706020507" pitchFamily="18" charset="2"/>
-              <a:buChar char=""/>
-            </a:pPr>
-            <a:r>
-              <a:rPr lang="en-GB" sz="2000" kern="100" dirty="0">
-                <a:solidFill>
-                  <a:schemeClr val="tx1"/>
-                </a:solidFill>
-                <a:effectLst/>
-                <a:latin typeface="Aptos" panose="020B0004020202020204" pitchFamily="34" charset="0"/>
-                <a:ea typeface="Aptos" panose="020B0004020202020204" pitchFamily="34" charset="0"/>
-                <a:cs typeface="Times New Roman" panose="02020603050405020304" pitchFamily="18" charset="0"/>
-              </a:rPr>
-              <a:t>Purple: The object has been </a:t>
-            </a:r>
-            <a:r>
-              <a:rPr lang="en-GB" sz="2000" b="1" kern="100" dirty="0">
-                <a:solidFill>
-                  <a:schemeClr val="accent1"/>
-                </a:solidFill>
-                <a:effectLst/>
-                <a:latin typeface="Aptos" panose="020B0004020202020204" pitchFamily="34" charset="0"/>
-                <a:ea typeface="Aptos" panose="020B0004020202020204" pitchFamily="34" charset="0"/>
-                <a:cs typeface="Times New Roman" panose="02020603050405020304" pitchFamily="18" charset="0"/>
-              </a:rPr>
-              <a:t>moved</a:t>
-            </a:r>
-            <a:r>
-              <a:rPr lang="en-GB" sz="2000" kern="100" dirty="0">
-                <a:solidFill>
-                  <a:schemeClr val="tx1"/>
-                </a:solidFill>
-                <a:effectLst/>
-                <a:latin typeface="Aptos" panose="020B0004020202020204" pitchFamily="34" charset="0"/>
-                <a:ea typeface="Aptos" panose="020B0004020202020204" pitchFamily="34" charset="0"/>
-                <a:cs typeface="Times New Roman" panose="02020603050405020304" pitchFamily="18" charset="0"/>
-              </a:rPr>
-              <a:t>.</a:t>
-            </a:r>
-            <a:endParaRPr lang="nl-BE" sz="2000" kern="100" dirty="0">
-              <a:solidFill>
-                <a:schemeClr val="tx1"/>
-              </a:solidFill>
-              <a:effectLst/>
-              <a:latin typeface="Aptos" panose="020B0004020202020204" pitchFamily="34" charset="0"/>
-              <a:ea typeface="Aptos" panose="020B0004020202020204" pitchFamily="34" charset="0"/>
-              <a:cs typeface="Times New Roman" panose="02020603050405020304" pitchFamily="18" charset="0"/>
-            </a:endParaRPr>
-          </a:p>
-          <a:p>
-            <a:pPr marL="342900" lvl="0" indent="-342900">
-              <a:lnSpc>
-                <a:spcPct val="115000"/>
-              </a:lnSpc>
-              <a:spcAft>
-                <a:spcPts val="800"/>
-              </a:spcAft>
-              <a:buFont typeface="Symbol" panose="05050102010706020507" pitchFamily="18" charset="2"/>
-              <a:buChar char=""/>
-            </a:pPr>
-            <a:r>
-              <a:rPr lang="en-GB" sz="2000" kern="100" dirty="0">
-                <a:solidFill>
-                  <a:schemeClr val="tx1"/>
-                </a:solidFill>
-                <a:effectLst/>
-                <a:latin typeface="Aptos" panose="020B0004020202020204" pitchFamily="34" charset="0"/>
-                <a:ea typeface="Aptos" panose="020B0004020202020204" pitchFamily="34" charset="0"/>
-                <a:cs typeface="Times New Roman" panose="02020603050405020304" pitchFamily="18" charset="0"/>
-              </a:rPr>
-              <a:t>Blue: Represents a change of the </a:t>
-            </a:r>
-            <a:r>
-              <a:rPr lang="en-GB" sz="2000" b="1" kern="100" dirty="0">
-                <a:solidFill>
-                  <a:schemeClr val="accent1"/>
-                </a:solidFill>
-                <a:effectLst/>
-                <a:latin typeface="Aptos" panose="020B0004020202020204" pitchFamily="34" charset="0"/>
-                <a:ea typeface="Aptos" panose="020B0004020202020204" pitchFamily="34" charset="0"/>
-                <a:cs typeface="Times New Roman" panose="02020603050405020304" pitchFamily="18" charset="0"/>
-              </a:rPr>
-              <a:t>materials</a:t>
-            </a:r>
-            <a:r>
-              <a:rPr lang="en-GB" sz="2000" kern="100" dirty="0">
-                <a:solidFill>
-                  <a:schemeClr val="tx1"/>
-                </a:solidFill>
-                <a:effectLst/>
-                <a:latin typeface="Aptos" panose="020B0004020202020204" pitchFamily="34" charset="0"/>
-                <a:ea typeface="Aptos" panose="020B0004020202020204" pitchFamily="34" charset="0"/>
-                <a:cs typeface="Times New Roman" panose="02020603050405020304" pitchFamily="18" charset="0"/>
-              </a:rPr>
-              <a:t>.</a:t>
-            </a:r>
-            <a:endParaRPr lang="nl-BE" sz="2000" kern="100" dirty="0">
-              <a:solidFill>
-                <a:schemeClr val="tx1"/>
-              </a:solidFill>
-              <a:effectLst/>
-              <a:latin typeface="Aptos" panose="020B0004020202020204" pitchFamily="34" charset="0"/>
-              <a:ea typeface="Aptos" panose="020B0004020202020204" pitchFamily="34" charset="0"/>
-              <a:cs typeface="Times New Roman" panose="02020603050405020304" pitchFamily="18" charset="0"/>
-            </a:endParaRPr>
-          </a:p>
-          <a:p>
-            <a:endParaRPr lang="nl-BE" sz="2000" b="1" dirty="0" err="1">
-              <a:solidFill>
-                <a:schemeClr val="tx1"/>
-              </a:solidFill>
-            </a:endParaRPr>
-          </a:p>
-        </p:txBody>
-      </p:sp>
-      <p:pic>
-        <p:nvPicPr>
-          <p:cNvPr id="60" name="Afbeelding 59">
-            <a:extLst>
-              <a:ext uri="{FF2B5EF4-FFF2-40B4-BE49-F238E27FC236}">
-                <a16:creationId xmlns:a16="http://schemas.microsoft.com/office/drawing/2014/main" id="{8CF5F8A4-4543-5796-E066-942EFEFB78C7}"/>
-              </a:ext>
-            </a:extLst>
-          </p:cNvPr>
-          <p:cNvPicPr>
-            <a:picLocks noChangeAspect="1"/>
-          </p:cNvPicPr>
-          <p:nvPr/>
-        </p:nvPicPr>
-        <p:blipFill>
-          <a:blip r:embed="rId4"/>
-          <a:stretch>
-            <a:fillRect/>
-          </a:stretch>
-        </p:blipFill>
-        <p:spPr>
-          <a:xfrm>
-            <a:off x="1653565" y="15622693"/>
-            <a:ext cx="10342985" cy="571580"/>
-          </a:xfrm>
-          <a:prstGeom prst="rect">
-            <a:avLst/>
-          </a:prstGeom>
-        </p:spPr>
-      </p:pic>
-      <p:sp>
-        <p:nvSpPr>
-          <p:cNvPr id="62" name="Tekstvak 61">
-            <a:extLst>
-              <a:ext uri="{FF2B5EF4-FFF2-40B4-BE49-F238E27FC236}">
-                <a16:creationId xmlns:a16="http://schemas.microsoft.com/office/drawing/2014/main" id="{755F00C9-2A8C-A2C7-2B52-975F0E458A71}"/>
-              </a:ext>
-            </a:extLst>
-          </p:cNvPr>
-          <p:cNvSpPr txBox="1"/>
-          <p:nvPr/>
-        </p:nvSpPr>
-        <p:spPr>
-          <a:xfrm>
-            <a:off x="797264" y="17313968"/>
-            <a:ext cx="12687247" cy="3285002"/>
-          </a:xfrm>
-          <a:prstGeom prst="rect">
-            <a:avLst/>
-          </a:prstGeom>
-        </p:spPr>
-        <p:txBody>
-          <a:bodyPr vert="horz" wrap="square" rtlCol="0">
-            <a:spAutoFit/>
-          </a:bodyPr>
-          <a:lstStyle/>
-          <a:p>
-            <a:pPr>
-              <a:lnSpc>
-                <a:spcPct val="115000"/>
-              </a:lnSpc>
-              <a:spcAft>
-                <a:spcPts val="800"/>
-              </a:spcAft>
-            </a:pPr>
-            <a:r>
-              <a:rPr lang="en-GB" sz="2400" b="1" kern="100" dirty="0">
-                <a:solidFill>
-                  <a:schemeClr val="tx1"/>
-                </a:solidFill>
-                <a:effectLst/>
-                <a:latin typeface="Aptos" panose="020B0004020202020204" pitchFamily="34" charset="0"/>
-                <a:ea typeface="Aptos" panose="020B0004020202020204" pitchFamily="34" charset="0"/>
-                <a:cs typeface="Times New Roman" panose="02020603050405020304" pitchFamily="18" charset="0"/>
-              </a:rPr>
-              <a:t>Decision card</a:t>
-            </a:r>
-            <a:endParaRPr lang="en-GB" sz="2000" kern="100" dirty="0">
-              <a:solidFill>
-                <a:schemeClr val="tx1"/>
-              </a:solidFill>
-              <a:effectLst/>
-              <a:latin typeface="Aptos" panose="020B0004020202020204" pitchFamily="34" charset="0"/>
-              <a:ea typeface="Aptos" panose="020B0004020202020204" pitchFamily="34" charset="0"/>
-              <a:cs typeface="Times New Roman" panose="02020603050405020304" pitchFamily="18" charset="0"/>
-            </a:endParaRPr>
-          </a:p>
-          <a:p>
-            <a:pPr>
-              <a:lnSpc>
-                <a:spcPct val="115000"/>
-              </a:lnSpc>
-              <a:spcAft>
-                <a:spcPts val="800"/>
-              </a:spcAft>
-            </a:pPr>
-            <a:r>
-              <a:rPr lang="en-GB" sz="2000" kern="100" dirty="0">
-                <a:solidFill>
-                  <a:schemeClr val="tx1"/>
-                </a:solidFill>
-                <a:effectLst/>
-                <a:latin typeface="Aptos" panose="020B0004020202020204" pitchFamily="34" charset="0"/>
-                <a:ea typeface="Aptos" panose="020B0004020202020204" pitchFamily="34" charset="0"/>
-                <a:cs typeface="Times New Roman" panose="02020603050405020304" pitchFamily="18" charset="0"/>
-              </a:rPr>
-              <a:t>When a change gets selected in the list, the "</a:t>
-            </a:r>
-            <a:r>
-              <a:rPr lang="en-GB" sz="2000" b="1" kern="100" dirty="0">
-                <a:solidFill>
-                  <a:schemeClr val="accent1"/>
-                </a:solidFill>
-                <a:effectLst/>
-                <a:latin typeface="Aptos" panose="020B0004020202020204" pitchFamily="34" charset="0"/>
-                <a:ea typeface="Aptos" panose="020B0004020202020204" pitchFamily="34" charset="0"/>
-                <a:cs typeface="Times New Roman" panose="02020603050405020304" pitchFamily="18" charset="0"/>
-              </a:rPr>
-              <a:t>decision card</a:t>
-            </a:r>
-            <a:r>
-              <a:rPr lang="en-GB" sz="2000" kern="100" dirty="0">
-                <a:solidFill>
-                  <a:schemeClr val="tx1"/>
-                </a:solidFill>
-                <a:effectLst/>
-                <a:latin typeface="Aptos" panose="020B0004020202020204" pitchFamily="34" charset="0"/>
-                <a:ea typeface="Aptos" panose="020B0004020202020204" pitchFamily="34" charset="0"/>
-                <a:cs typeface="Times New Roman" panose="02020603050405020304" pitchFamily="18" charset="0"/>
-              </a:rPr>
-              <a:t>“ [3] pops up. The decision card is a pop-up window that gives specific information on what changed. The decision card displays the following items:</a:t>
-            </a:r>
-            <a:endParaRPr lang="nl-BE" sz="2000" kern="100" dirty="0">
-              <a:solidFill>
-                <a:schemeClr val="tx1"/>
-              </a:solidFill>
-              <a:effectLst/>
-              <a:latin typeface="Aptos" panose="020B0004020202020204" pitchFamily="34" charset="0"/>
-              <a:ea typeface="Aptos" panose="020B0004020202020204" pitchFamily="34" charset="0"/>
-              <a:cs typeface="Times New Roman" panose="02020603050405020304" pitchFamily="18" charset="0"/>
-            </a:endParaRPr>
-          </a:p>
-          <a:p>
-            <a:pPr marL="342900" lvl="0" indent="-342900">
-              <a:lnSpc>
-                <a:spcPct val="115000"/>
-              </a:lnSpc>
-              <a:buFont typeface="Symbol" panose="05050102010706020507" pitchFamily="18" charset="2"/>
-              <a:buChar char=""/>
-            </a:pPr>
-            <a:r>
-              <a:rPr lang="en-GB" sz="2000" b="1" kern="100" dirty="0">
-                <a:solidFill>
-                  <a:schemeClr val="accent1"/>
-                </a:solidFill>
-                <a:effectLst/>
-                <a:latin typeface="Aptos" panose="020B0004020202020204" pitchFamily="34" charset="0"/>
-                <a:ea typeface="Aptos" panose="020B0004020202020204" pitchFamily="34" charset="0"/>
-                <a:cs typeface="Times New Roman" panose="02020603050405020304" pitchFamily="18" charset="0"/>
-              </a:rPr>
-              <a:t>What changed</a:t>
-            </a:r>
-            <a:r>
-              <a:rPr lang="en-GB" sz="2000" kern="100" dirty="0">
-                <a:solidFill>
-                  <a:schemeClr val="tx1"/>
-                </a:solidFill>
-                <a:effectLst/>
-                <a:latin typeface="Aptos" panose="020B0004020202020204" pitchFamily="34" charset="0"/>
-                <a:ea typeface="Aptos" panose="020B0004020202020204" pitchFamily="34" charset="0"/>
-                <a:cs typeface="Times New Roman" panose="02020603050405020304" pitchFamily="18" charset="0"/>
-              </a:rPr>
-              <a:t>: A short description of what changed [3].</a:t>
-            </a:r>
-            <a:endParaRPr lang="nl-BE" sz="2000" kern="100" dirty="0">
-              <a:solidFill>
-                <a:schemeClr val="tx1"/>
-              </a:solidFill>
-              <a:effectLst/>
-              <a:latin typeface="Aptos" panose="020B0004020202020204" pitchFamily="34" charset="0"/>
-              <a:ea typeface="Aptos" panose="020B0004020202020204" pitchFamily="34" charset="0"/>
-              <a:cs typeface="Times New Roman" panose="02020603050405020304" pitchFamily="18" charset="0"/>
-            </a:endParaRPr>
-          </a:p>
-          <a:p>
-            <a:pPr marL="342900" lvl="0" indent="-342900">
-              <a:lnSpc>
-                <a:spcPct val="115000"/>
-              </a:lnSpc>
-              <a:buFont typeface="Symbol" panose="05050102010706020507" pitchFamily="18" charset="2"/>
-              <a:buChar char=""/>
-            </a:pPr>
-            <a:r>
-              <a:rPr lang="en-GB" sz="2000" b="1" kern="100" dirty="0">
-                <a:solidFill>
-                  <a:schemeClr val="accent1"/>
-                </a:solidFill>
-                <a:effectLst/>
-                <a:latin typeface="Aptos" panose="020B0004020202020204" pitchFamily="34" charset="0"/>
-                <a:ea typeface="Aptos" panose="020B0004020202020204" pitchFamily="34" charset="0"/>
-                <a:cs typeface="Times New Roman" panose="02020603050405020304" pitchFamily="18" charset="0"/>
-              </a:rPr>
-              <a:t>Description</a:t>
-            </a:r>
-            <a:r>
-              <a:rPr lang="en-GB" sz="2000" kern="100" dirty="0">
-                <a:solidFill>
-                  <a:schemeClr val="tx1"/>
-                </a:solidFill>
-                <a:effectLst/>
-                <a:latin typeface="Aptos" panose="020B0004020202020204" pitchFamily="34" charset="0"/>
-                <a:ea typeface="Aptos" panose="020B0004020202020204" pitchFamily="34" charset="0"/>
-                <a:cs typeface="Times New Roman" panose="02020603050405020304" pitchFamily="18" charset="0"/>
-              </a:rPr>
-              <a:t>: Why was this change needed or useful [3].</a:t>
-            </a:r>
-            <a:endParaRPr lang="nl-BE" sz="2000" kern="100" dirty="0">
-              <a:solidFill>
-                <a:schemeClr val="tx1"/>
-              </a:solidFill>
-              <a:effectLst/>
-              <a:latin typeface="Aptos" panose="020B0004020202020204" pitchFamily="34" charset="0"/>
-              <a:ea typeface="Aptos" panose="020B0004020202020204" pitchFamily="34" charset="0"/>
-              <a:cs typeface="Times New Roman" panose="02020603050405020304" pitchFamily="18" charset="0"/>
-            </a:endParaRPr>
-          </a:p>
-          <a:p>
-            <a:pPr marL="342900" lvl="0" indent="-342900">
-              <a:lnSpc>
-                <a:spcPct val="115000"/>
-              </a:lnSpc>
-              <a:spcAft>
-                <a:spcPts val="800"/>
-              </a:spcAft>
-              <a:buFont typeface="Symbol" panose="05050102010706020507" pitchFamily="18" charset="2"/>
-              <a:buChar char=""/>
-            </a:pPr>
-            <a:r>
-              <a:rPr lang="en-GB" sz="2000" b="1" kern="100" dirty="0">
-                <a:solidFill>
-                  <a:schemeClr val="accent1"/>
-                </a:solidFill>
-                <a:effectLst/>
-                <a:latin typeface="Aptos" panose="020B0004020202020204" pitchFamily="34" charset="0"/>
-                <a:ea typeface="Aptos" panose="020B0004020202020204" pitchFamily="34" charset="0"/>
-                <a:cs typeface="Times New Roman" panose="02020603050405020304" pitchFamily="18" charset="0"/>
-              </a:rPr>
-              <a:t>Who is involved</a:t>
-            </a:r>
-            <a:r>
-              <a:rPr lang="en-GB" sz="2000" kern="100" dirty="0">
-                <a:solidFill>
-                  <a:schemeClr val="tx1"/>
-                </a:solidFill>
-                <a:effectLst/>
-                <a:latin typeface="Aptos" panose="020B0004020202020204" pitchFamily="34" charset="0"/>
-                <a:ea typeface="Aptos" panose="020B0004020202020204" pitchFamily="34" charset="0"/>
-                <a:cs typeface="Times New Roman" panose="02020603050405020304" pitchFamily="18" charset="0"/>
-              </a:rPr>
-              <a:t>: Sums up the main people or groups engaged during design and approval of the change [3].</a:t>
-            </a:r>
-            <a:endParaRPr lang="nl-BE" sz="2000" kern="100" dirty="0">
-              <a:solidFill>
-                <a:schemeClr val="tx1"/>
-              </a:solidFill>
-              <a:effectLst/>
-              <a:latin typeface="Aptos" panose="020B0004020202020204" pitchFamily="34" charset="0"/>
-              <a:ea typeface="Aptos" panose="020B0004020202020204" pitchFamily="34" charset="0"/>
-              <a:cs typeface="Times New Roman" panose="02020603050405020304" pitchFamily="18" charset="0"/>
-            </a:endParaRPr>
-          </a:p>
-          <a:p>
-            <a:pPr>
-              <a:lnSpc>
-                <a:spcPct val="115000"/>
-              </a:lnSpc>
-              <a:spcAft>
-                <a:spcPts val="800"/>
-              </a:spcAft>
-            </a:pPr>
-            <a:r>
-              <a:rPr lang="en-GB" sz="2000" kern="100" dirty="0">
-                <a:solidFill>
-                  <a:schemeClr val="tx1"/>
-                </a:solidFill>
-                <a:effectLst/>
-                <a:latin typeface="Aptos" panose="020B0004020202020204" pitchFamily="34" charset="0"/>
-                <a:ea typeface="Aptos" panose="020B0004020202020204" pitchFamily="34" charset="0"/>
-                <a:cs typeface="Times New Roman" panose="02020603050405020304" pitchFamily="18" charset="0"/>
-              </a:rPr>
-              <a:t>Using this approach, the changes between versions are tracked and the user stays well informed about the changes made using the AR environment.</a:t>
-            </a:r>
-          </a:p>
-        </p:txBody>
-      </p:sp>
-      <p:pic>
-        <p:nvPicPr>
-          <p:cNvPr id="64" name="Afbeelding 63">
-            <a:extLst>
-              <a:ext uri="{FF2B5EF4-FFF2-40B4-BE49-F238E27FC236}">
-                <a16:creationId xmlns:a16="http://schemas.microsoft.com/office/drawing/2014/main" id="{EB518F51-9BA7-5059-19A6-191DFA326837}"/>
-              </a:ext>
-            </a:extLst>
-          </p:cNvPr>
-          <p:cNvPicPr>
-            <a:picLocks noChangeAspect="1"/>
-          </p:cNvPicPr>
-          <p:nvPr/>
-        </p:nvPicPr>
-        <p:blipFill rotWithShape="1">
-          <a:blip r:embed="rId5"/>
-          <a:srcRect l="-1284" r="-701"/>
-          <a:stretch/>
-        </p:blipFill>
-        <p:spPr>
-          <a:xfrm>
-            <a:off x="14445205" y="16814851"/>
-            <a:ext cx="4560425" cy="4201109"/>
-          </a:xfrm>
-          <a:prstGeom prst="rect">
-            <a:avLst/>
-          </a:prstGeom>
-        </p:spPr>
-      </p:pic>
       <p:sp>
         <p:nvSpPr>
           <p:cNvPr id="67" name="Rechthoek: afgeronde hoeken 66">
@@ -3958,8 +3749,8 @@
         </p:nvSpPr>
         <p:spPr>
           <a:xfrm>
-            <a:off x="176473" y="22105973"/>
-            <a:ext cx="20961170" cy="2244959"/>
+            <a:off x="176473" y="22365856"/>
+            <a:ext cx="20961170" cy="2387381"/>
           </a:xfrm>
           <a:prstGeom prst="roundRect">
             <a:avLst/>
@@ -4020,7 +3811,7 @@
               </a:spcAft>
             </a:pPr>
             <a:r>
-              <a:rPr lang="en-US" sz="2000" kern="100" dirty="0">
+              <a:rPr lang="en-US" sz="1800" kern="100" dirty="0">
                 <a:solidFill>
                   <a:sysClr val="windowText" lastClr="000000"/>
                 </a:solidFill>
@@ -4028,372 +3819,31 @@
                 <a:ea typeface="Aptos" panose="020B0004020202020204" pitchFamily="34" charset="0"/>
                 <a:cs typeface="Times New Roman" panose="02020603050405020304" pitchFamily="18" charset="0"/>
               </a:rPr>
-              <a:t>Based on the results of the user study, while the </a:t>
-            </a:r>
-            <a:r>
-              <a:rPr lang="en-US" sz="2000" b="1" kern="100" dirty="0">
-                <a:solidFill>
-                  <a:srgbClr val="FF0000"/>
-                </a:solidFill>
-                <a:latin typeface="Aptos" panose="020B0004020202020204" pitchFamily="34" charset="0"/>
-                <a:ea typeface="Aptos" panose="020B0004020202020204" pitchFamily="34" charset="0"/>
-                <a:cs typeface="Times New Roman" panose="02020603050405020304" pitchFamily="18" charset="0"/>
-              </a:rPr>
-              <a:t>familiarity </a:t>
-            </a:r>
-            <a:r>
-              <a:rPr lang="en-US" sz="2000" kern="100" dirty="0">
+              <a:t>To evaluate the usability and clarity of the stress monitoring app and hardware, a structured user study was designed. Participants were asked to complete a series of tasks, including device pairing, profile setup, individual and combined parameter measurements, and data visualization interpretation.</a:t>
+            </a:r>
+          </a:p>
+          <a:p>
+            <a:pPr>
+              <a:lnSpc>
+                <a:spcPct val="115000"/>
+              </a:lnSpc>
+              <a:spcAft>
+                <a:spcPts val="800"/>
+              </a:spcAft>
+            </a:pPr>
+            <a:r>
+              <a:rPr lang="en-US" sz="1800" kern="100" dirty="0">
                 <a:solidFill>
                   <a:sysClr val="windowText" lastClr="000000"/>
                 </a:solidFill>
-                <a:latin typeface="Aptos" panose="020B0004020202020204" pitchFamily="34" charset="0"/>
-                <a:ea typeface="Aptos" panose="020B0004020202020204" pitchFamily="34" charset="0"/>
-                <a:cs typeface="Times New Roman" panose="02020603050405020304" pitchFamily="18" charset="0"/>
-              </a:rPr>
-              <a:t>with </a:t>
-            </a:r>
-            <a:r>
-              <a:rPr lang="en-US" sz="2000" b="1" kern="100" dirty="0">
-                <a:solidFill>
-                  <a:srgbClr val="FF0000"/>
-                </a:solidFill>
-                <a:latin typeface="Aptos" panose="020B0004020202020204" pitchFamily="34" charset="0"/>
-                <a:ea typeface="Aptos" panose="020B0004020202020204" pitchFamily="34" charset="0"/>
-                <a:cs typeface="Times New Roman" panose="02020603050405020304" pitchFamily="18" charset="0"/>
-              </a:rPr>
-              <a:t>AR</a:t>
-            </a:r>
-            <a:r>
-              <a:rPr lang="en-US" sz="2000" kern="100" dirty="0">
-                <a:solidFill>
-                  <a:sysClr val="windowText" lastClr="000000"/>
-                </a:solidFill>
-                <a:latin typeface="Aptos" panose="020B0004020202020204" pitchFamily="34" charset="0"/>
-                <a:ea typeface="Aptos" panose="020B0004020202020204" pitchFamily="34" charset="0"/>
-                <a:cs typeface="Times New Roman" panose="02020603050405020304" pitchFamily="18" charset="0"/>
-              </a:rPr>
-              <a:t> had an average score of </a:t>
-            </a:r>
-            <a:r>
-              <a:rPr lang="en-US" sz="2000" b="1" kern="100" dirty="0">
-                <a:solidFill>
-                  <a:srgbClr val="FF0000"/>
-                </a:solidFill>
-                <a:latin typeface="Aptos" panose="020B0004020202020204" pitchFamily="34" charset="0"/>
-                <a:ea typeface="Aptos" panose="020B0004020202020204" pitchFamily="34" charset="0"/>
-                <a:cs typeface="Times New Roman" panose="02020603050405020304" pitchFamily="18" charset="0"/>
-              </a:rPr>
-              <a:t>1,6 out of 5 </a:t>
-            </a:r>
-            <a:r>
-              <a:rPr lang="en-US" sz="2000" kern="100" dirty="0">
-                <a:solidFill>
-                  <a:sysClr val="windowText" lastClr="000000"/>
-                </a:solidFill>
-                <a:latin typeface="Aptos" panose="020B0004020202020204" pitchFamily="34" charset="0"/>
-                <a:ea typeface="Aptos" panose="020B0004020202020204" pitchFamily="34" charset="0"/>
-                <a:cs typeface="Times New Roman" panose="02020603050405020304" pitchFamily="18" charset="0"/>
-              </a:rPr>
-              <a:t>(on being the least familiar) the </a:t>
-            </a:r>
-            <a:r>
-              <a:rPr lang="en-US" sz="2000" b="1" kern="100" dirty="0">
-                <a:solidFill>
-                  <a:srgbClr val="FF0000"/>
-                </a:solidFill>
-                <a:latin typeface="Aptos" panose="020B0004020202020204" pitchFamily="34" charset="0"/>
-                <a:ea typeface="Aptos" panose="020B0004020202020204" pitchFamily="34" charset="0"/>
-                <a:cs typeface="Times New Roman" panose="02020603050405020304" pitchFamily="18" charset="0"/>
-              </a:rPr>
-              <a:t>AR shows promise </a:t>
-            </a:r>
-            <a:r>
-              <a:rPr lang="en-US" sz="2000" kern="100" dirty="0">
-                <a:solidFill>
-                  <a:sysClr val="windowText" lastClr="000000"/>
-                </a:solidFill>
-                <a:latin typeface="Aptos" panose="020B0004020202020204" pitchFamily="34" charset="0"/>
-                <a:ea typeface="Aptos" panose="020B0004020202020204" pitchFamily="34" charset="0"/>
-                <a:cs typeface="Times New Roman" panose="02020603050405020304" pitchFamily="18" charset="0"/>
-              </a:rPr>
-              <a:t>for change traceability. Features like the </a:t>
-            </a:r>
-            <a:r>
-              <a:rPr lang="en-US" sz="2000" b="1" kern="100" dirty="0">
-                <a:solidFill>
-                  <a:srgbClr val="FF0000"/>
-                </a:solidFill>
-                <a:latin typeface="Aptos" panose="020B0004020202020204" pitchFamily="34" charset="0"/>
-                <a:ea typeface="Aptos" panose="020B0004020202020204" pitchFamily="34" charset="0"/>
-                <a:cs typeface="Times New Roman" panose="02020603050405020304" pitchFamily="18" charset="0"/>
-              </a:rPr>
-              <a:t>decision card, color coding </a:t>
-            </a:r>
-            <a:r>
-              <a:rPr lang="en-US" sz="2000" kern="100" dirty="0">
-                <a:solidFill>
-                  <a:sysClr val="windowText" lastClr="000000"/>
-                </a:solidFill>
-                <a:latin typeface="Aptos" panose="020B0004020202020204" pitchFamily="34" charset="0"/>
-                <a:ea typeface="Aptos" panose="020B0004020202020204" pitchFamily="34" charset="0"/>
-                <a:cs typeface="Times New Roman" panose="02020603050405020304" pitchFamily="18" charset="0"/>
-              </a:rPr>
-              <a:t>and </a:t>
-            </a:r>
-            <a:r>
-              <a:rPr lang="en-US" sz="2000" b="1" kern="100" dirty="0">
-                <a:solidFill>
-                  <a:srgbClr val="FF0000"/>
-                </a:solidFill>
-                <a:latin typeface="Aptos" panose="020B0004020202020204" pitchFamily="34" charset="0"/>
-                <a:ea typeface="Aptos" panose="020B0004020202020204" pitchFamily="34" charset="0"/>
-                <a:cs typeface="Times New Roman" panose="02020603050405020304" pitchFamily="18" charset="0"/>
-              </a:rPr>
-              <a:t>visualization</a:t>
-            </a:r>
-            <a:r>
-              <a:rPr lang="en-US" sz="2000" kern="100" dirty="0">
-                <a:solidFill>
-                  <a:sysClr val="windowText" lastClr="000000"/>
-                </a:solidFill>
-                <a:latin typeface="Aptos" panose="020B0004020202020204" pitchFamily="34" charset="0"/>
-                <a:ea typeface="Aptos" panose="020B0004020202020204" pitchFamily="34" charset="0"/>
-                <a:cs typeface="Times New Roman" panose="02020603050405020304" pitchFamily="18" charset="0"/>
-              </a:rPr>
-              <a:t> in combination with the </a:t>
-            </a:r>
-            <a:r>
-              <a:rPr lang="en-US" sz="2000" b="1" kern="100" dirty="0">
-                <a:solidFill>
-                  <a:srgbClr val="FF0000"/>
-                </a:solidFill>
-                <a:latin typeface="Aptos" panose="020B0004020202020204" pitchFamily="34" charset="0"/>
-                <a:ea typeface="Aptos" panose="020B0004020202020204" pitchFamily="34" charset="0"/>
-                <a:cs typeface="Times New Roman" panose="02020603050405020304" pitchFamily="18" charset="0"/>
-              </a:rPr>
-              <a:t>spatial context</a:t>
-            </a:r>
-            <a:r>
-              <a:rPr lang="en-US" sz="2000" kern="100" dirty="0">
-                <a:solidFill>
-                  <a:sysClr val="windowText" lastClr="000000"/>
-                </a:solidFill>
-                <a:latin typeface="Aptos" panose="020B0004020202020204" pitchFamily="34" charset="0"/>
-                <a:ea typeface="Aptos" panose="020B0004020202020204" pitchFamily="34" charset="0"/>
-                <a:cs typeface="Times New Roman" panose="02020603050405020304" pitchFamily="18" charset="0"/>
-              </a:rPr>
-              <a:t>, makes It </a:t>
-            </a:r>
-            <a:r>
-              <a:rPr lang="en-US" sz="2000" kern="100" dirty="0">
-                <a:solidFill>
-                  <a:schemeClr val="tx1"/>
-                </a:solidFill>
-                <a:latin typeface="Aptos" panose="020B0004020202020204" pitchFamily="34" charset="0"/>
-                <a:ea typeface="Aptos" panose="020B0004020202020204" pitchFamily="34" charset="0"/>
-                <a:cs typeface="Times New Roman" panose="02020603050405020304" pitchFamily="18" charset="0"/>
-              </a:rPr>
-              <a:t>easier</a:t>
-            </a:r>
-            <a:r>
-              <a:rPr lang="en-US" sz="2000" kern="100" dirty="0">
-                <a:solidFill>
-                  <a:sysClr val="windowText" lastClr="000000"/>
-                </a:solidFill>
-                <a:latin typeface="Aptos" panose="020B0004020202020204" pitchFamily="34" charset="0"/>
-                <a:ea typeface="Aptos" panose="020B0004020202020204" pitchFamily="34" charset="0"/>
-                <a:cs typeface="Times New Roman" panose="02020603050405020304" pitchFamily="18" charset="0"/>
-              </a:rPr>
-              <a:t> to </a:t>
-            </a:r>
-            <a:r>
-              <a:rPr lang="en-US" sz="2000" kern="100" dirty="0">
-                <a:solidFill>
-                  <a:schemeClr val="tx1"/>
-                </a:solidFill>
-                <a:latin typeface="Aptos" panose="020B0004020202020204" pitchFamily="34" charset="0"/>
-                <a:ea typeface="Aptos" panose="020B0004020202020204" pitchFamily="34" charset="0"/>
-                <a:cs typeface="Times New Roman" panose="02020603050405020304" pitchFamily="18" charset="0"/>
-              </a:rPr>
-              <a:t>explain</a:t>
-            </a:r>
-            <a:r>
-              <a:rPr lang="en-US" sz="2000" b="1" kern="100" dirty="0">
-                <a:solidFill>
-                  <a:srgbClr val="FF0000"/>
-                </a:solidFill>
-                <a:latin typeface="Aptos" panose="020B0004020202020204" pitchFamily="34" charset="0"/>
-                <a:ea typeface="Aptos" panose="020B0004020202020204" pitchFamily="34" charset="0"/>
-                <a:cs typeface="Times New Roman" panose="02020603050405020304" pitchFamily="18" charset="0"/>
-              </a:rPr>
-              <a:t> </a:t>
-            </a:r>
-            <a:r>
-              <a:rPr lang="en-US" sz="2000" kern="100" dirty="0">
-                <a:solidFill>
-                  <a:sysClr val="windowText" lastClr="000000"/>
-                </a:solidFill>
-                <a:latin typeface="Aptos" panose="020B0004020202020204" pitchFamily="34" charset="0"/>
-                <a:ea typeface="Aptos" panose="020B0004020202020204" pitchFamily="34" charset="0"/>
-                <a:cs typeface="Times New Roman" panose="02020603050405020304" pitchFamily="18" charset="0"/>
-              </a:rPr>
-              <a:t>the changes to </a:t>
-            </a:r>
-            <a:r>
-              <a:rPr lang="en-US" sz="2000" kern="100" dirty="0">
-                <a:solidFill>
-                  <a:schemeClr val="tx1"/>
-                </a:solidFill>
-                <a:latin typeface="Aptos" panose="020B0004020202020204" pitchFamily="34" charset="0"/>
-                <a:ea typeface="Aptos" panose="020B0004020202020204" pitchFamily="34" charset="0"/>
-                <a:cs typeface="Times New Roman" panose="02020603050405020304" pitchFamily="18" charset="0"/>
-              </a:rPr>
-              <a:t>stakeholders</a:t>
-            </a:r>
-            <a:r>
-              <a:rPr lang="en-US" sz="2000" kern="100" dirty="0">
-                <a:solidFill>
-                  <a:sysClr val="windowText" lastClr="000000"/>
-                </a:solidFill>
-                <a:latin typeface="Aptos" panose="020B0004020202020204" pitchFamily="34" charset="0"/>
-                <a:ea typeface="Aptos" panose="020B0004020202020204" pitchFamily="34" charset="0"/>
-                <a:cs typeface="Times New Roman" panose="02020603050405020304" pitchFamily="18" charset="0"/>
-              </a:rPr>
-              <a:t> that not follow the project as closely. But participants did state that </a:t>
-            </a:r>
-            <a:r>
-              <a:rPr lang="en-US" sz="2000" b="1" kern="100" dirty="0">
-                <a:solidFill>
-                  <a:srgbClr val="FF0000"/>
-                </a:solidFill>
-                <a:latin typeface="Aptos" panose="020B0004020202020204" pitchFamily="34" charset="0"/>
-                <a:ea typeface="Aptos" panose="020B0004020202020204" pitchFamily="34" charset="0"/>
-                <a:cs typeface="Times New Roman" panose="02020603050405020304" pitchFamily="18" charset="0"/>
-              </a:rPr>
-              <a:t>BIM</a:t>
-            </a:r>
-            <a:r>
-              <a:rPr lang="en-US" sz="2000" kern="100" dirty="0">
-                <a:solidFill>
-                  <a:sysClr val="windowText" lastClr="000000"/>
-                </a:solidFill>
-                <a:latin typeface="Aptos" panose="020B0004020202020204" pitchFamily="34" charset="0"/>
-                <a:ea typeface="Aptos" panose="020B0004020202020204" pitchFamily="34" charset="0"/>
-                <a:cs typeface="Times New Roman" panose="02020603050405020304" pitchFamily="18" charset="0"/>
-              </a:rPr>
-              <a:t> offers </a:t>
-            </a:r>
-            <a:r>
-              <a:rPr lang="en-US" sz="2000" b="1" kern="100" dirty="0">
-                <a:solidFill>
-                  <a:srgbClr val="FF0000"/>
-                </a:solidFill>
-                <a:latin typeface="Aptos" panose="020B0004020202020204" pitchFamily="34" charset="0"/>
-                <a:ea typeface="Aptos" panose="020B0004020202020204" pitchFamily="34" charset="0"/>
-                <a:cs typeface="Times New Roman" panose="02020603050405020304" pitchFamily="18" charset="0"/>
-              </a:rPr>
-              <a:t>more advanced features </a:t>
-            </a:r>
-            <a:r>
-              <a:rPr lang="en-US" sz="2000" kern="100" dirty="0">
-                <a:solidFill>
-                  <a:sysClr val="windowText" lastClr="000000"/>
-                </a:solidFill>
-                <a:latin typeface="Aptos" panose="020B0004020202020204" pitchFamily="34" charset="0"/>
-                <a:ea typeface="Aptos" panose="020B0004020202020204" pitchFamily="34" charset="0"/>
-                <a:cs typeface="Times New Roman" panose="02020603050405020304" pitchFamily="18" charset="0"/>
-              </a:rPr>
-              <a:t>like filtering and clash detection. A notable thing is that participants forgot about the buttons on the smartphone screen. To lower the learning curve, displaying as much </a:t>
-            </a:r>
-            <a:r>
-              <a:rPr lang="en-US" sz="2000" b="1" kern="100" dirty="0">
-                <a:solidFill>
-                  <a:srgbClr val="FF0000"/>
-                </a:solidFill>
-                <a:latin typeface="Aptos" panose="020B0004020202020204" pitchFamily="34" charset="0"/>
-                <a:ea typeface="Aptos" panose="020B0004020202020204" pitchFamily="34" charset="0"/>
-                <a:cs typeface="Times New Roman" panose="02020603050405020304" pitchFamily="18" charset="0"/>
-              </a:rPr>
-              <a:t>buttons</a:t>
-            </a:r>
-            <a:r>
-              <a:rPr lang="en-US" sz="2000" kern="100" dirty="0">
-                <a:solidFill>
-                  <a:sysClr val="windowText" lastClr="000000"/>
-                </a:solidFill>
-                <a:latin typeface="Aptos" panose="020B0004020202020204" pitchFamily="34" charset="0"/>
-                <a:ea typeface="Aptos" panose="020B0004020202020204" pitchFamily="34" charset="0"/>
-                <a:cs typeface="Times New Roman" panose="02020603050405020304" pitchFamily="18" charset="0"/>
-              </a:rPr>
-              <a:t> as possible </a:t>
-            </a:r>
-            <a:r>
-              <a:rPr lang="en-US" sz="2000" b="1" kern="100" dirty="0">
-                <a:solidFill>
-                  <a:srgbClr val="FF0000"/>
-                </a:solidFill>
-                <a:latin typeface="Aptos" panose="020B0004020202020204" pitchFamily="34" charset="0"/>
-                <a:ea typeface="Aptos" panose="020B0004020202020204" pitchFamily="34" charset="0"/>
-                <a:cs typeface="Times New Roman" panose="02020603050405020304" pitchFamily="18" charset="0"/>
-              </a:rPr>
-              <a:t>in AR is recommended</a:t>
-            </a:r>
-            <a:r>
-              <a:rPr lang="en-US" sz="2000" kern="100" dirty="0">
-                <a:solidFill>
-                  <a:sysClr val="windowText" lastClr="000000"/>
-                </a:solidFill>
-                <a:latin typeface="Aptos" panose="020B0004020202020204" pitchFamily="34" charset="0"/>
-                <a:ea typeface="Aptos" panose="020B0004020202020204" pitchFamily="34" charset="0"/>
-                <a:cs typeface="Times New Roman" panose="02020603050405020304" pitchFamily="18" charset="0"/>
-              </a:rPr>
-              <a:t>. The results showed that the </a:t>
-            </a:r>
-            <a:r>
-              <a:rPr lang="en-US" sz="2000" b="1" kern="100" dirty="0">
-                <a:solidFill>
-                  <a:srgbClr val="FF0000"/>
-                </a:solidFill>
-                <a:latin typeface="Aptos" panose="020B0004020202020204" pitchFamily="34" charset="0"/>
-                <a:ea typeface="Aptos" panose="020B0004020202020204" pitchFamily="34" charset="0"/>
-                <a:cs typeface="Times New Roman" panose="02020603050405020304" pitchFamily="18" charset="0"/>
-              </a:rPr>
-              <a:t>confidence</a:t>
-            </a:r>
-            <a:r>
-              <a:rPr lang="en-US" sz="2000" kern="100" dirty="0">
-                <a:solidFill>
-                  <a:sysClr val="windowText" lastClr="000000"/>
-                </a:solidFill>
-                <a:latin typeface="Aptos" panose="020B0004020202020204" pitchFamily="34" charset="0"/>
-                <a:ea typeface="Aptos" panose="020B0004020202020204" pitchFamily="34" charset="0"/>
-                <a:cs typeface="Times New Roman" panose="02020603050405020304" pitchFamily="18" charset="0"/>
-              </a:rPr>
-              <a:t> of capturing all changes was very high with an average score of </a:t>
-            </a:r>
-            <a:r>
-              <a:rPr lang="en-US" sz="2000" b="1" kern="100" dirty="0">
-                <a:solidFill>
-                  <a:srgbClr val="FF0000"/>
-                </a:solidFill>
-                <a:latin typeface="Aptos" panose="020B0004020202020204" pitchFamily="34" charset="0"/>
-                <a:ea typeface="Aptos" panose="020B0004020202020204" pitchFamily="34" charset="0"/>
-                <a:cs typeface="Times New Roman" panose="02020603050405020304" pitchFamily="18" charset="0"/>
-              </a:rPr>
-              <a:t>4,2 out of 5</a:t>
-            </a:r>
-            <a:r>
-              <a:rPr lang="en-US" sz="2000" kern="100" dirty="0">
-                <a:solidFill>
-                  <a:sysClr val="windowText" lastClr="000000"/>
-                </a:solidFill>
-                <a:latin typeface="Aptos" panose="020B0004020202020204" pitchFamily="34" charset="0"/>
-                <a:ea typeface="Aptos" panose="020B0004020202020204" pitchFamily="34" charset="0"/>
-                <a:cs typeface="Times New Roman" panose="02020603050405020304" pitchFamily="18" charset="0"/>
-              </a:rPr>
-              <a:t>.</a:t>
-            </a:r>
-            <a:endParaRPr lang="en-GB" sz="2000" kern="100" dirty="0">
+                <a:effectLst/>
+                <a:latin typeface="Aptos" panose="020B0004020202020204" pitchFamily="34" charset="0"/>
+                <a:ea typeface="Aptos" panose="020B0004020202020204" pitchFamily="34" charset="0"/>
+                <a:cs typeface="Times New Roman" panose="02020603050405020304" pitchFamily="18" charset="0"/>
+              </a:rPr>
+              <a:t>Most users found the Bluetooth pairing process straightforward and rated the interface as intuitive and easy to navigate. Users appreciated the visual clarity of health data, with color-coded gauges and stress indicators aiding interpretation. The info dialogs and explanations for parameters were found to be helpful by most participants, especially for understanding stress-related values such as GSR and HRV. The history feature, including graph/table views and date filtering, was highlighted as useful for monitoring trends over time. Some users indicated that switching between views helped them better understand fluctuations in their stress levels.</a:t>
+            </a:r>
+            <a:endParaRPr lang="en-GB" sz="1800" kern="100" dirty="0">
               <a:solidFill>
                 <a:sysClr val="windowText" lastClr="000000"/>
               </a:solidFill>
@@ -4419,7 +3869,7 @@
         </p:nvSpPr>
         <p:spPr>
           <a:xfrm>
-            <a:off x="8379144" y="21733839"/>
+            <a:off x="8379144" y="21984098"/>
             <a:ext cx="4270278" cy="750843"/>
           </a:xfrm>
           <a:prstGeom prst="roundRect">
@@ -4478,8 +3928,8 @@
         </p:nvSpPr>
         <p:spPr>
           <a:xfrm>
-            <a:off x="188197" y="24946468"/>
-            <a:ext cx="20961170" cy="2244959"/>
+            <a:off x="188197" y="25372230"/>
+            <a:ext cx="20961170" cy="1819197"/>
           </a:xfrm>
           <a:prstGeom prst="roundRect">
             <a:avLst/>
@@ -4542,231 +3992,7 @@
                   <a:schemeClr val="tx1"/>
                 </a:solidFill>
               </a:rPr>
-              <a:t>In conclusion, with some further adjustments as </a:t>
-            </a:r>
-            <a:r>
-              <a:rPr lang="en-US" sz="2000" b="1" dirty="0">
-                <a:solidFill>
-                  <a:srgbClr val="FF0000"/>
-                </a:solidFill>
-              </a:rPr>
-              <a:t>adding</a:t>
-            </a:r>
-            <a:r>
-              <a:rPr lang="en-US" sz="2000" dirty="0">
-                <a:solidFill>
-                  <a:schemeClr val="tx1"/>
-                </a:solidFill>
-              </a:rPr>
-              <a:t> features like </a:t>
-            </a:r>
-            <a:r>
-              <a:rPr lang="en-US" sz="2000" b="1" dirty="0">
-                <a:solidFill>
-                  <a:srgbClr val="FF0000"/>
-                </a:solidFill>
-              </a:rPr>
-              <a:t>filtering</a:t>
-            </a:r>
-            <a:r>
-              <a:rPr lang="en-US" sz="2000" dirty="0">
-                <a:solidFill>
-                  <a:schemeClr val="tx1"/>
-                </a:solidFill>
-              </a:rPr>
-              <a:t> on kind of change, object or for specific jobs (ex. plumbers) </a:t>
-            </a:r>
-            <a:r>
-              <a:rPr lang="en-US" sz="2000" b="1" dirty="0">
-                <a:solidFill>
-                  <a:srgbClr val="FF0000"/>
-                </a:solidFill>
-              </a:rPr>
-              <a:t>AR</a:t>
-            </a:r>
-            <a:r>
-              <a:rPr lang="en-US" sz="2000" dirty="0">
-                <a:solidFill>
-                  <a:schemeClr val="tx1"/>
-                </a:solidFill>
-              </a:rPr>
-              <a:t> could be a </a:t>
-            </a:r>
-            <a:r>
-              <a:rPr lang="en-US" sz="2000" b="1" dirty="0">
-                <a:solidFill>
-                  <a:srgbClr val="FF0000"/>
-                </a:solidFill>
-              </a:rPr>
-              <a:t>beneficial</a:t>
-            </a:r>
-            <a:r>
-              <a:rPr lang="en-US" sz="2000" dirty="0">
-                <a:solidFill>
-                  <a:schemeClr val="tx1"/>
-                </a:solidFill>
-              </a:rPr>
-              <a:t> technologies in construction to trace all changes in a lifecycle of a project. Features like </a:t>
-            </a:r>
-            <a:r>
-              <a:rPr lang="en-US" sz="2000" b="1" dirty="0">
-                <a:solidFill>
-                  <a:srgbClr val="FF0000"/>
-                </a:solidFill>
-              </a:rPr>
-              <a:t>explanation </a:t>
-            </a:r>
-            <a:r>
-              <a:rPr lang="en-US" sz="2000" dirty="0">
-                <a:solidFill>
-                  <a:schemeClr val="tx1"/>
-                </a:solidFill>
-              </a:rPr>
-              <a:t>in</a:t>
-            </a:r>
-            <a:r>
-              <a:rPr lang="en-US" sz="2000" b="1" dirty="0">
-                <a:solidFill>
-                  <a:srgbClr val="FF0000"/>
-                </a:solidFill>
-              </a:rPr>
-              <a:t> plain text </a:t>
-            </a:r>
-            <a:r>
-              <a:rPr lang="en-US" sz="2000" dirty="0">
-                <a:solidFill>
-                  <a:schemeClr val="tx1"/>
-                </a:solidFill>
-              </a:rPr>
-              <a:t>used in the decision card and the </a:t>
-            </a:r>
-            <a:r>
-              <a:rPr lang="en-US" sz="2000" b="1" dirty="0">
-                <a:solidFill>
-                  <a:srgbClr val="FF0000"/>
-                </a:solidFill>
-              </a:rPr>
-              <a:t>spatial awareness </a:t>
-            </a:r>
-            <a:r>
-              <a:rPr lang="en-US" sz="2000" dirty="0">
-                <a:solidFill>
-                  <a:schemeClr val="tx1"/>
-                </a:solidFill>
-              </a:rPr>
-              <a:t>makes it </a:t>
-            </a:r>
-            <a:r>
-              <a:rPr lang="en-US" sz="2000" b="1" dirty="0">
-                <a:solidFill>
-                  <a:srgbClr val="FF0000"/>
-                </a:solidFill>
-              </a:rPr>
-              <a:t>easier to explain </a:t>
-            </a:r>
-            <a:r>
-              <a:rPr lang="en-US" sz="2000" dirty="0">
-                <a:solidFill>
-                  <a:schemeClr val="tx1"/>
-                </a:solidFill>
-              </a:rPr>
-              <a:t>and show changes to stakeholders not as closely involved. The </a:t>
-            </a:r>
-            <a:r>
-              <a:rPr lang="en-US" sz="2000" b="1" dirty="0">
-                <a:solidFill>
-                  <a:srgbClr val="FF0000"/>
-                </a:solidFill>
-              </a:rPr>
-              <a:t>high confidence level </a:t>
-            </a:r>
-            <a:r>
-              <a:rPr lang="en-US" sz="2000" dirty="0">
-                <a:solidFill>
-                  <a:schemeClr val="tx1"/>
-                </a:solidFill>
-              </a:rPr>
-              <a:t>reached with the AR application suggests that with further refinement </a:t>
-            </a:r>
-            <a:r>
-              <a:rPr lang="en-US" sz="2000" b="1" dirty="0">
-                <a:solidFill>
-                  <a:srgbClr val="FF0000"/>
-                </a:solidFill>
-              </a:rPr>
-              <a:t>AR</a:t>
-            </a:r>
-            <a:r>
-              <a:rPr lang="en-US" sz="2000" dirty="0">
-                <a:solidFill>
-                  <a:schemeClr val="tx1"/>
-                </a:solidFill>
-              </a:rPr>
-              <a:t> could be a </a:t>
-            </a:r>
-            <a:r>
-              <a:rPr lang="en-US" sz="2000" b="1" dirty="0">
-                <a:solidFill>
-                  <a:srgbClr val="FF0000"/>
-                </a:solidFill>
-              </a:rPr>
-              <a:t>useful asset </a:t>
-            </a:r>
-            <a:r>
-              <a:rPr lang="en-US" sz="2000" dirty="0">
-                <a:solidFill>
-                  <a:schemeClr val="tx1"/>
-                </a:solidFill>
-              </a:rPr>
-              <a:t>in the construction industry. For </a:t>
-            </a:r>
-            <a:r>
-              <a:rPr lang="en-US" sz="2000" b="1" dirty="0">
-                <a:solidFill>
-                  <a:srgbClr val="FF0000"/>
-                </a:solidFill>
-              </a:rPr>
-              <a:t>future research</a:t>
-            </a:r>
-            <a:r>
-              <a:rPr lang="en-US" sz="2000" dirty="0">
-                <a:solidFill>
-                  <a:schemeClr val="tx1"/>
-                </a:solidFill>
-              </a:rPr>
-              <a:t>, integrating </a:t>
-            </a:r>
-            <a:r>
-              <a:rPr lang="en-US" sz="2000" b="1" dirty="0">
-                <a:solidFill>
-                  <a:srgbClr val="FF0000"/>
-                </a:solidFill>
-              </a:rPr>
-              <a:t>more advanced features </a:t>
-            </a:r>
-            <a:r>
-              <a:rPr lang="en-US" sz="2000" dirty="0">
-                <a:solidFill>
-                  <a:schemeClr val="tx1"/>
-                </a:solidFill>
-              </a:rPr>
-              <a:t>like filtering and clash detection while maintaining or improving a </a:t>
-            </a:r>
-            <a:r>
-              <a:rPr lang="en-US" sz="2000" b="1" dirty="0">
-                <a:solidFill>
-                  <a:srgbClr val="FF0000"/>
-                </a:solidFill>
-              </a:rPr>
-              <a:t>user friendly interface </a:t>
-            </a:r>
-            <a:r>
-              <a:rPr lang="en-US" sz="2000" dirty="0">
-                <a:solidFill>
-                  <a:schemeClr val="tx1"/>
-                </a:solidFill>
-              </a:rPr>
-              <a:t>minimizing the learning curve is recommended.  Another recommendation is researching how orienting in a bigger building can be made easier, for example by using a mini-map.</a:t>
+              <a:t>This project demonstrates the feasibility of a low-cost, user-friendly stress monitoring system that combines physiological sensors with real-time data visualization in a mobile application. By integrating heart rate, GSR, oxygen saturation, and respiration rate measurements, the system offers a comprehensive view of workplace stress. Preliminary user feedback suggests that the app is intuitive, the data is presented clearly, and the system has the potential to raise awareness about personal well-being. While more testing is needed to fully evaluate usability and effectiveness, this solution lays a strong foundation for future developments in accessible health monitoring technologies.</a:t>
             </a:r>
             <a:endParaRPr lang="en-GB" sz="2000" dirty="0">
               <a:solidFill>
@@ -4790,7 +4016,7 @@
         </p:nvSpPr>
         <p:spPr>
           <a:xfrm>
-            <a:off x="8390868" y="24498135"/>
+            <a:off x="8390868" y="24873522"/>
             <a:ext cx="4270278" cy="813135"/>
           </a:xfrm>
           <a:prstGeom prst="roundRect">
@@ -4832,185 +4058,6 @@
                 <a:schemeClr val="bg2"/>
               </a:solidFill>
             </a:endParaRPr>
-          </a:p>
-        </p:txBody>
-      </p:sp>
-      <p:sp>
-        <p:nvSpPr>
-          <p:cNvPr id="18" name="Tekstvak 17">
-            <a:extLst>
-              <a:ext uri="{FF2B5EF4-FFF2-40B4-BE49-F238E27FC236}">
-                <a16:creationId xmlns:a16="http://schemas.microsoft.com/office/drawing/2014/main" id="{3B5519CD-D556-6E68-E62F-C5C4B168B205}"/>
-              </a:ext>
-            </a:extLst>
-          </p:cNvPr>
-          <p:cNvSpPr txBox="1"/>
-          <p:nvPr/>
-        </p:nvSpPr>
-        <p:spPr>
-          <a:xfrm>
-            <a:off x="1557371" y="16204569"/>
-            <a:ext cx="5583516" cy="307777"/>
-          </a:xfrm>
-          <a:prstGeom prst="rect">
-            <a:avLst/>
-          </a:prstGeom>
-        </p:spPr>
-        <p:txBody>
-          <a:bodyPr vert="horz" wrap="none" rtlCol="0">
-            <a:spAutoFit/>
-          </a:bodyPr>
-          <a:lstStyle/>
-          <a:p>
-            <a:r>
-              <a:rPr lang="nl-BE" sz="1400" b="1" dirty="0" err="1">
-                <a:solidFill>
-                  <a:schemeClr val="tx1"/>
-                </a:solidFill>
-              </a:rPr>
-              <a:t>Figure</a:t>
-            </a:r>
-            <a:r>
-              <a:rPr lang="nl-BE" sz="1400" b="1" dirty="0">
-                <a:solidFill>
-                  <a:schemeClr val="tx1"/>
-                </a:solidFill>
-              </a:rPr>
-              <a:t> 1: </a:t>
-            </a:r>
-            <a:r>
-              <a:rPr lang="en-US" sz="1400" b="1" dirty="0">
-                <a:solidFill>
-                  <a:schemeClr val="tx1"/>
-                </a:solidFill>
-              </a:rPr>
-              <a:t>Example of how color coding is used to indicate a removed pipe</a:t>
-            </a:r>
-            <a:r>
-              <a:rPr lang="nl-BE" sz="1400" b="1" dirty="0">
-                <a:solidFill>
-                  <a:schemeClr val="tx1"/>
-                </a:solidFill>
-              </a:rPr>
-              <a:t> </a:t>
-            </a:r>
-          </a:p>
-        </p:txBody>
-      </p:sp>
-      <p:sp>
-        <p:nvSpPr>
-          <p:cNvPr id="20" name="Tekstvak 19">
-            <a:extLst>
-              <a:ext uri="{FF2B5EF4-FFF2-40B4-BE49-F238E27FC236}">
-                <a16:creationId xmlns:a16="http://schemas.microsoft.com/office/drawing/2014/main" id="{813CF20E-7305-1020-D00D-CBA01F68B5FC}"/>
-              </a:ext>
-            </a:extLst>
-          </p:cNvPr>
-          <p:cNvSpPr txBox="1"/>
-          <p:nvPr/>
-        </p:nvSpPr>
-        <p:spPr>
-          <a:xfrm>
-            <a:off x="13872699" y="16342299"/>
-            <a:ext cx="1951688" cy="307777"/>
-          </a:xfrm>
-          <a:prstGeom prst="rect">
-            <a:avLst/>
-          </a:prstGeom>
-        </p:spPr>
-        <p:txBody>
-          <a:bodyPr vert="horz" wrap="none" rtlCol="0">
-            <a:spAutoFit/>
-          </a:bodyPr>
-          <a:lstStyle/>
-          <a:p>
-            <a:r>
-              <a:rPr lang="nl-BE" sz="1400" b="1" dirty="0" err="1">
-                <a:solidFill>
-                  <a:schemeClr val="tx1"/>
-                </a:solidFill>
-              </a:rPr>
-              <a:t>Figure</a:t>
-            </a:r>
-            <a:r>
-              <a:rPr lang="nl-BE" sz="1400" b="1" dirty="0">
-                <a:solidFill>
-                  <a:schemeClr val="tx1"/>
-                </a:solidFill>
-              </a:rPr>
-              <a:t> 2: </a:t>
-            </a:r>
-            <a:r>
-              <a:rPr lang="en-US" sz="1400" b="1" dirty="0"/>
-              <a:t>List of changes</a:t>
-            </a:r>
-            <a:endParaRPr lang="nl-BE" sz="1400" b="1" dirty="0">
-              <a:solidFill>
-                <a:schemeClr val="tx1"/>
-              </a:solidFill>
-            </a:endParaRPr>
-          </a:p>
-        </p:txBody>
-      </p:sp>
-      <p:sp>
-        <p:nvSpPr>
-          <p:cNvPr id="22" name="Tekstvak 21">
-            <a:extLst>
-              <a:ext uri="{FF2B5EF4-FFF2-40B4-BE49-F238E27FC236}">
-                <a16:creationId xmlns:a16="http://schemas.microsoft.com/office/drawing/2014/main" id="{F9842C82-F79C-94AC-2D02-637DDCB7E043}"/>
-              </a:ext>
-            </a:extLst>
-          </p:cNvPr>
-          <p:cNvSpPr txBox="1"/>
-          <p:nvPr/>
-        </p:nvSpPr>
-        <p:spPr>
-          <a:xfrm>
-            <a:off x="14399485" y="20943243"/>
-            <a:ext cx="1947584" cy="307777"/>
-          </a:xfrm>
-          <a:prstGeom prst="rect">
-            <a:avLst/>
-          </a:prstGeom>
-        </p:spPr>
-        <p:txBody>
-          <a:bodyPr vert="horz" wrap="none" rtlCol="0">
-            <a:spAutoFit/>
-          </a:bodyPr>
-          <a:lstStyle/>
-          <a:p>
-            <a:r>
-              <a:rPr lang="nl-BE" sz="1400" b="1" dirty="0" err="1">
-                <a:solidFill>
-                  <a:schemeClr val="tx1"/>
-                </a:solidFill>
-              </a:rPr>
-              <a:t>Figure</a:t>
-            </a:r>
-            <a:r>
-              <a:rPr lang="nl-BE" sz="1400" b="1" dirty="0">
-                <a:solidFill>
-                  <a:schemeClr val="tx1"/>
-                </a:solidFill>
-              </a:rPr>
-              <a:t> 3: </a:t>
-            </a:r>
-            <a:r>
-              <a:rPr lang="en-US" sz="1400" b="1" dirty="0">
-                <a:solidFill>
-                  <a:schemeClr val="tx1"/>
-                </a:solidFill>
-              </a:rPr>
-              <a:t>Decision card</a:t>
-            </a:r>
-            <a:r>
-              <a:rPr lang="nl-BE" sz="1400" b="1" dirty="0">
-                <a:solidFill>
-                  <a:schemeClr val="tx1"/>
-                </a:solidFill>
-              </a:rPr>
-              <a:t> </a:t>
-            </a:r>
           </a:p>
         </p:txBody>
       </p:sp>

</xml_diff>

<commit_message>
updated article and poster
</commit_message>
<xml_diff>
--- a/Verslagen/poster_BP_INF_Gielkens.pptx
+++ b/Verslagen/poster_BP_INF_Gielkens.pptx
@@ -230,7 +230,7 @@
           <a:p>
             <a:fld id="{A5A46936-730D-204E-AB52-3BEB64B90A85}" type="datetimeFigureOut">
               <a:rPr lang="nl-NL" smtClean="0"/>
-              <a:t>11-5-2025</a:t>
+              <a:t>12-5-2025</a:t>
             </a:fld>
             <a:endParaRPr lang="nl-NL"/>
           </a:p>
@@ -395,7 +395,7 @@
           <a:p>
             <a:fld id="{97349249-6D1C-0748-B1D9-2AF3A057365D}" type="datetimeFigureOut">
               <a:rPr lang="nl-NL" smtClean="0"/>
-              <a:t>11-5-2025</a:t>
+              <a:t>12-5-2025</a:t>
             </a:fld>
             <a:endParaRPr lang="nl-NL"/>
           </a:p>
@@ -1585,7 +1585,7 @@
           <a:p>
             <a:fld id="{A72B7129-FE34-674B-A2EC-97FC337DE4A7}" type="datetimeFigureOut">
               <a:rPr lang="nl-NL" smtClean="0"/>
-              <a:t>11-5-2025</a:t>
+              <a:t>12-5-2025</a:t>
             </a:fld>
             <a:endParaRPr lang="nl-NL"/>
           </a:p>
@@ -3192,8 +3192,8 @@
         </p:nvSpPr>
         <p:spPr>
           <a:xfrm>
-            <a:off x="809512" y="14057358"/>
-            <a:ext cx="19769364" cy="7624152"/>
+            <a:off x="761418" y="14050943"/>
+            <a:ext cx="19865552" cy="7624152"/>
           </a:xfrm>
           <a:prstGeom prst="roundRect">
             <a:avLst>
@@ -3237,433 +3237,6 @@
                 <a:spcPts val="800"/>
               </a:spcAft>
             </a:pPr>
-            <a:r>
-              <a:rPr lang="nl-BE" sz="2400" b="1" kern="100" dirty="0">
-                <a:solidFill>
-                  <a:schemeClr val="tx1"/>
-                </a:solidFill>
-                <a:effectLst/>
-                <a:latin typeface="Aptos" panose="020B0004020202020204" pitchFamily="34" charset="0"/>
-                <a:ea typeface="Aptos" panose="020B0004020202020204" pitchFamily="34" charset="0"/>
-                <a:cs typeface="Times New Roman" panose="02020603050405020304" pitchFamily="18" charset="0"/>
-              </a:rPr>
-              <a:t>Mobile </a:t>
-            </a:r>
-            <a:r>
-              <a:rPr lang="nl-BE" sz="2400" b="1" kern="100" dirty="0" err="1">
-                <a:solidFill>
-                  <a:schemeClr val="tx1"/>
-                </a:solidFill>
-                <a:effectLst/>
-                <a:latin typeface="Aptos" panose="020B0004020202020204" pitchFamily="34" charset="0"/>
-                <a:ea typeface="Aptos" panose="020B0004020202020204" pitchFamily="34" charset="0"/>
-                <a:cs typeface="Times New Roman" panose="02020603050405020304" pitchFamily="18" charset="0"/>
-              </a:rPr>
-              <a:t>application</a:t>
-            </a:r>
-            <a:endParaRPr lang="nl-BE" sz="2000" kern="100" dirty="0">
-              <a:solidFill>
-                <a:schemeClr val="tx1"/>
-              </a:solidFill>
-              <a:effectLst/>
-              <a:latin typeface="Aptos" panose="020B0004020202020204" pitchFamily="34" charset="0"/>
-              <a:ea typeface="Aptos" panose="020B0004020202020204" pitchFamily="34" charset="0"/>
-              <a:cs typeface="Times New Roman" panose="02020603050405020304" pitchFamily="18" charset="0"/>
-            </a:endParaRPr>
-          </a:p>
-          <a:p>
-            <a:pPr>
-              <a:lnSpc>
-                <a:spcPct val="115000"/>
-              </a:lnSpc>
-              <a:spcAft>
-                <a:spcPts val="800"/>
-              </a:spcAft>
-            </a:pPr>
-            <a:r>
-              <a:rPr lang="en-US" sz="2000" kern="100" dirty="0">
-                <a:solidFill>
-                  <a:schemeClr val="tx1"/>
-                </a:solidFill>
-                <a:effectLst/>
-                <a:latin typeface="Aptos" panose="020B0004020202020204" pitchFamily="34" charset="0"/>
-                <a:ea typeface="Aptos" panose="020B0004020202020204" pitchFamily="34" charset="0"/>
-                <a:cs typeface="Times New Roman" panose="02020603050405020304" pitchFamily="18" charset="0"/>
-              </a:rPr>
-              <a:t>To complement the stress measurement device, a mobile application was developed that focuses on </a:t>
-            </a:r>
-            <a:r>
-              <a:rPr lang="en-US" sz="2000" b="1" kern="100" dirty="0">
-                <a:solidFill>
-                  <a:srgbClr val="0070C0"/>
-                </a:solidFill>
-                <a:effectLst/>
-                <a:latin typeface="Aptos" panose="020B0004020202020204" pitchFamily="34" charset="0"/>
-                <a:ea typeface="Aptos" panose="020B0004020202020204" pitchFamily="34" charset="0"/>
-                <a:cs typeface="Times New Roman" panose="02020603050405020304" pitchFamily="18" charset="0"/>
-              </a:rPr>
-              <a:t>usability, personalization, and clear data presentation</a:t>
-            </a:r>
-            <a:r>
-              <a:rPr lang="en-US" sz="2000" kern="100" dirty="0">
-                <a:solidFill>
-                  <a:schemeClr val="tx1"/>
-                </a:solidFill>
-                <a:effectLst/>
-                <a:latin typeface="Aptos" panose="020B0004020202020204" pitchFamily="34" charset="0"/>
-                <a:ea typeface="Aptos" panose="020B0004020202020204" pitchFamily="34" charset="0"/>
-                <a:cs typeface="Times New Roman" panose="02020603050405020304" pitchFamily="18" charset="0"/>
-              </a:rPr>
-              <a:t>. The app enables real-time monitoring and historical tracking of key physiological signals, making stress and health data accessible and understandable, even for non-technical users. Below is a summary of the main features and the reasons behind each design choice:</a:t>
-            </a:r>
-          </a:p>
-          <a:p>
-            <a:pPr marL="342900" indent="-342900">
-              <a:lnSpc>
-                <a:spcPct val="115000"/>
-              </a:lnSpc>
-              <a:spcAft>
-                <a:spcPts val="800"/>
-              </a:spcAft>
-              <a:buFont typeface="Arial" panose="020B0604020202020204" pitchFamily="34" charset="0"/>
-              <a:buChar char="•"/>
-            </a:pPr>
-            <a:r>
-              <a:rPr lang="nl-BE" sz="2000" b="1" kern="100" dirty="0">
-                <a:solidFill>
-                  <a:srgbClr val="0070C0"/>
-                </a:solidFill>
-                <a:effectLst/>
-                <a:latin typeface="Aptos" panose="020B0004020202020204" pitchFamily="34" charset="0"/>
-                <a:ea typeface="Aptos" panose="020B0004020202020204" pitchFamily="34" charset="0"/>
-                <a:cs typeface="Times New Roman" panose="02020603050405020304" pitchFamily="18" charset="0"/>
-              </a:rPr>
-              <a:t>Shared Device, Multiple Users</a:t>
-            </a:r>
-            <a:r>
-              <a:rPr lang="nl-BE" sz="2000" kern="100" dirty="0">
-                <a:solidFill>
-                  <a:srgbClr val="0070C0"/>
-                </a:solidFill>
-                <a:effectLst/>
-                <a:latin typeface="Aptos" panose="020B0004020202020204" pitchFamily="34" charset="0"/>
-                <a:ea typeface="Aptos" panose="020B0004020202020204" pitchFamily="34" charset="0"/>
-                <a:cs typeface="Times New Roman" panose="02020603050405020304" pitchFamily="18" charset="0"/>
-              </a:rPr>
-              <a:t>: </a:t>
-            </a:r>
-            <a:r>
-              <a:rPr lang="en-US" sz="2000" kern="100" dirty="0">
-                <a:solidFill>
-                  <a:schemeClr val="tx1"/>
-                </a:solidFill>
-                <a:effectLst/>
-                <a:latin typeface="Aptos" panose="020B0004020202020204" pitchFamily="34" charset="0"/>
-                <a:ea typeface="Aptos" panose="020B0004020202020204" pitchFamily="34" charset="0"/>
-                <a:cs typeface="Times New Roman" panose="02020603050405020304" pitchFamily="18" charset="0"/>
-              </a:rPr>
-              <a:t>A multi-user login system allows organizations to use a single device for several users, minimizing hardware costs and improving accessibility in budget-constrained settings.</a:t>
-            </a:r>
-          </a:p>
-          <a:p>
-            <a:pPr marL="342900" indent="-342900">
-              <a:lnSpc>
-                <a:spcPct val="115000"/>
-              </a:lnSpc>
-              <a:spcAft>
-                <a:spcPts val="800"/>
-              </a:spcAft>
-              <a:buFont typeface="Arial" panose="020B0604020202020204" pitchFamily="34" charset="0"/>
-              <a:buChar char="•"/>
-            </a:pPr>
-            <a:r>
-              <a:rPr lang="nl-BE" sz="2000" b="1" kern="100" dirty="0" err="1">
-                <a:solidFill>
-                  <a:srgbClr val="0070C0"/>
-                </a:solidFill>
-                <a:effectLst/>
-                <a:latin typeface="Aptos" panose="020B0004020202020204" pitchFamily="34" charset="0"/>
-                <a:ea typeface="Aptos" panose="020B0004020202020204" pitchFamily="34" charset="0"/>
-                <a:cs typeface="Times New Roman" panose="02020603050405020304" pitchFamily="18" charset="0"/>
-              </a:rPr>
-              <a:t>Personalized</a:t>
-            </a:r>
-            <a:r>
-              <a:rPr lang="nl-BE" sz="2000" b="1" kern="100" dirty="0">
-                <a:solidFill>
-                  <a:srgbClr val="0070C0"/>
-                </a:solidFill>
-                <a:effectLst/>
-                <a:latin typeface="Aptos" panose="020B0004020202020204" pitchFamily="34" charset="0"/>
-                <a:ea typeface="Aptos" panose="020B0004020202020204" pitchFamily="34" charset="0"/>
-                <a:cs typeface="Times New Roman" panose="02020603050405020304" pitchFamily="18" charset="0"/>
-              </a:rPr>
-              <a:t> Setup:</a:t>
-            </a:r>
-            <a:r>
-              <a:rPr lang="nl-BE" sz="2000" kern="100" dirty="0">
-                <a:solidFill>
-                  <a:srgbClr val="0070C0"/>
-                </a:solidFill>
-                <a:effectLst/>
-                <a:latin typeface="Aptos" panose="020B0004020202020204" pitchFamily="34" charset="0"/>
-                <a:ea typeface="Aptos" panose="020B0004020202020204" pitchFamily="34" charset="0"/>
-                <a:cs typeface="Times New Roman" panose="02020603050405020304" pitchFamily="18" charset="0"/>
-              </a:rPr>
-              <a:t> </a:t>
-            </a:r>
-            <a:r>
-              <a:rPr lang="en-US" sz="2000" kern="100" dirty="0">
-                <a:solidFill>
-                  <a:schemeClr val="tx1"/>
-                </a:solidFill>
-                <a:effectLst/>
-                <a:latin typeface="Aptos" panose="020B0004020202020204" pitchFamily="34" charset="0"/>
-                <a:ea typeface="Aptos" panose="020B0004020202020204" pitchFamily="34" charset="0"/>
-                <a:cs typeface="Times New Roman" panose="02020603050405020304" pitchFamily="18" charset="0"/>
-              </a:rPr>
-              <a:t>New users enter their age to calculate personalized heart rate zones and complete a baseline measurement for heart rate, respiration, and GSR. This helps tailor the app’s feedback to individual physiology.</a:t>
-            </a:r>
-          </a:p>
-          <a:p>
-            <a:pPr marL="342900" indent="-342900">
-              <a:lnSpc>
-                <a:spcPct val="115000"/>
-              </a:lnSpc>
-              <a:spcAft>
-                <a:spcPts val="800"/>
-              </a:spcAft>
-              <a:buFont typeface="Arial" panose="020B0604020202020204" pitchFamily="34" charset="0"/>
-              <a:buChar char="•"/>
-            </a:pPr>
-            <a:r>
-              <a:rPr lang="nl-BE" sz="2000" b="1" kern="100" dirty="0" err="1">
-                <a:solidFill>
-                  <a:srgbClr val="0070C0"/>
-                </a:solidFill>
-                <a:effectLst/>
-                <a:latin typeface="Aptos" panose="020B0004020202020204" pitchFamily="34" charset="0"/>
-                <a:ea typeface="Aptos" panose="020B0004020202020204" pitchFamily="34" charset="0"/>
-                <a:cs typeface="Times New Roman" panose="02020603050405020304" pitchFamily="18" charset="0"/>
-              </a:rPr>
-              <a:t>Intuitive</a:t>
-            </a:r>
-            <a:r>
-              <a:rPr lang="nl-BE" sz="2000" b="1" kern="100" dirty="0">
-                <a:solidFill>
-                  <a:srgbClr val="0070C0"/>
-                </a:solidFill>
-                <a:effectLst/>
-                <a:latin typeface="Aptos" panose="020B0004020202020204" pitchFamily="34" charset="0"/>
-                <a:ea typeface="Aptos" panose="020B0004020202020204" pitchFamily="34" charset="0"/>
-                <a:cs typeface="Times New Roman" panose="02020603050405020304" pitchFamily="18" charset="0"/>
-              </a:rPr>
-              <a:t> </a:t>
-            </a:r>
-            <a:r>
-              <a:rPr lang="nl-BE" sz="2000" b="1" kern="100" dirty="0" err="1">
-                <a:solidFill>
-                  <a:srgbClr val="0070C0"/>
-                </a:solidFill>
-                <a:effectLst/>
-                <a:latin typeface="Aptos" panose="020B0004020202020204" pitchFamily="34" charset="0"/>
-                <a:ea typeface="Aptos" panose="020B0004020202020204" pitchFamily="34" charset="0"/>
-                <a:cs typeface="Times New Roman" panose="02020603050405020304" pitchFamily="18" charset="0"/>
-              </a:rPr>
-              <a:t>Visualizations</a:t>
-            </a:r>
-            <a:r>
-              <a:rPr lang="nl-BE" sz="2000" b="1" kern="100" dirty="0">
-                <a:solidFill>
-                  <a:srgbClr val="0070C0"/>
-                </a:solidFill>
-                <a:effectLst/>
-                <a:latin typeface="Aptos" panose="020B0004020202020204" pitchFamily="34" charset="0"/>
-                <a:ea typeface="Aptos" panose="020B0004020202020204" pitchFamily="34" charset="0"/>
-                <a:cs typeface="Times New Roman" panose="02020603050405020304" pitchFamily="18" charset="0"/>
-              </a:rPr>
-              <a:t>: </a:t>
-            </a:r>
-            <a:r>
-              <a:rPr lang="en-US" sz="2000" kern="100" dirty="0">
-                <a:solidFill>
-                  <a:schemeClr val="tx1"/>
-                </a:solidFill>
-                <a:effectLst/>
-                <a:latin typeface="Aptos" panose="020B0004020202020204" pitchFamily="34" charset="0"/>
-                <a:ea typeface="Aptos" panose="020B0004020202020204" pitchFamily="34" charset="0"/>
-                <a:cs typeface="Times New Roman" panose="02020603050405020304" pitchFamily="18" charset="0"/>
-              </a:rPr>
-              <a:t>Each parameter is shown using easy-to-read graphics: radial gauges for heart rate, GSR, and respiration and a progress bar for SpO₂ Color-coded zones to help users instantly understand their health status.</a:t>
-            </a:r>
-          </a:p>
-          <a:p>
-            <a:pPr marL="342900" indent="-342900">
-              <a:lnSpc>
-                <a:spcPct val="115000"/>
-              </a:lnSpc>
-              <a:spcAft>
-                <a:spcPts val="800"/>
-              </a:spcAft>
-              <a:buFont typeface="Arial" panose="020B0604020202020204" pitchFamily="34" charset="0"/>
-              <a:buChar char="•"/>
-            </a:pPr>
-            <a:r>
-              <a:rPr lang="nl-BE" sz="2000" b="1" kern="100" dirty="0">
-                <a:solidFill>
-                  <a:srgbClr val="0070C0"/>
-                </a:solidFill>
-                <a:effectLst/>
-                <a:latin typeface="Aptos" panose="020B0004020202020204" pitchFamily="34" charset="0"/>
-                <a:ea typeface="Aptos" panose="020B0004020202020204" pitchFamily="34" charset="0"/>
-                <a:cs typeface="Times New Roman" panose="02020603050405020304" pitchFamily="18" charset="0"/>
-              </a:rPr>
-              <a:t>Stress </a:t>
-            </a:r>
-            <a:r>
-              <a:rPr lang="nl-BE" sz="2000" b="1" kern="100" dirty="0" err="1">
-                <a:solidFill>
-                  <a:srgbClr val="0070C0"/>
-                </a:solidFill>
-                <a:effectLst/>
-                <a:latin typeface="Aptos" panose="020B0004020202020204" pitchFamily="34" charset="0"/>
-                <a:ea typeface="Aptos" panose="020B0004020202020204" pitchFamily="34" charset="0"/>
-                <a:cs typeface="Times New Roman" panose="02020603050405020304" pitchFamily="18" charset="0"/>
-              </a:rPr>
-              <a:t>Detection</a:t>
-            </a:r>
-            <a:r>
-              <a:rPr lang="nl-BE" sz="2000" b="1" kern="100" dirty="0">
-                <a:solidFill>
-                  <a:srgbClr val="0070C0"/>
-                </a:solidFill>
-                <a:effectLst/>
-                <a:latin typeface="Aptos" panose="020B0004020202020204" pitchFamily="34" charset="0"/>
-                <a:ea typeface="Aptos" panose="020B0004020202020204" pitchFamily="34" charset="0"/>
-                <a:cs typeface="Times New Roman" panose="02020603050405020304" pitchFamily="18" charset="0"/>
-              </a:rPr>
-              <a:t>:</a:t>
-            </a:r>
-            <a:r>
-              <a:rPr lang="nl-BE" sz="2000" kern="100" dirty="0">
-                <a:solidFill>
-                  <a:srgbClr val="0070C0"/>
-                </a:solidFill>
-                <a:effectLst/>
-                <a:latin typeface="Aptos" panose="020B0004020202020204" pitchFamily="34" charset="0"/>
-                <a:ea typeface="Aptos" panose="020B0004020202020204" pitchFamily="34" charset="0"/>
-                <a:cs typeface="Times New Roman" panose="02020603050405020304" pitchFamily="18" charset="0"/>
-              </a:rPr>
-              <a:t> </a:t>
-            </a:r>
-            <a:r>
-              <a:rPr lang="en-US" sz="2000" kern="100" dirty="0">
-                <a:solidFill>
-                  <a:schemeClr val="tx1"/>
-                </a:solidFill>
-                <a:effectLst/>
-                <a:latin typeface="Aptos" panose="020B0004020202020204" pitchFamily="34" charset="0"/>
-                <a:ea typeface="Aptos" panose="020B0004020202020204" pitchFamily="34" charset="0"/>
-                <a:cs typeface="Times New Roman" panose="02020603050405020304" pitchFamily="18" charset="0"/>
-              </a:rPr>
-              <a:t>A color-coded stress indicator combines respiration and GSR data. Although exact thresholds aren't the focus, this simplified system by using dummy thresholds allows the interface's usability to be tested and refined.</a:t>
-            </a:r>
-          </a:p>
-          <a:p>
-            <a:pPr marL="342900" indent="-342900">
-              <a:lnSpc>
-                <a:spcPct val="115000"/>
-              </a:lnSpc>
-              <a:spcAft>
-                <a:spcPts val="800"/>
-              </a:spcAft>
-              <a:buFont typeface="Arial" panose="020B0604020202020204" pitchFamily="34" charset="0"/>
-              <a:buChar char="•"/>
-            </a:pPr>
-            <a:r>
-              <a:rPr lang="nl-BE" sz="2000" b="1" kern="100" dirty="0">
-                <a:solidFill>
-                  <a:srgbClr val="0070C0"/>
-                </a:solidFill>
-                <a:effectLst/>
-                <a:latin typeface="Aptos" panose="020B0004020202020204" pitchFamily="34" charset="0"/>
-                <a:ea typeface="Aptos" panose="020B0004020202020204" pitchFamily="34" charset="0"/>
-                <a:cs typeface="Times New Roman" panose="02020603050405020304" pitchFamily="18" charset="0"/>
-              </a:rPr>
-              <a:t>Trend Tracking:</a:t>
-            </a:r>
-            <a:r>
-              <a:rPr lang="nl-BE" sz="2000" kern="100" dirty="0">
-                <a:solidFill>
-                  <a:srgbClr val="0070C0"/>
-                </a:solidFill>
-                <a:effectLst/>
-                <a:latin typeface="Aptos" panose="020B0004020202020204" pitchFamily="34" charset="0"/>
-                <a:ea typeface="Aptos" panose="020B0004020202020204" pitchFamily="34" charset="0"/>
-                <a:cs typeface="Times New Roman" panose="02020603050405020304" pitchFamily="18" charset="0"/>
-              </a:rPr>
-              <a:t> </a:t>
-            </a:r>
-            <a:r>
-              <a:rPr lang="en-US" sz="2000" kern="100" dirty="0">
-                <a:solidFill>
-                  <a:schemeClr val="tx1"/>
-                </a:solidFill>
-                <a:effectLst/>
-                <a:latin typeface="Aptos" panose="020B0004020202020204" pitchFamily="34" charset="0"/>
-                <a:ea typeface="Aptos" panose="020B0004020202020204" pitchFamily="34" charset="0"/>
-                <a:cs typeface="Times New Roman" panose="02020603050405020304" pitchFamily="18" charset="0"/>
-              </a:rPr>
-              <a:t>Users can review past data in a history view, with filters like “Today” or “Last 7 Days.” Bar graphs display daily min/max values to show trends without overwhelming detail—ideal for mobile screens.</a:t>
-            </a:r>
-          </a:p>
-          <a:p>
-            <a:pPr marL="342900" indent="-342900">
-              <a:lnSpc>
-                <a:spcPct val="115000"/>
-              </a:lnSpc>
-              <a:spcAft>
-                <a:spcPts val="800"/>
-              </a:spcAft>
-              <a:buFont typeface="Arial" panose="020B0604020202020204" pitchFamily="34" charset="0"/>
-              <a:buChar char="•"/>
-            </a:pPr>
-            <a:r>
-              <a:rPr lang="nl-BE" sz="2000" b="1" kern="100" dirty="0">
-                <a:solidFill>
-                  <a:srgbClr val="0070C0"/>
-                </a:solidFill>
-                <a:effectLst/>
-                <a:latin typeface="Aptos" panose="020B0004020202020204" pitchFamily="34" charset="0"/>
-                <a:ea typeface="Aptos" panose="020B0004020202020204" pitchFamily="34" charset="0"/>
-                <a:cs typeface="Times New Roman" panose="02020603050405020304" pitchFamily="18" charset="0"/>
-              </a:rPr>
-              <a:t>Info Panels:</a:t>
-            </a:r>
-            <a:r>
-              <a:rPr lang="nl-BE" sz="2000" kern="100" dirty="0">
-                <a:solidFill>
-                  <a:srgbClr val="0070C0"/>
-                </a:solidFill>
-                <a:effectLst/>
-                <a:latin typeface="Aptos" panose="020B0004020202020204" pitchFamily="34" charset="0"/>
-                <a:ea typeface="Aptos" panose="020B0004020202020204" pitchFamily="34" charset="0"/>
-                <a:cs typeface="Times New Roman" panose="02020603050405020304" pitchFamily="18" charset="0"/>
-              </a:rPr>
-              <a:t> </a:t>
-            </a:r>
-            <a:r>
-              <a:rPr lang="en-US" sz="2000" kern="100" dirty="0">
-                <a:solidFill>
-                  <a:schemeClr val="tx1"/>
-                </a:solidFill>
-                <a:effectLst/>
-                <a:latin typeface="Aptos" panose="020B0004020202020204" pitchFamily="34" charset="0"/>
-                <a:ea typeface="Aptos" panose="020B0004020202020204" pitchFamily="34" charset="0"/>
-                <a:cs typeface="Times New Roman" panose="02020603050405020304" pitchFamily="18" charset="0"/>
-              </a:rPr>
-              <a:t>Each health metric has an information button explaining what it measures, how it works, and why it matters. This improves understanding and builds trust in the system.</a:t>
-            </a:r>
             <a:endParaRPr lang="nl-BE" sz="2000" b="1" kern="100" dirty="0">
               <a:solidFill>
                 <a:srgbClr val="FF0000"/>
@@ -3841,7 +3414,151 @@
                 <a:ea typeface="Aptos" panose="020B0004020202020204" pitchFamily="34" charset="0"/>
                 <a:cs typeface="Times New Roman" panose="02020603050405020304" pitchFamily="18" charset="0"/>
               </a:rPr>
-              <a:t>Most users found the Bluetooth pairing process straightforward and rated the interface as intuitive and easy to navigate. Users appreciated the visual clarity of health data, with color-coded gauges and stress indicators aiding interpretation. The info dialogs and explanations for parameters were found to be helpful by most participants, especially for understanding stress-related values such as GSR and HRV. The history feature, including graph/table views and date filtering, was highlighted as useful for monitoring trends over time. Some users indicated that switching between views helped them better understand fluctuations in their stress levels.</a:t>
+              <a:t>Most users found the Bluetooth pairing process straightforward and rated the interface as </a:t>
+            </a:r>
+            <a:r>
+              <a:rPr lang="en-US" sz="1800" b="1" kern="100" dirty="0">
+                <a:solidFill>
+                  <a:srgbClr val="FF0000"/>
+                </a:solidFill>
+                <a:effectLst/>
+                <a:latin typeface="Aptos" panose="020B0004020202020204" pitchFamily="34" charset="0"/>
+                <a:ea typeface="Aptos" panose="020B0004020202020204" pitchFamily="34" charset="0"/>
+                <a:cs typeface="Times New Roman" panose="02020603050405020304" pitchFamily="18" charset="0"/>
+              </a:rPr>
+              <a:t>intuitive and easy to navigate</a:t>
+            </a:r>
+            <a:r>
+              <a:rPr lang="en-US" sz="1800" kern="100" dirty="0">
+                <a:solidFill>
+                  <a:sysClr val="windowText" lastClr="000000"/>
+                </a:solidFill>
+                <a:effectLst/>
+                <a:latin typeface="Aptos" panose="020B0004020202020204" pitchFamily="34" charset="0"/>
+                <a:ea typeface="Aptos" panose="020B0004020202020204" pitchFamily="34" charset="0"/>
+                <a:cs typeface="Times New Roman" panose="02020603050405020304" pitchFamily="18" charset="0"/>
+              </a:rPr>
+              <a:t>. Users appreciated the </a:t>
+            </a:r>
+            <a:r>
+              <a:rPr lang="en-US" sz="1800" b="1" kern="100" dirty="0">
+                <a:solidFill>
+                  <a:srgbClr val="FF0000"/>
+                </a:solidFill>
+                <a:effectLst/>
+                <a:latin typeface="Aptos" panose="020B0004020202020204" pitchFamily="34" charset="0"/>
+                <a:ea typeface="Aptos" panose="020B0004020202020204" pitchFamily="34" charset="0"/>
+                <a:cs typeface="Times New Roman" panose="02020603050405020304" pitchFamily="18" charset="0"/>
+              </a:rPr>
+              <a:t>visual clarity </a:t>
+            </a:r>
+            <a:r>
+              <a:rPr lang="en-US" sz="1800" kern="100" dirty="0">
+                <a:solidFill>
+                  <a:sysClr val="windowText" lastClr="000000"/>
+                </a:solidFill>
+                <a:effectLst/>
+                <a:latin typeface="Aptos" panose="020B0004020202020204" pitchFamily="34" charset="0"/>
+                <a:ea typeface="Aptos" panose="020B0004020202020204" pitchFamily="34" charset="0"/>
+                <a:cs typeface="Times New Roman" panose="02020603050405020304" pitchFamily="18" charset="0"/>
+              </a:rPr>
+              <a:t>of health data, with color-coded gauges and stress indicators aiding interpretation. The </a:t>
+            </a:r>
+            <a:r>
+              <a:rPr lang="en-US" sz="1800" b="1" kern="100" dirty="0">
+                <a:solidFill>
+                  <a:srgbClr val="FF0000"/>
+                </a:solidFill>
+                <a:effectLst/>
+                <a:latin typeface="Aptos" panose="020B0004020202020204" pitchFamily="34" charset="0"/>
+                <a:ea typeface="Aptos" panose="020B0004020202020204" pitchFamily="34" charset="0"/>
+                <a:cs typeface="Times New Roman" panose="02020603050405020304" pitchFamily="18" charset="0"/>
+              </a:rPr>
+              <a:t>info dialogs and explanations</a:t>
+            </a:r>
+            <a:r>
+              <a:rPr lang="en-US" sz="1800" kern="100" dirty="0">
+                <a:solidFill>
+                  <a:sysClr val="windowText" lastClr="000000"/>
+                </a:solidFill>
+                <a:effectLst/>
+                <a:latin typeface="Aptos" panose="020B0004020202020204" pitchFamily="34" charset="0"/>
+                <a:ea typeface="Aptos" panose="020B0004020202020204" pitchFamily="34" charset="0"/>
+                <a:cs typeface="Times New Roman" panose="02020603050405020304" pitchFamily="18" charset="0"/>
+              </a:rPr>
+              <a:t> for parameters were found to be </a:t>
+            </a:r>
+            <a:r>
+              <a:rPr lang="en-US" sz="1800" b="1" kern="100" dirty="0">
+                <a:solidFill>
+                  <a:srgbClr val="FF0000"/>
+                </a:solidFill>
+                <a:effectLst/>
+                <a:latin typeface="Aptos" panose="020B0004020202020204" pitchFamily="34" charset="0"/>
+                <a:ea typeface="Aptos" panose="020B0004020202020204" pitchFamily="34" charset="0"/>
+                <a:cs typeface="Times New Roman" panose="02020603050405020304" pitchFamily="18" charset="0"/>
+              </a:rPr>
+              <a:t>helpful</a:t>
+            </a:r>
+            <a:r>
+              <a:rPr lang="en-US" sz="1800" kern="100" dirty="0">
+                <a:solidFill>
+                  <a:sysClr val="windowText" lastClr="000000"/>
+                </a:solidFill>
+                <a:effectLst/>
+                <a:latin typeface="Aptos" panose="020B0004020202020204" pitchFamily="34" charset="0"/>
+                <a:ea typeface="Aptos" panose="020B0004020202020204" pitchFamily="34" charset="0"/>
+                <a:cs typeface="Times New Roman" panose="02020603050405020304" pitchFamily="18" charset="0"/>
+              </a:rPr>
+              <a:t> by most participants, especially for understanding stress-related values such as GSR and respiratory rate. The </a:t>
+            </a:r>
+            <a:r>
+              <a:rPr lang="en-US" sz="1800" b="1" kern="100" dirty="0">
+                <a:solidFill>
+                  <a:srgbClr val="FF0000"/>
+                </a:solidFill>
+                <a:effectLst/>
+                <a:latin typeface="Aptos" panose="020B0004020202020204" pitchFamily="34" charset="0"/>
+                <a:ea typeface="Aptos" panose="020B0004020202020204" pitchFamily="34" charset="0"/>
+                <a:cs typeface="Times New Roman" panose="02020603050405020304" pitchFamily="18" charset="0"/>
+              </a:rPr>
+              <a:t>history feature</a:t>
+            </a:r>
+            <a:r>
+              <a:rPr lang="en-US" sz="1800" kern="100" dirty="0">
+                <a:solidFill>
+                  <a:sysClr val="windowText" lastClr="000000"/>
+                </a:solidFill>
+                <a:effectLst/>
+                <a:latin typeface="Aptos" panose="020B0004020202020204" pitchFamily="34" charset="0"/>
+                <a:ea typeface="Aptos" panose="020B0004020202020204" pitchFamily="34" charset="0"/>
+                <a:cs typeface="Times New Roman" panose="02020603050405020304" pitchFamily="18" charset="0"/>
+              </a:rPr>
+              <a:t>, including graph/table views and date filtering, was highlighted as </a:t>
+            </a:r>
+            <a:r>
+              <a:rPr lang="en-US" sz="1800" b="1" kern="100" dirty="0">
+                <a:solidFill>
+                  <a:srgbClr val="FF0000"/>
+                </a:solidFill>
+                <a:effectLst/>
+                <a:latin typeface="Aptos" panose="020B0004020202020204" pitchFamily="34" charset="0"/>
+                <a:ea typeface="Aptos" panose="020B0004020202020204" pitchFamily="34" charset="0"/>
+                <a:cs typeface="Times New Roman" panose="02020603050405020304" pitchFamily="18" charset="0"/>
+              </a:rPr>
+              <a:t>useful for monitoring trends over time</a:t>
+            </a:r>
+            <a:r>
+              <a:rPr lang="en-US" sz="1800" kern="100" dirty="0">
+                <a:solidFill>
+                  <a:sysClr val="windowText" lastClr="000000"/>
+                </a:solidFill>
+                <a:effectLst/>
+                <a:latin typeface="Aptos" panose="020B0004020202020204" pitchFamily="34" charset="0"/>
+                <a:ea typeface="Aptos" panose="020B0004020202020204" pitchFamily="34" charset="0"/>
+                <a:cs typeface="Times New Roman" panose="02020603050405020304" pitchFamily="18" charset="0"/>
+              </a:rPr>
+              <a:t>. Some users indicated that switching between views helped them better understand fluctuations in their stress levels.</a:t>
             </a:r>
             <a:endParaRPr lang="en-GB" sz="1800" kern="100" dirty="0">
               <a:solidFill>
@@ -3992,7 +3709,71 @@
                   <a:schemeClr val="tx1"/>
                 </a:solidFill>
               </a:rPr>
-              <a:t>This project demonstrates the feasibility of a low-cost, user-friendly stress monitoring system that combines physiological sensors with real-time data visualization in a mobile application. By integrating heart rate, GSR, oxygen saturation, and respiration rate measurements, the system offers a comprehensive view of workplace stress. Preliminary user feedback suggests that the app is intuitive, the data is presented clearly, and the system has the potential to raise awareness about personal well-being. While more testing is needed to fully evaluate usability and effectiveness, this solution lays a strong foundation for future developments in accessible health monitoring technologies.</a:t>
+              <a:t>This project demonstrates the feasibility of a </a:t>
+            </a:r>
+            <a:r>
+              <a:rPr lang="en-US" sz="2000" b="1" dirty="0">
+                <a:solidFill>
+                  <a:srgbClr val="FF0000"/>
+                </a:solidFill>
+              </a:rPr>
+              <a:t>low-cost, user-friendly health monitoring system </a:t>
+            </a:r>
+            <a:r>
+              <a:rPr lang="en-US" sz="2000" dirty="0">
+                <a:solidFill>
+                  <a:schemeClr val="tx1"/>
+                </a:solidFill>
+              </a:rPr>
+              <a:t>that combines physiological sensors with real-time data visualization in a mobile application. By integrating heart rate, GSR, oxygen saturation, and respiration rate measurements, the system offers a </a:t>
+            </a:r>
+            <a:r>
+              <a:rPr lang="en-US" sz="2000" b="1" dirty="0">
+                <a:solidFill>
+                  <a:srgbClr val="FF0000"/>
+                </a:solidFill>
+              </a:rPr>
+              <a:t>comprehensive view </a:t>
+            </a:r>
+            <a:r>
+              <a:rPr lang="en-US" sz="2000" dirty="0">
+                <a:solidFill>
+                  <a:schemeClr val="tx1"/>
+                </a:solidFill>
+              </a:rPr>
+              <a:t>of workplace stress. Preliminary user feedback suggests that the app is </a:t>
+            </a:r>
+            <a:r>
+              <a:rPr lang="en-US" sz="2000" b="1" dirty="0">
+                <a:solidFill>
+                  <a:srgbClr val="FF0000"/>
+                </a:solidFill>
+              </a:rPr>
+              <a:t>intuitive</a:t>
+            </a:r>
+            <a:r>
+              <a:rPr lang="en-US" sz="2000" dirty="0">
+                <a:solidFill>
+                  <a:schemeClr val="tx1"/>
+                </a:solidFill>
+              </a:rPr>
+              <a:t>, the data is presented clearly, and the system has </a:t>
+            </a:r>
+            <a:r>
+              <a:rPr lang="en-US" sz="2000" b="1" dirty="0">
+                <a:solidFill>
+                  <a:srgbClr val="FF0000"/>
+                </a:solidFill>
+              </a:rPr>
+              <a:t>the potential to raise awareness </a:t>
+            </a:r>
+            <a:r>
+              <a:rPr lang="en-US" sz="2000" dirty="0">
+                <a:solidFill>
+                  <a:schemeClr val="tx1"/>
+                </a:solidFill>
+              </a:rPr>
+              <a:t>about personal well-being. While more testing is needed to fully evaluate usability and effectiveness, this solution lays a strong foundation for future developments in accessible health monitoring technologies.</a:t>
             </a:r>
             <a:endParaRPr lang="en-GB" sz="2000" dirty="0">
               <a:solidFill>
@@ -4352,6 +4133,841 @@
               </a:solidFill>
               <a:effectLst/>
               <a:latin typeface="Calibri" panose="020F0502020204030204" pitchFamily="34" charset="0"/>
+            </a:endParaRPr>
+          </a:p>
+        </p:txBody>
+      </p:sp>
+      <p:pic>
+        <p:nvPicPr>
+          <p:cNvPr id="15" name="Afbeelding 14" descr="Afbeelding met tekst, schermopname, Lettertype, nummer&#10;&#10;Door AI gegenereerde inhoud is mogelijk onjuist.">
+            <a:extLst>
+              <a:ext uri="{FF2B5EF4-FFF2-40B4-BE49-F238E27FC236}">
+                <a16:creationId xmlns:a16="http://schemas.microsoft.com/office/drawing/2014/main" id="{863B1B8B-1EE9-FBA7-FF69-45E61F406D10}"/>
+              </a:ext>
+            </a:extLst>
+          </p:cNvPr>
+          <p:cNvPicPr>
+            <a:picLocks noChangeAspect="1"/>
+          </p:cNvPicPr>
+          <p:nvPr/>
+        </p:nvPicPr>
+        <p:blipFill>
+          <a:blip r:embed="rId3"/>
+          <a:stretch>
+            <a:fillRect/>
+          </a:stretch>
+        </p:blipFill>
+        <p:spPr>
+          <a:xfrm>
+            <a:off x="15266598" y="14102570"/>
+            <a:ext cx="2278904" cy="3963332"/>
+          </a:xfrm>
+          <a:prstGeom prst="rect">
+            <a:avLst/>
+          </a:prstGeom>
+        </p:spPr>
+      </p:pic>
+      <p:sp>
+        <p:nvSpPr>
+          <p:cNvPr id="22" name="Tekstvak 21">
+            <a:extLst>
+              <a:ext uri="{FF2B5EF4-FFF2-40B4-BE49-F238E27FC236}">
+                <a16:creationId xmlns:a16="http://schemas.microsoft.com/office/drawing/2014/main" id="{FCDF91FB-9B6E-BFF0-8361-E18D2A251A10}"/>
+              </a:ext>
+            </a:extLst>
+          </p:cNvPr>
+          <p:cNvSpPr txBox="1"/>
+          <p:nvPr/>
+        </p:nvSpPr>
+        <p:spPr>
+          <a:xfrm>
+            <a:off x="943280" y="14197524"/>
+            <a:ext cx="14447520" cy="8016554"/>
+          </a:xfrm>
+          <a:prstGeom prst="rect">
+            <a:avLst/>
+          </a:prstGeom>
+        </p:spPr>
+        <p:txBody>
+          <a:bodyPr vert="horz" wrap="square" rtlCol="0">
+            <a:spAutoFit/>
+          </a:bodyPr>
+          <a:lstStyle/>
+          <a:p>
+            <a:pPr>
+              <a:lnSpc>
+                <a:spcPct val="115000"/>
+              </a:lnSpc>
+              <a:spcAft>
+                <a:spcPts val="800"/>
+              </a:spcAft>
+            </a:pPr>
+            <a:r>
+              <a:rPr lang="nl-BE" sz="2400" b="1" kern="100" dirty="0">
+                <a:solidFill>
+                  <a:schemeClr val="tx1"/>
+                </a:solidFill>
+                <a:effectLst/>
+                <a:latin typeface="Aptos" panose="020B0004020202020204" pitchFamily="34" charset="0"/>
+                <a:ea typeface="Aptos" panose="020B0004020202020204" pitchFamily="34" charset="0"/>
+                <a:cs typeface="Times New Roman" panose="02020603050405020304" pitchFamily="18" charset="0"/>
+              </a:rPr>
+              <a:t>Mobile </a:t>
+            </a:r>
+            <a:r>
+              <a:rPr lang="nl-BE" sz="2400" b="1" kern="100" dirty="0" err="1">
+                <a:solidFill>
+                  <a:schemeClr val="tx1"/>
+                </a:solidFill>
+                <a:effectLst/>
+                <a:latin typeface="Aptos" panose="020B0004020202020204" pitchFamily="34" charset="0"/>
+                <a:ea typeface="Aptos" panose="020B0004020202020204" pitchFamily="34" charset="0"/>
+                <a:cs typeface="Times New Roman" panose="02020603050405020304" pitchFamily="18" charset="0"/>
+              </a:rPr>
+              <a:t>application</a:t>
+            </a:r>
+            <a:endParaRPr lang="nl-BE" sz="2000" kern="100" dirty="0">
+              <a:solidFill>
+                <a:schemeClr val="tx1"/>
+              </a:solidFill>
+              <a:effectLst/>
+              <a:latin typeface="Aptos" panose="020B0004020202020204" pitchFamily="34" charset="0"/>
+              <a:ea typeface="Aptos" panose="020B0004020202020204" pitchFamily="34" charset="0"/>
+              <a:cs typeface="Times New Roman" panose="02020603050405020304" pitchFamily="18" charset="0"/>
+            </a:endParaRPr>
+          </a:p>
+          <a:p>
+            <a:pPr>
+              <a:lnSpc>
+                <a:spcPct val="115000"/>
+              </a:lnSpc>
+              <a:spcAft>
+                <a:spcPts val="800"/>
+              </a:spcAft>
+            </a:pPr>
+            <a:r>
+              <a:rPr lang="en-US" sz="2000" kern="100" dirty="0">
+                <a:solidFill>
+                  <a:schemeClr val="tx1"/>
+                </a:solidFill>
+                <a:effectLst/>
+                <a:latin typeface="Aptos" panose="020B0004020202020204" pitchFamily="34" charset="0"/>
+                <a:ea typeface="Aptos" panose="020B0004020202020204" pitchFamily="34" charset="0"/>
+                <a:cs typeface="Times New Roman" panose="02020603050405020304" pitchFamily="18" charset="0"/>
+              </a:rPr>
+              <a:t>To complement the stress measurement device, a mobile application was developed that focuses on </a:t>
+            </a:r>
+            <a:r>
+              <a:rPr lang="en-US" sz="2000" b="1" kern="100" dirty="0">
+                <a:solidFill>
+                  <a:srgbClr val="0070C0"/>
+                </a:solidFill>
+                <a:effectLst/>
+                <a:latin typeface="Aptos" panose="020B0004020202020204" pitchFamily="34" charset="0"/>
+                <a:ea typeface="Aptos" panose="020B0004020202020204" pitchFamily="34" charset="0"/>
+                <a:cs typeface="Times New Roman" panose="02020603050405020304" pitchFamily="18" charset="0"/>
+              </a:rPr>
+              <a:t>usability, personalization, and clear data presentation</a:t>
+            </a:r>
+            <a:r>
+              <a:rPr lang="en-US" sz="2000" kern="100" dirty="0">
+                <a:solidFill>
+                  <a:schemeClr val="tx1"/>
+                </a:solidFill>
+                <a:effectLst/>
+                <a:latin typeface="Aptos" panose="020B0004020202020204" pitchFamily="34" charset="0"/>
+                <a:ea typeface="Aptos" panose="020B0004020202020204" pitchFamily="34" charset="0"/>
+                <a:cs typeface="Times New Roman" panose="02020603050405020304" pitchFamily="18" charset="0"/>
+              </a:rPr>
+              <a:t>. The app enables real-time monitoring and historical tracking of key physiological signals, making stress and health data accessible and understandable, even for non-technical users. Below is a summary of the main features and the reasons behind each design choice:</a:t>
+            </a:r>
+          </a:p>
+          <a:p>
+            <a:pPr marL="342900" indent="-342900">
+              <a:lnSpc>
+                <a:spcPct val="115000"/>
+              </a:lnSpc>
+              <a:spcAft>
+                <a:spcPts val="800"/>
+              </a:spcAft>
+              <a:buFont typeface="Arial" panose="020B0604020202020204" pitchFamily="34" charset="0"/>
+              <a:buChar char="•"/>
+            </a:pPr>
+            <a:r>
+              <a:rPr lang="nl-BE" sz="2000" b="1" kern="100" dirty="0">
+                <a:solidFill>
+                  <a:srgbClr val="0070C0"/>
+                </a:solidFill>
+                <a:effectLst/>
+                <a:latin typeface="Aptos" panose="020B0004020202020204" pitchFamily="34" charset="0"/>
+                <a:ea typeface="Aptos" panose="020B0004020202020204" pitchFamily="34" charset="0"/>
+                <a:cs typeface="Times New Roman" panose="02020603050405020304" pitchFamily="18" charset="0"/>
+              </a:rPr>
+              <a:t>Shared Device, Multiple Users</a:t>
+            </a:r>
+            <a:r>
+              <a:rPr lang="nl-BE" sz="2000" kern="100" dirty="0">
+                <a:solidFill>
+                  <a:srgbClr val="0070C0"/>
+                </a:solidFill>
+                <a:effectLst/>
+                <a:latin typeface="Aptos" panose="020B0004020202020204" pitchFamily="34" charset="0"/>
+                <a:ea typeface="Aptos" panose="020B0004020202020204" pitchFamily="34" charset="0"/>
+                <a:cs typeface="Times New Roman" panose="02020603050405020304" pitchFamily="18" charset="0"/>
+              </a:rPr>
+              <a:t>: </a:t>
+            </a:r>
+            <a:r>
+              <a:rPr lang="en-US" sz="2000" kern="100" dirty="0">
+                <a:solidFill>
+                  <a:schemeClr val="tx1"/>
+                </a:solidFill>
+                <a:effectLst/>
+                <a:latin typeface="Aptos" panose="020B0004020202020204" pitchFamily="34" charset="0"/>
+                <a:ea typeface="Aptos" panose="020B0004020202020204" pitchFamily="34" charset="0"/>
+                <a:cs typeface="Times New Roman" panose="02020603050405020304" pitchFamily="18" charset="0"/>
+              </a:rPr>
+              <a:t>A multi-user login system allows organizations to use a single device for several users, minimizing hardware costs and improving accessibility in budget-constrained settings.</a:t>
+            </a:r>
+          </a:p>
+          <a:p>
+            <a:pPr marL="342900" indent="-342900">
+              <a:lnSpc>
+                <a:spcPct val="115000"/>
+              </a:lnSpc>
+              <a:spcAft>
+                <a:spcPts val="800"/>
+              </a:spcAft>
+              <a:buFont typeface="Arial" panose="020B0604020202020204" pitchFamily="34" charset="0"/>
+              <a:buChar char="•"/>
+            </a:pPr>
+            <a:r>
+              <a:rPr lang="nl-BE" sz="2000" b="1" kern="100" dirty="0" err="1">
+                <a:solidFill>
+                  <a:srgbClr val="0070C0"/>
+                </a:solidFill>
+                <a:effectLst/>
+                <a:latin typeface="Aptos" panose="020B0004020202020204" pitchFamily="34" charset="0"/>
+                <a:ea typeface="Aptos" panose="020B0004020202020204" pitchFamily="34" charset="0"/>
+                <a:cs typeface="Times New Roman" panose="02020603050405020304" pitchFamily="18" charset="0"/>
+              </a:rPr>
+              <a:t>Personalized</a:t>
+            </a:r>
+            <a:r>
+              <a:rPr lang="nl-BE" sz="2000" b="1" kern="100" dirty="0">
+                <a:solidFill>
+                  <a:srgbClr val="0070C0"/>
+                </a:solidFill>
+                <a:effectLst/>
+                <a:latin typeface="Aptos" panose="020B0004020202020204" pitchFamily="34" charset="0"/>
+                <a:ea typeface="Aptos" panose="020B0004020202020204" pitchFamily="34" charset="0"/>
+                <a:cs typeface="Times New Roman" panose="02020603050405020304" pitchFamily="18" charset="0"/>
+              </a:rPr>
+              <a:t> Setup:</a:t>
+            </a:r>
+            <a:r>
+              <a:rPr lang="nl-BE" sz="2000" kern="100" dirty="0">
+                <a:solidFill>
+                  <a:srgbClr val="0070C0"/>
+                </a:solidFill>
+                <a:effectLst/>
+                <a:latin typeface="Aptos" panose="020B0004020202020204" pitchFamily="34" charset="0"/>
+                <a:ea typeface="Aptos" panose="020B0004020202020204" pitchFamily="34" charset="0"/>
+                <a:cs typeface="Times New Roman" panose="02020603050405020304" pitchFamily="18" charset="0"/>
+              </a:rPr>
+              <a:t> </a:t>
+            </a:r>
+            <a:r>
+              <a:rPr lang="en-US" sz="2000" kern="100" dirty="0">
+                <a:solidFill>
+                  <a:schemeClr val="tx1"/>
+                </a:solidFill>
+                <a:effectLst/>
+                <a:latin typeface="Aptos" panose="020B0004020202020204" pitchFamily="34" charset="0"/>
+                <a:ea typeface="Aptos" panose="020B0004020202020204" pitchFamily="34" charset="0"/>
+                <a:cs typeface="Times New Roman" panose="02020603050405020304" pitchFamily="18" charset="0"/>
+              </a:rPr>
+              <a:t>New users enter their age to calculate personalized heart rate zones and complete a baseline measurement for heart rate, respiration, and GSR. This helps tailor the app’s feedback to individual physiology.</a:t>
+            </a:r>
+          </a:p>
+          <a:p>
+            <a:pPr marL="342900" indent="-342900">
+              <a:lnSpc>
+                <a:spcPct val="115000"/>
+              </a:lnSpc>
+              <a:spcAft>
+                <a:spcPts val="800"/>
+              </a:spcAft>
+              <a:buFont typeface="Arial" panose="020B0604020202020204" pitchFamily="34" charset="0"/>
+              <a:buChar char="•"/>
+            </a:pPr>
+            <a:r>
+              <a:rPr lang="nl-BE" sz="2000" b="1" kern="100" dirty="0" err="1">
+                <a:solidFill>
+                  <a:srgbClr val="0070C0"/>
+                </a:solidFill>
+                <a:effectLst/>
+                <a:latin typeface="Aptos" panose="020B0004020202020204" pitchFamily="34" charset="0"/>
+                <a:ea typeface="Aptos" panose="020B0004020202020204" pitchFamily="34" charset="0"/>
+                <a:cs typeface="Times New Roman" panose="02020603050405020304" pitchFamily="18" charset="0"/>
+              </a:rPr>
+              <a:t>Intuitive</a:t>
+            </a:r>
+            <a:r>
+              <a:rPr lang="nl-BE" sz="2000" b="1" kern="100" dirty="0">
+                <a:solidFill>
+                  <a:srgbClr val="0070C0"/>
+                </a:solidFill>
+                <a:effectLst/>
+                <a:latin typeface="Aptos" panose="020B0004020202020204" pitchFamily="34" charset="0"/>
+                <a:ea typeface="Aptos" panose="020B0004020202020204" pitchFamily="34" charset="0"/>
+                <a:cs typeface="Times New Roman" panose="02020603050405020304" pitchFamily="18" charset="0"/>
+              </a:rPr>
+              <a:t> </a:t>
+            </a:r>
+            <a:r>
+              <a:rPr lang="nl-BE" sz="2000" b="1" kern="100" dirty="0" err="1">
+                <a:solidFill>
+                  <a:srgbClr val="0070C0"/>
+                </a:solidFill>
+                <a:effectLst/>
+                <a:latin typeface="Aptos" panose="020B0004020202020204" pitchFamily="34" charset="0"/>
+                <a:ea typeface="Aptos" panose="020B0004020202020204" pitchFamily="34" charset="0"/>
+                <a:cs typeface="Times New Roman" panose="02020603050405020304" pitchFamily="18" charset="0"/>
+              </a:rPr>
+              <a:t>Visualizations</a:t>
+            </a:r>
+            <a:r>
+              <a:rPr lang="nl-BE" sz="2000" b="1" kern="100" dirty="0">
+                <a:solidFill>
+                  <a:srgbClr val="0070C0"/>
+                </a:solidFill>
+                <a:effectLst/>
+                <a:latin typeface="Aptos" panose="020B0004020202020204" pitchFamily="34" charset="0"/>
+                <a:ea typeface="Aptos" panose="020B0004020202020204" pitchFamily="34" charset="0"/>
+                <a:cs typeface="Times New Roman" panose="02020603050405020304" pitchFamily="18" charset="0"/>
+              </a:rPr>
+              <a:t>: </a:t>
+            </a:r>
+            <a:r>
+              <a:rPr lang="en-US" sz="2000" kern="100" dirty="0">
+                <a:solidFill>
+                  <a:schemeClr val="tx1"/>
+                </a:solidFill>
+                <a:effectLst/>
+                <a:latin typeface="Aptos" panose="020B0004020202020204" pitchFamily="34" charset="0"/>
+                <a:ea typeface="Aptos" panose="020B0004020202020204" pitchFamily="34" charset="0"/>
+                <a:cs typeface="Times New Roman" panose="02020603050405020304" pitchFamily="18" charset="0"/>
+              </a:rPr>
+              <a:t>Each parameter is shown using easy-to-read graphics: radial gauges for heart rate, GSR, and respiration and a progress bar for SpO₂ color-coded zones to help users instantly understand their health status. Figur</a:t>
+            </a:r>
+            <a:r>
+              <a:rPr lang="en-US" sz="2000" kern="100" dirty="0">
+                <a:latin typeface="Aptos" panose="020B0004020202020204" pitchFamily="34" charset="0"/>
+                <a:ea typeface="Aptos" panose="020B0004020202020204" pitchFamily="34" charset="0"/>
+                <a:cs typeface="Times New Roman" panose="02020603050405020304" pitchFamily="18" charset="0"/>
+              </a:rPr>
+              <a:t>e X show an example for the heart rate gauge.</a:t>
+            </a:r>
+            <a:endParaRPr lang="en-US" sz="2000" kern="100" dirty="0">
+              <a:solidFill>
+                <a:schemeClr val="tx1"/>
+              </a:solidFill>
+              <a:effectLst/>
+              <a:latin typeface="Aptos" panose="020B0004020202020204" pitchFamily="34" charset="0"/>
+              <a:ea typeface="Aptos" panose="020B0004020202020204" pitchFamily="34" charset="0"/>
+              <a:cs typeface="Times New Roman" panose="02020603050405020304" pitchFamily="18" charset="0"/>
+            </a:endParaRPr>
+          </a:p>
+          <a:p>
+            <a:pPr marL="342900" indent="-342900">
+              <a:lnSpc>
+                <a:spcPct val="115000"/>
+              </a:lnSpc>
+              <a:spcAft>
+                <a:spcPts val="800"/>
+              </a:spcAft>
+              <a:buFont typeface="Arial" panose="020B0604020202020204" pitchFamily="34" charset="0"/>
+              <a:buChar char="•"/>
+            </a:pPr>
+            <a:r>
+              <a:rPr lang="nl-BE" sz="2000" b="1" kern="100" dirty="0">
+                <a:solidFill>
+                  <a:srgbClr val="0070C0"/>
+                </a:solidFill>
+                <a:effectLst/>
+                <a:latin typeface="Aptos" panose="020B0004020202020204" pitchFamily="34" charset="0"/>
+                <a:ea typeface="Aptos" panose="020B0004020202020204" pitchFamily="34" charset="0"/>
+                <a:cs typeface="Times New Roman" panose="02020603050405020304" pitchFamily="18" charset="0"/>
+              </a:rPr>
+              <a:t>Stress </a:t>
+            </a:r>
+            <a:r>
+              <a:rPr lang="nl-BE" sz="2000" b="1" kern="100" dirty="0" err="1">
+                <a:solidFill>
+                  <a:srgbClr val="0070C0"/>
+                </a:solidFill>
+                <a:effectLst/>
+                <a:latin typeface="Aptos" panose="020B0004020202020204" pitchFamily="34" charset="0"/>
+                <a:ea typeface="Aptos" panose="020B0004020202020204" pitchFamily="34" charset="0"/>
+                <a:cs typeface="Times New Roman" panose="02020603050405020304" pitchFamily="18" charset="0"/>
+              </a:rPr>
+              <a:t>Detection</a:t>
+            </a:r>
+            <a:r>
+              <a:rPr lang="nl-BE" sz="2000" b="1" kern="100" dirty="0">
+                <a:solidFill>
+                  <a:srgbClr val="0070C0"/>
+                </a:solidFill>
+                <a:effectLst/>
+                <a:latin typeface="Aptos" panose="020B0004020202020204" pitchFamily="34" charset="0"/>
+                <a:ea typeface="Aptos" panose="020B0004020202020204" pitchFamily="34" charset="0"/>
+                <a:cs typeface="Times New Roman" panose="02020603050405020304" pitchFamily="18" charset="0"/>
+              </a:rPr>
+              <a:t>:</a:t>
+            </a:r>
+            <a:r>
+              <a:rPr lang="nl-BE" sz="2000" kern="100" dirty="0">
+                <a:solidFill>
+                  <a:srgbClr val="0070C0"/>
+                </a:solidFill>
+                <a:effectLst/>
+                <a:latin typeface="Aptos" panose="020B0004020202020204" pitchFamily="34" charset="0"/>
+                <a:ea typeface="Aptos" panose="020B0004020202020204" pitchFamily="34" charset="0"/>
+                <a:cs typeface="Times New Roman" panose="02020603050405020304" pitchFamily="18" charset="0"/>
+              </a:rPr>
+              <a:t> </a:t>
+            </a:r>
+            <a:r>
+              <a:rPr lang="en-US" sz="2000" kern="100" dirty="0">
+                <a:solidFill>
+                  <a:schemeClr val="tx1"/>
+                </a:solidFill>
+                <a:effectLst/>
+                <a:latin typeface="Aptos" panose="020B0004020202020204" pitchFamily="34" charset="0"/>
+                <a:ea typeface="Aptos" panose="020B0004020202020204" pitchFamily="34" charset="0"/>
+                <a:cs typeface="Times New Roman" panose="02020603050405020304" pitchFamily="18" charset="0"/>
+              </a:rPr>
+              <a:t>A color-coded stress indicator combines respiration and GSR data. Although exact thresholds aren't the focus, this simplified system by using dummy thresholds allows the interface's usability to be tested and refined.</a:t>
+            </a:r>
+          </a:p>
+          <a:p>
+            <a:pPr marL="342900" indent="-342900">
+              <a:lnSpc>
+                <a:spcPct val="115000"/>
+              </a:lnSpc>
+              <a:spcAft>
+                <a:spcPts val="800"/>
+              </a:spcAft>
+              <a:buFont typeface="Arial" panose="020B0604020202020204" pitchFamily="34" charset="0"/>
+              <a:buChar char="•"/>
+            </a:pPr>
+            <a:r>
+              <a:rPr lang="nl-BE" sz="2000" b="1" kern="100" dirty="0">
+                <a:solidFill>
+                  <a:srgbClr val="0070C0"/>
+                </a:solidFill>
+                <a:effectLst/>
+                <a:latin typeface="Aptos" panose="020B0004020202020204" pitchFamily="34" charset="0"/>
+                <a:ea typeface="Aptos" panose="020B0004020202020204" pitchFamily="34" charset="0"/>
+                <a:cs typeface="Times New Roman" panose="02020603050405020304" pitchFamily="18" charset="0"/>
+              </a:rPr>
+              <a:t>Trend Tracking:</a:t>
+            </a:r>
+            <a:r>
+              <a:rPr lang="nl-BE" sz="2000" kern="100" dirty="0">
+                <a:solidFill>
+                  <a:srgbClr val="0070C0"/>
+                </a:solidFill>
+                <a:effectLst/>
+                <a:latin typeface="Aptos" panose="020B0004020202020204" pitchFamily="34" charset="0"/>
+                <a:ea typeface="Aptos" panose="020B0004020202020204" pitchFamily="34" charset="0"/>
+                <a:cs typeface="Times New Roman" panose="02020603050405020304" pitchFamily="18" charset="0"/>
+              </a:rPr>
+              <a:t> </a:t>
+            </a:r>
+            <a:r>
+              <a:rPr lang="en-US" sz="2000" kern="100" dirty="0">
+                <a:solidFill>
+                  <a:schemeClr val="tx1"/>
+                </a:solidFill>
+                <a:effectLst/>
+                <a:latin typeface="Aptos" panose="020B0004020202020204" pitchFamily="34" charset="0"/>
+                <a:ea typeface="Aptos" panose="020B0004020202020204" pitchFamily="34" charset="0"/>
+                <a:cs typeface="Times New Roman" panose="02020603050405020304" pitchFamily="18" charset="0"/>
+              </a:rPr>
+              <a:t>Users can review past data in a history view, with filters like “Today” or “Last 7 Days.” Bar graphs display daily min/max values to show trends without overwhelming detail—ideal for mobile screens.</a:t>
+            </a:r>
+          </a:p>
+          <a:p>
+            <a:pPr marL="342900" indent="-342900">
+              <a:lnSpc>
+                <a:spcPct val="115000"/>
+              </a:lnSpc>
+              <a:spcAft>
+                <a:spcPts val="800"/>
+              </a:spcAft>
+              <a:buFont typeface="Arial" panose="020B0604020202020204" pitchFamily="34" charset="0"/>
+              <a:buChar char="•"/>
+            </a:pPr>
+            <a:r>
+              <a:rPr lang="nl-BE" sz="2000" b="1" kern="100" dirty="0">
+                <a:solidFill>
+                  <a:srgbClr val="0070C0"/>
+                </a:solidFill>
+                <a:effectLst/>
+                <a:latin typeface="Aptos" panose="020B0004020202020204" pitchFamily="34" charset="0"/>
+                <a:ea typeface="Aptos" panose="020B0004020202020204" pitchFamily="34" charset="0"/>
+                <a:cs typeface="Times New Roman" panose="02020603050405020304" pitchFamily="18" charset="0"/>
+              </a:rPr>
+              <a:t>Info Panels:</a:t>
+            </a:r>
+            <a:r>
+              <a:rPr lang="nl-BE" sz="2000" kern="100" dirty="0">
+                <a:solidFill>
+                  <a:srgbClr val="0070C0"/>
+                </a:solidFill>
+                <a:effectLst/>
+                <a:latin typeface="Aptos" panose="020B0004020202020204" pitchFamily="34" charset="0"/>
+                <a:ea typeface="Aptos" panose="020B0004020202020204" pitchFamily="34" charset="0"/>
+                <a:cs typeface="Times New Roman" panose="02020603050405020304" pitchFamily="18" charset="0"/>
+              </a:rPr>
+              <a:t> </a:t>
+            </a:r>
+            <a:r>
+              <a:rPr lang="en-US" sz="2000" kern="100" dirty="0">
+                <a:solidFill>
+                  <a:schemeClr val="tx1"/>
+                </a:solidFill>
+                <a:effectLst/>
+                <a:latin typeface="Aptos" panose="020B0004020202020204" pitchFamily="34" charset="0"/>
+                <a:ea typeface="Aptos" panose="020B0004020202020204" pitchFamily="34" charset="0"/>
+                <a:cs typeface="Times New Roman" panose="02020603050405020304" pitchFamily="18" charset="0"/>
+              </a:rPr>
+              <a:t>Each health metric has an information button explaining what it measures, how it works, and why it matters. This improves understanding and builds trust in the system. As seen in figure X, it shows the zones and how this parameter is obtained.</a:t>
+            </a:r>
+            <a:endParaRPr lang="nl-BE" sz="2000" b="1" kern="100" dirty="0">
+              <a:solidFill>
+                <a:srgbClr val="FF0000"/>
+              </a:solidFill>
+              <a:effectLst/>
+              <a:latin typeface="Aptos" panose="020B0004020202020204" pitchFamily="34" charset="0"/>
+              <a:ea typeface="Aptos" panose="020B0004020202020204" pitchFamily="34" charset="0"/>
+              <a:cs typeface="Times New Roman" panose="02020603050405020304" pitchFamily="18" charset="0"/>
+            </a:endParaRPr>
+          </a:p>
+          <a:p>
+            <a:endParaRPr lang="nl-BE" sz="2000" b="1" dirty="0" err="1">
+              <a:solidFill>
+                <a:schemeClr val="tx1"/>
+              </a:solidFill>
+            </a:endParaRPr>
+          </a:p>
+        </p:txBody>
+      </p:sp>
+      <p:pic>
+        <p:nvPicPr>
+          <p:cNvPr id="25" name="Afbeelding 24" descr="Afbeelding met tekst, schermopname, nummer, Lettertype&#10;&#10;Door AI gegenereerde inhoud is mogelijk onjuist.">
+            <a:extLst>
+              <a:ext uri="{FF2B5EF4-FFF2-40B4-BE49-F238E27FC236}">
+                <a16:creationId xmlns:a16="http://schemas.microsoft.com/office/drawing/2014/main" id="{EA10747B-686C-2CC1-C8C3-6A6917344FEC}"/>
+              </a:ext>
+            </a:extLst>
+          </p:cNvPr>
+          <p:cNvPicPr>
+            <a:picLocks noChangeAspect="1"/>
+          </p:cNvPicPr>
+          <p:nvPr/>
+        </p:nvPicPr>
+        <p:blipFill>
+          <a:blip r:embed="rId4"/>
+          <a:stretch>
+            <a:fillRect/>
+          </a:stretch>
+        </p:blipFill>
+        <p:spPr>
+          <a:xfrm>
+            <a:off x="15182538" y="18366149"/>
+            <a:ext cx="2278904" cy="2732995"/>
+          </a:xfrm>
+          <a:prstGeom prst="rect">
+            <a:avLst/>
+          </a:prstGeom>
+        </p:spPr>
+      </p:pic>
+      <p:pic>
+        <p:nvPicPr>
+          <p:cNvPr id="27" name="Afbeelding 26" descr="Afbeelding met tekst, schermopname, Lettertype, nummer&#10;&#10;Door AI gegenereerde inhoud is mogelijk onjuist.">
+            <a:extLst>
+              <a:ext uri="{FF2B5EF4-FFF2-40B4-BE49-F238E27FC236}">
+                <a16:creationId xmlns:a16="http://schemas.microsoft.com/office/drawing/2014/main" id="{863A2172-FEC4-D2CC-8B8A-67E0119FB530}"/>
+              </a:ext>
+            </a:extLst>
+          </p:cNvPr>
+          <p:cNvPicPr>
+            <a:picLocks noChangeAspect="1"/>
+          </p:cNvPicPr>
+          <p:nvPr/>
+        </p:nvPicPr>
+        <p:blipFill>
+          <a:blip r:embed="rId5"/>
+          <a:stretch>
+            <a:fillRect/>
+          </a:stretch>
+        </p:blipFill>
+        <p:spPr>
+          <a:xfrm>
+            <a:off x="17721091" y="15137606"/>
+            <a:ext cx="2682134" cy="4978461"/>
+          </a:xfrm>
+          <a:prstGeom prst="rect">
+            <a:avLst/>
+          </a:prstGeom>
+        </p:spPr>
+      </p:pic>
+      <p:sp>
+        <p:nvSpPr>
+          <p:cNvPr id="29" name="Tekstvak 28">
+            <a:extLst>
+              <a:ext uri="{FF2B5EF4-FFF2-40B4-BE49-F238E27FC236}">
+                <a16:creationId xmlns:a16="http://schemas.microsoft.com/office/drawing/2014/main" id="{54AD8F71-7662-F096-8165-60B5E1DA3AB6}"/>
+              </a:ext>
+            </a:extLst>
+          </p:cNvPr>
+          <p:cNvSpPr txBox="1"/>
+          <p:nvPr/>
+        </p:nvSpPr>
+        <p:spPr>
+          <a:xfrm>
+            <a:off x="15266599" y="18046103"/>
+            <a:ext cx="2278904" cy="307777"/>
+          </a:xfrm>
+          <a:prstGeom prst="rect">
+            <a:avLst/>
+          </a:prstGeom>
+        </p:spPr>
+        <p:txBody>
+          <a:bodyPr vert="horz" wrap="square" rtlCol="0">
+            <a:spAutoFit/>
+          </a:bodyPr>
+          <a:lstStyle/>
+          <a:p>
+            <a:pPr algn="ctr"/>
+            <a:r>
+              <a:rPr lang="nl-BE" sz="1400" dirty="0" err="1">
+                <a:solidFill>
+                  <a:schemeClr val="tx1"/>
+                </a:solidFill>
+              </a:rPr>
+              <a:t>Figure</a:t>
+            </a:r>
+            <a:r>
+              <a:rPr lang="nl-BE" sz="1400" dirty="0">
+                <a:solidFill>
+                  <a:schemeClr val="tx1"/>
+                </a:solidFill>
+              </a:rPr>
+              <a:t> 1: </a:t>
+            </a:r>
+            <a:r>
+              <a:rPr lang="nl-BE" sz="1400" dirty="0" err="1">
+                <a:solidFill>
+                  <a:schemeClr val="tx1"/>
+                </a:solidFill>
+              </a:rPr>
+              <a:t>heart</a:t>
+            </a:r>
+            <a:r>
+              <a:rPr lang="nl-BE" sz="1400" dirty="0">
+                <a:solidFill>
+                  <a:schemeClr val="tx1"/>
+                </a:solidFill>
+              </a:rPr>
+              <a:t> </a:t>
+            </a:r>
+            <a:r>
+              <a:rPr lang="nl-BE" sz="1400" dirty="0" err="1">
+                <a:solidFill>
+                  <a:schemeClr val="tx1"/>
+                </a:solidFill>
+              </a:rPr>
+              <a:t>rate</a:t>
+            </a:r>
+            <a:r>
+              <a:rPr lang="nl-BE" sz="1400" dirty="0">
+                <a:solidFill>
+                  <a:schemeClr val="tx1"/>
+                </a:solidFill>
+              </a:rPr>
+              <a:t> widget</a:t>
+            </a:r>
+          </a:p>
+        </p:txBody>
+      </p:sp>
+      <p:sp>
+        <p:nvSpPr>
+          <p:cNvPr id="30" name="Tekstvak 29">
+            <a:extLst>
+              <a:ext uri="{FF2B5EF4-FFF2-40B4-BE49-F238E27FC236}">
+                <a16:creationId xmlns:a16="http://schemas.microsoft.com/office/drawing/2014/main" id="{EF5843CB-F7E6-74C1-883B-1BBB04CF368B}"/>
+              </a:ext>
+            </a:extLst>
+          </p:cNvPr>
+          <p:cNvSpPr txBox="1"/>
+          <p:nvPr/>
+        </p:nvSpPr>
+        <p:spPr>
+          <a:xfrm>
+            <a:off x="17721091" y="20157489"/>
+            <a:ext cx="2682134" cy="307777"/>
+          </a:xfrm>
+          <a:prstGeom prst="rect">
+            <a:avLst/>
+          </a:prstGeom>
+        </p:spPr>
+        <p:txBody>
+          <a:bodyPr vert="horz" wrap="square" rtlCol="0">
+            <a:spAutoFit/>
+          </a:bodyPr>
+          <a:lstStyle/>
+          <a:p>
+            <a:pPr algn="ctr"/>
+            <a:r>
+              <a:rPr lang="nl-BE" sz="1400" dirty="0" err="1">
+                <a:solidFill>
+                  <a:schemeClr val="tx1"/>
+                </a:solidFill>
+              </a:rPr>
+              <a:t>Figure</a:t>
+            </a:r>
+            <a:r>
+              <a:rPr lang="nl-BE" sz="1400" dirty="0">
+                <a:solidFill>
+                  <a:schemeClr val="tx1"/>
+                </a:solidFill>
+              </a:rPr>
+              <a:t> 2: info panel </a:t>
+            </a:r>
+            <a:r>
+              <a:rPr lang="nl-BE" sz="1400" dirty="0" err="1">
+                <a:solidFill>
+                  <a:schemeClr val="tx1"/>
+                </a:solidFill>
+              </a:rPr>
+              <a:t>dialog</a:t>
+            </a:r>
+            <a:endParaRPr lang="nl-BE" sz="1400" dirty="0">
+              <a:solidFill>
+                <a:schemeClr val="tx1"/>
+              </a:solidFill>
+            </a:endParaRPr>
+          </a:p>
+        </p:txBody>
+      </p:sp>
+      <p:sp>
+        <p:nvSpPr>
+          <p:cNvPr id="31" name="Tekstvak 30">
+            <a:extLst>
+              <a:ext uri="{FF2B5EF4-FFF2-40B4-BE49-F238E27FC236}">
+                <a16:creationId xmlns:a16="http://schemas.microsoft.com/office/drawing/2014/main" id="{A3E13F77-1361-E5C8-0B48-E170384CAAC0}"/>
+              </a:ext>
+            </a:extLst>
+          </p:cNvPr>
+          <p:cNvSpPr txBox="1"/>
+          <p:nvPr/>
+        </p:nvSpPr>
+        <p:spPr>
+          <a:xfrm>
+            <a:off x="15028537" y="21104601"/>
+            <a:ext cx="2577053" cy="523220"/>
+          </a:xfrm>
+          <a:prstGeom prst="rect">
+            <a:avLst/>
+          </a:prstGeom>
+        </p:spPr>
+        <p:txBody>
+          <a:bodyPr vert="horz" wrap="square" rtlCol="0">
+            <a:spAutoFit/>
+          </a:bodyPr>
+          <a:lstStyle/>
+          <a:p>
+            <a:pPr algn="ctr"/>
+            <a:r>
+              <a:rPr lang="nl-BE" sz="1400" dirty="0" err="1">
+                <a:solidFill>
+                  <a:schemeClr val="tx1"/>
+                </a:solidFill>
+              </a:rPr>
+              <a:t>Figure</a:t>
+            </a:r>
+            <a:r>
+              <a:rPr lang="nl-BE" sz="1400" dirty="0">
+                <a:solidFill>
+                  <a:schemeClr val="tx1"/>
+                </a:solidFill>
+              </a:rPr>
+              <a:t> 3: </a:t>
+            </a:r>
+            <a:r>
+              <a:rPr lang="nl-BE" sz="1400" dirty="0" err="1">
+                <a:solidFill>
+                  <a:schemeClr val="tx1"/>
+                </a:solidFill>
+              </a:rPr>
+              <a:t>heart</a:t>
+            </a:r>
+            <a:r>
+              <a:rPr lang="nl-BE" sz="1400" dirty="0">
+                <a:solidFill>
+                  <a:schemeClr val="tx1"/>
+                </a:solidFill>
+              </a:rPr>
+              <a:t> </a:t>
+            </a:r>
+            <a:r>
+              <a:rPr lang="nl-BE" sz="1400" dirty="0" err="1">
+                <a:solidFill>
+                  <a:schemeClr val="tx1"/>
+                </a:solidFill>
+              </a:rPr>
+              <a:t>rate</a:t>
+            </a:r>
+            <a:r>
+              <a:rPr lang="nl-BE" sz="1400" dirty="0" err="1"/>
+              <a:t>s</a:t>
+            </a:r>
+            <a:r>
+              <a:rPr lang="nl-BE" sz="1400" dirty="0"/>
+              <a:t> </a:t>
+            </a:r>
+            <a:r>
+              <a:rPr lang="nl-BE" sz="1400" dirty="0" err="1"/>
+              <a:t>history</a:t>
+            </a:r>
+            <a:r>
+              <a:rPr lang="nl-BE" sz="1400" dirty="0"/>
+              <a:t> page, </a:t>
+            </a:r>
+            <a:r>
+              <a:rPr lang="nl-BE" sz="1400" dirty="0" err="1"/>
+              <a:t>filtered</a:t>
+            </a:r>
+            <a:r>
+              <a:rPr lang="nl-BE" sz="1400" dirty="0"/>
+              <a:t> on “Last 30 </a:t>
+            </a:r>
+            <a:r>
+              <a:rPr lang="nl-BE" sz="1400" dirty="0" err="1"/>
+              <a:t>days</a:t>
+            </a:r>
+            <a:r>
+              <a:rPr lang="nl-BE" sz="1400" dirty="0"/>
+              <a:t>”</a:t>
+            </a:r>
+            <a:endParaRPr lang="nl-BE" sz="1400" dirty="0">
+              <a:solidFill>
+                <a:schemeClr val="tx1"/>
+              </a:solidFill>
             </a:endParaRPr>
           </a:p>
         </p:txBody>

</xml_diff>

<commit_message>
updated poster and article
</commit_message>
<xml_diff>
--- a/Verslagen/poster_BP_INF_Gielkens.pptx
+++ b/Verslagen/poster_BP_INF_Gielkens.pptx
@@ -2270,7 +2270,7 @@
                 <a:ea typeface="Aptos" panose="020B0004020202020204" pitchFamily="34" charset="0"/>
                 <a:cs typeface="Times New Roman" panose="02020603050405020304" pitchFamily="18" charset="0"/>
               </a:rPr>
-              <a:t>In today’s workplace, stress is one of the leading causes of discomfort and reduced productivity. This bachelor thesis presents a compact and portable system designed to monitor stress-related physiological parameters in real time, with the aim of improving workplace well-being.</a:t>
+              <a:t>In the modern workplace, employee wellness is becoming ever more acknowledged as a central element in both job satisfaction and productivity. Although commercial products such as smartwatches exist for health monitoring, such solutions tend to be costly, not broadly available, or closed systems with minimal transparency.</a:t>
             </a:r>
           </a:p>
           <a:p>
@@ -2291,7 +2291,7 @@
                 <a:ea typeface="Aptos" panose="020B0004020202020204" pitchFamily="34" charset="0"/>
                 <a:cs typeface="Times New Roman" panose="02020603050405020304" pitchFamily="18" charset="0"/>
               </a:rPr>
-              <a:t>At the core of the system is the </a:t>
+              <a:t>This project explores the development of an </a:t>
             </a:r>
             <a:r>
               <a:rPr lang="en-US" sz="1800" b="1" kern="100" dirty="0">
@@ -2302,7 +2302,7 @@
                 <a:ea typeface="Aptos" panose="020B0004020202020204" pitchFamily="34" charset="0"/>
                 <a:cs typeface="Times New Roman" panose="02020603050405020304" pitchFamily="18" charset="0"/>
               </a:rPr>
-              <a:t>Arduino Nano ESP32</a:t>
+              <a:t>inexpensive, portable system </a:t>
             </a:r>
             <a:r>
               <a:rPr lang="en-US" sz="1800" kern="100" dirty="0">
@@ -2313,7 +2313,7 @@
                 <a:ea typeface="Aptos" panose="020B0004020202020204" pitchFamily="34" charset="0"/>
                 <a:cs typeface="Times New Roman" panose="02020603050405020304" pitchFamily="18" charset="0"/>
               </a:rPr>
-              <a:t>, connected to a </a:t>
+              <a:t>for monitoring </a:t>
             </a:r>
             <a:r>
               <a:rPr lang="en-US" sz="1800" b="1" kern="100" dirty="0">
@@ -2324,7 +2324,7 @@
                 <a:ea typeface="Aptos" panose="020B0004020202020204" pitchFamily="34" charset="0"/>
                 <a:cs typeface="Times New Roman" panose="02020603050405020304" pitchFamily="18" charset="0"/>
               </a:rPr>
-              <a:t>MAX30102</a:t>
+              <a:t>stress-related physiological parameters </a:t>
             </a:r>
             <a:r>
               <a:rPr lang="en-US" sz="1800" kern="100" dirty="0">
@@ -2335,7 +2335,7 @@
                 <a:ea typeface="Aptos" panose="020B0004020202020204" pitchFamily="34" charset="0"/>
                 <a:cs typeface="Times New Roman" panose="02020603050405020304" pitchFamily="18" charset="0"/>
               </a:rPr>
-              <a:t>, a </a:t>
+              <a:t>in real time. Using the </a:t>
             </a:r>
             <a:r>
               <a:rPr lang="en-US" sz="1800" b="1" kern="100" dirty="0">
@@ -2346,7 +2346,7 @@
                 <a:ea typeface="Aptos" panose="020B0004020202020204" pitchFamily="34" charset="0"/>
                 <a:cs typeface="Times New Roman" panose="02020603050405020304" pitchFamily="18" charset="0"/>
               </a:rPr>
-              <a:t>Grove GSR </a:t>
+              <a:t>Arduino Nano ESP32 </a:t>
             </a:r>
             <a:r>
               <a:rPr lang="en-US" sz="1800" kern="100" dirty="0">
@@ -2357,10 +2357,10 @@
                 <a:ea typeface="Aptos" panose="020B0004020202020204" pitchFamily="34" charset="0"/>
                 <a:cs typeface="Times New Roman" panose="02020603050405020304" pitchFamily="18" charset="0"/>
               </a:rPr>
-              <a:t>and a </a:t>
-            </a:r>
-            <a:r>
-              <a:rPr lang="fr-FR" sz="1800" b="1" kern="100" dirty="0" err="1">
+              <a:t>microcontroller and a set of suitably selected sensors, the system records the vital measures of </a:t>
+            </a:r>
+            <a:r>
+              <a:rPr lang="en-US" sz="1800" b="1" kern="100" dirty="0">
                 <a:solidFill>
                   <a:srgbClr val="FF0000"/>
                 </a:solidFill>
@@ -2368,51 +2368,7 @@
                 <a:ea typeface="Aptos" panose="020B0004020202020204" pitchFamily="34" charset="0"/>
                 <a:cs typeface="Times New Roman" panose="02020603050405020304" pitchFamily="18" charset="0"/>
               </a:rPr>
-              <a:t>Plux</a:t>
-            </a:r>
-            <a:r>
-              <a:rPr lang="fr-FR" sz="1800" b="1" kern="100" dirty="0">
-                <a:solidFill>
-                  <a:srgbClr val="FF0000"/>
-                </a:solidFill>
-                <a:latin typeface="Aptos" panose="020B0004020202020204" pitchFamily="34" charset="0"/>
-                <a:ea typeface="Aptos" panose="020B0004020202020204" pitchFamily="34" charset="0"/>
-                <a:cs typeface="Times New Roman" panose="02020603050405020304" pitchFamily="18" charset="0"/>
-              </a:rPr>
-              <a:t> </a:t>
-            </a:r>
-            <a:r>
-              <a:rPr lang="fr-FR" sz="1800" b="1" kern="100" dirty="0" err="1">
-                <a:solidFill>
-                  <a:srgbClr val="FF0000"/>
-                </a:solidFill>
-                <a:latin typeface="Aptos" panose="020B0004020202020204" pitchFamily="34" charset="0"/>
-                <a:ea typeface="Aptos" panose="020B0004020202020204" pitchFamily="34" charset="0"/>
-                <a:cs typeface="Times New Roman" panose="02020603050405020304" pitchFamily="18" charset="0"/>
-              </a:rPr>
-              <a:t>Piezo-Electric</a:t>
-            </a:r>
-            <a:r>
-              <a:rPr lang="fr-FR" sz="1800" b="1" kern="100" dirty="0">
-                <a:solidFill>
-                  <a:srgbClr val="FF0000"/>
-                </a:solidFill>
-                <a:latin typeface="Aptos" panose="020B0004020202020204" pitchFamily="34" charset="0"/>
-                <a:ea typeface="Aptos" panose="020B0004020202020204" pitchFamily="34" charset="0"/>
-                <a:cs typeface="Times New Roman" panose="02020603050405020304" pitchFamily="18" charset="0"/>
-              </a:rPr>
-              <a:t> Respiration (PZT) </a:t>
-            </a:r>
-            <a:r>
-              <a:rPr lang="fr-FR" sz="1800" b="1" kern="100" dirty="0" err="1">
-                <a:solidFill>
-                  <a:srgbClr val="FF0000"/>
-                </a:solidFill>
-                <a:latin typeface="Aptos" panose="020B0004020202020204" pitchFamily="34" charset="0"/>
-                <a:ea typeface="Aptos" panose="020B0004020202020204" pitchFamily="34" charset="0"/>
-                <a:cs typeface="Times New Roman" panose="02020603050405020304" pitchFamily="18" charset="0"/>
-              </a:rPr>
-              <a:t>sensor</a:t>
+              <a:t>heart rate, skin conductance (GSR), and respiration rate</a:t>
             </a:r>
             <a:r>
               <a:rPr lang="en-US" sz="1800" kern="100" dirty="0">
@@ -2423,51 +2379,7 @@
                 <a:ea typeface="Aptos" panose="020B0004020202020204" pitchFamily="34" charset="0"/>
                 <a:cs typeface="Times New Roman" panose="02020603050405020304" pitchFamily="18" charset="0"/>
               </a:rPr>
-              <a:t>. These sensors capture biometric data known to correlate with stress levels. The device transmits this data wirelessly via Bluetooth to a custom-built </a:t>
-            </a:r>
-            <a:r>
-              <a:rPr lang="en-US" sz="1800" b="1" kern="100" dirty="0">
-                <a:solidFill>
-                  <a:srgbClr val="FF0000"/>
-                </a:solidFill>
-                <a:latin typeface="Aptos" panose="020B0004020202020204" pitchFamily="34" charset="0"/>
-                <a:ea typeface="Aptos" panose="020B0004020202020204" pitchFamily="34" charset="0"/>
-                <a:cs typeface="Times New Roman" panose="02020603050405020304" pitchFamily="18" charset="0"/>
-              </a:rPr>
-              <a:t>mobile application</a:t>
-            </a:r>
-            <a:r>
-              <a:rPr lang="en-US" sz="1800" kern="100" dirty="0">
-                <a:solidFill>
-                  <a:schemeClr val="tx1"/>
-                </a:solidFill>
-                <a:latin typeface="Aptos" panose="020B0004020202020204" pitchFamily="34" charset="0"/>
-                <a:ea typeface="Aptos" panose="020B0004020202020204" pitchFamily="34" charset="0"/>
-                <a:cs typeface="Times New Roman" panose="02020603050405020304" pitchFamily="18" charset="0"/>
-              </a:rPr>
-              <a:t>. The accompanying application provides real-time feedback and historical tracking through intuitive visualizations, making the data easy to understand, even for non-technical users. Users can view their current </a:t>
-            </a:r>
-            <a:r>
-              <a:rPr lang="en-US" sz="1800" b="1" kern="100" dirty="0">
-                <a:solidFill>
-                  <a:srgbClr val="FF0000"/>
-                </a:solidFill>
-                <a:latin typeface="Aptos" panose="020B0004020202020204" pitchFamily="34" charset="0"/>
-                <a:ea typeface="Aptos" panose="020B0004020202020204" pitchFamily="34" charset="0"/>
-                <a:cs typeface="Times New Roman" panose="02020603050405020304" pitchFamily="18" charset="0"/>
-              </a:rPr>
-              <a:t>heart rate, SpO₂, skin conductance, and respiration rate,</a:t>
-            </a:r>
-            <a:r>
-              <a:rPr lang="en-US" sz="1800" kern="100" dirty="0">
-                <a:solidFill>
-                  <a:schemeClr val="tx1"/>
-                </a:solidFill>
-                <a:latin typeface="Aptos" panose="020B0004020202020204" pitchFamily="34" charset="0"/>
-                <a:ea typeface="Aptos" panose="020B0004020202020204" pitchFamily="34" charset="0"/>
-                <a:cs typeface="Times New Roman" panose="02020603050405020304" pitchFamily="18" charset="0"/>
-              </a:rPr>
-              <a:t> while the app estimates stress levels based on individual baseline values.</a:t>
+              <a:t>. These are transmitted wirelessly via Bluetooth to a mobile app specially designed for this purpose.</a:t>
             </a:r>
           </a:p>
           <a:p>
@@ -2488,7 +2400,7 @@
                 <a:ea typeface="Aptos" panose="020B0004020202020204" pitchFamily="34" charset="0"/>
                 <a:cs typeface="Times New Roman" panose="02020603050405020304" pitchFamily="18" charset="0"/>
               </a:rPr>
-              <a:t>This system was developed to be </a:t>
+              <a:t>The application is </a:t>
             </a:r>
             <a:r>
               <a:rPr lang="en-US" sz="1800" b="1" kern="100" dirty="0">
@@ -2499,7 +2411,7 @@
                 <a:ea typeface="Aptos" panose="020B0004020202020204" pitchFamily="34" charset="0"/>
                 <a:cs typeface="Times New Roman" panose="02020603050405020304" pitchFamily="18" charset="0"/>
               </a:rPr>
-              <a:t>affordable, user-friendly, and scalable</a:t>
+              <a:t>user-friendly and accessible</a:t>
             </a:r>
             <a:r>
               <a:rPr lang="en-US" sz="1800" kern="100" dirty="0">
@@ -2510,7 +2422,7 @@
                 <a:ea typeface="Aptos" panose="020B0004020202020204" pitchFamily="34" charset="0"/>
                 <a:cs typeface="Times New Roman" panose="02020603050405020304" pitchFamily="18" charset="0"/>
               </a:rPr>
-              <a:t>, making it suitable for shared use in workplace environments. The goal is to empower both individuals and organizations with actionable insights into stress, supporting healthier, more productive work settings.</a:t>
+              <a:t>, offering clear visual feedback, an estimation of the stress level, and the possibility to observe trends over time. By making health information easier to interpret and utilize, this system enables both individual users and organizations to more effectively monitor their health in an informed and cost-effective manner. The objective is to create a healthier and more sustainable work environment by introducing effective, data-driven stress management tools.</a:t>
             </a:r>
             <a:endParaRPr lang="nl-BE" sz="1800" kern="100" dirty="0">
               <a:solidFill>
@@ -3842,301 +3754,6 @@
           </a:p>
         </p:txBody>
       </p:sp>
-      <p:sp>
-        <p:nvSpPr>
-          <p:cNvPr id="28" name="Tekstvak 27">
-            <a:extLst>
-              <a:ext uri="{FF2B5EF4-FFF2-40B4-BE49-F238E27FC236}">
-                <a16:creationId xmlns:a16="http://schemas.microsoft.com/office/drawing/2014/main" id="{3C660D55-3E53-BCA6-0588-E5B67D61960F}"/>
-              </a:ext>
-            </a:extLst>
-          </p:cNvPr>
-          <p:cNvSpPr txBox="1"/>
-          <p:nvPr/>
-        </p:nvSpPr>
-        <p:spPr>
-          <a:xfrm>
-            <a:off x="10866120" y="27273546"/>
-            <a:ext cx="10283247" cy="1538883"/>
-          </a:xfrm>
-          <a:prstGeom prst="rect">
-            <a:avLst/>
-          </a:prstGeom>
-        </p:spPr>
-        <p:txBody>
-          <a:bodyPr vert="horz" wrap="square" rtlCol="0">
-            <a:spAutoFit/>
-          </a:bodyPr>
-          <a:lstStyle/>
-          <a:p>
-            <a:pPr marR="457200" algn="l"/>
-            <a:r>
-              <a:rPr lang="en-US" sz="1300" b="0" i="0" dirty="0">
-                <a:effectLst/>
-                <a:latin typeface="+mj-lt"/>
-              </a:rPr>
-              <a:t>[1] “Building information modeling,” Autodesk. Available at: https://www.autodesk.com/solutions/aec/bim (Accessed: 12 August 2024). </a:t>
-            </a:r>
-          </a:p>
-          <a:p>
-            <a:pPr marR="457200" algn="l"/>
-            <a:r>
-              <a:rPr lang="en-US" sz="1300" b="0" i="0" dirty="0">
-                <a:effectLst/>
-                <a:latin typeface="+mj-lt"/>
-              </a:rPr>
-              <a:t>[2] “Industry Foundation Classes (IFC),” </a:t>
-            </a:r>
-            <a:r>
-              <a:rPr lang="en-US" sz="1300" b="0" i="0" dirty="0" err="1">
-                <a:effectLst/>
-                <a:latin typeface="+mj-lt"/>
-              </a:rPr>
-              <a:t>buildingSMART</a:t>
-            </a:r>
-            <a:r>
-              <a:rPr lang="en-US" sz="1300" b="0" i="0" dirty="0">
-                <a:effectLst/>
-                <a:latin typeface="+mj-lt"/>
-              </a:rPr>
-              <a:t> International. Available at: https://www.buildingsmart.org/standards/bsi-standards/industry-foundation-classes/ (Accessed: 12 August 2024).</a:t>
-            </a:r>
-          </a:p>
-          <a:p>
-            <a:pPr marR="457200"/>
-            <a:r>
-              <a:rPr lang="nl-BE" sz="1300" dirty="0">
-                <a:latin typeface="+mj-lt"/>
-              </a:rPr>
-              <a:t>[3] </a:t>
-            </a:r>
-            <a:r>
-              <a:rPr lang="nl-BE" sz="1300" dirty="0" err="1">
-                <a:latin typeface="+mj-lt"/>
-              </a:rPr>
-              <a:t>Gutierrez</a:t>
-            </a:r>
-            <a:r>
-              <a:rPr lang="nl-BE" sz="1300" dirty="0">
-                <a:latin typeface="+mj-lt"/>
-              </a:rPr>
-              <a:t> Lopez, M., </a:t>
-            </a:r>
-            <a:r>
-              <a:rPr lang="nl-BE" sz="1300" dirty="0" err="1">
-                <a:latin typeface="+mj-lt"/>
-              </a:rPr>
-              <a:t>Rovelo</a:t>
-            </a:r>
-            <a:r>
-              <a:rPr lang="nl-BE" sz="1300" dirty="0">
-                <a:latin typeface="+mj-lt"/>
-              </a:rPr>
-              <a:t>, G., </a:t>
-            </a:r>
-            <a:r>
-              <a:rPr lang="nl-BE" sz="1300" dirty="0" err="1">
-                <a:latin typeface="+mj-lt"/>
-              </a:rPr>
-              <a:t>Haesen</a:t>
-            </a:r>
-            <a:r>
-              <a:rPr lang="nl-BE" sz="1300" dirty="0">
-                <a:latin typeface="+mj-lt"/>
-              </a:rPr>
-              <a:t>, M., Luyten, K., </a:t>
-            </a:r>
-            <a:r>
-              <a:rPr lang="nl-BE" sz="1300" dirty="0" err="1">
-                <a:latin typeface="+mj-lt"/>
-              </a:rPr>
-              <a:t>Coninx</a:t>
-            </a:r>
-            <a:r>
-              <a:rPr lang="nl-BE" sz="1300" dirty="0">
-                <a:latin typeface="+mj-lt"/>
-              </a:rPr>
-              <a:t>, K. (2017). </a:t>
-            </a:r>
-            <a:r>
-              <a:rPr lang="nl-BE" sz="1300" dirty="0" err="1">
-                <a:latin typeface="+mj-lt"/>
-              </a:rPr>
-              <a:t>Capturing</a:t>
-            </a:r>
-            <a:r>
-              <a:rPr lang="nl-BE" sz="1300" dirty="0">
-                <a:latin typeface="+mj-lt"/>
-              </a:rPr>
-              <a:t> Design </a:t>
-            </a:r>
-            <a:r>
-              <a:rPr lang="nl-BE" sz="1300" dirty="0" err="1">
-                <a:latin typeface="+mj-lt"/>
-              </a:rPr>
-              <a:t>Decision</a:t>
-            </a:r>
-            <a:r>
-              <a:rPr lang="nl-BE" sz="1300" dirty="0">
-                <a:latin typeface="+mj-lt"/>
-              </a:rPr>
-              <a:t> Rationale </a:t>
-            </a:r>
-            <a:r>
-              <a:rPr lang="nl-BE" sz="1300" dirty="0" err="1">
-                <a:latin typeface="+mj-lt"/>
-              </a:rPr>
-              <a:t>with</a:t>
-            </a:r>
-            <a:r>
-              <a:rPr lang="nl-BE" sz="1300" dirty="0">
-                <a:latin typeface="+mj-lt"/>
-              </a:rPr>
-              <a:t> </a:t>
-            </a:r>
-            <a:r>
-              <a:rPr lang="nl-BE" sz="1300" dirty="0" err="1">
-                <a:latin typeface="+mj-lt"/>
-              </a:rPr>
-              <a:t>Decision</a:t>
-            </a:r>
-            <a:r>
-              <a:rPr lang="nl-BE" sz="1300" dirty="0">
-                <a:latin typeface="+mj-lt"/>
-              </a:rPr>
-              <a:t> Cards. In: </a:t>
-            </a:r>
-            <a:r>
-              <a:rPr lang="nl-BE" sz="1300" dirty="0" err="1">
-                <a:latin typeface="+mj-lt"/>
-              </a:rPr>
-              <a:t>Bernhaupt</a:t>
-            </a:r>
-            <a:r>
-              <a:rPr lang="nl-BE" sz="1300" dirty="0">
-                <a:latin typeface="+mj-lt"/>
-              </a:rPr>
-              <a:t>, R., </a:t>
-            </a:r>
-            <a:r>
-              <a:rPr lang="nl-BE" sz="1300" dirty="0" err="1">
-                <a:latin typeface="+mj-lt"/>
-              </a:rPr>
-              <a:t>Dalvi</a:t>
-            </a:r>
-            <a:r>
-              <a:rPr lang="nl-BE" sz="1300" dirty="0">
-                <a:latin typeface="+mj-lt"/>
-              </a:rPr>
-              <a:t>, G., </a:t>
-            </a:r>
-            <a:r>
-              <a:rPr lang="nl-BE" sz="1300" dirty="0" err="1">
-                <a:latin typeface="+mj-lt"/>
-              </a:rPr>
-              <a:t>Joshi</a:t>
-            </a:r>
-            <a:r>
-              <a:rPr lang="nl-BE" sz="1300" dirty="0">
-                <a:latin typeface="+mj-lt"/>
-              </a:rPr>
-              <a:t>, A., K. </a:t>
-            </a:r>
-            <a:r>
-              <a:rPr lang="nl-BE" sz="1300" dirty="0" err="1">
-                <a:latin typeface="+mj-lt"/>
-              </a:rPr>
-              <a:t>Balkrishan</a:t>
-            </a:r>
-            <a:r>
-              <a:rPr lang="nl-BE" sz="1300" dirty="0">
-                <a:latin typeface="+mj-lt"/>
-              </a:rPr>
-              <a:t>, D., O'Neill, J., Winckler, M. (</a:t>
-            </a:r>
-            <a:r>
-              <a:rPr lang="nl-BE" sz="1300" dirty="0" err="1">
-                <a:latin typeface="+mj-lt"/>
-              </a:rPr>
-              <a:t>eds</a:t>
-            </a:r>
-            <a:r>
-              <a:rPr lang="nl-BE" sz="1300" dirty="0">
-                <a:latin typeface="+mj-lt"/>
-              </a:rPr>
-              <a:t>) Human-Computer </a:t>
-            </a:r>
-            <a:r>
-              <a:rPr lang="nl-BE" sz="1300" dirty="0" err="1">
-                <a:latin typeface="+mj-lt"/>
-              </a:rPr>
-              <a:t>Interaction</a:t>
-            </a:r>
-            <a:r>
-              <a:rPr lang="nl-BE" sz="1300" dirty="0">
-                <a:latin typeface="+mj-lt"/>
-              </a:rPr>
-              <a:t> - INTERACT 2017. INTERACT 2017. </a:t>
-            </a:r>
-            <a:r>
-              <a:rPr lang="nl-BE" sz="1300" dirty="0" err="1">
-                <a:latin typeface="+mj-lt"/>
-              </a:rPr>
-              <a:t>Lecture</a:t>
-            </a:r>
-            <a:r>
-              <a:rPr lang="nl-BE" sz="1300" dirty="0">
-                <a:latin typeface="+mj-lt"/>
-              </a:rPr>
-              <a:t> </a:t>
-            </a:r>
-            <a:r>
-              <a:rPr lang="nl-BE" sz="1300" dirty="0" err="1">
-                <a:latin typeface="+mj-lt"/>
-              </a:rPr>
-              <a:t>Notes</a:t>
-            </a:r>
-            <a:r>
-              <a:rPr lang="nl-BE" sz="1300" dirty="0">
-                <a:latin typeface="+mj-lt"/>
-              </a:rPr>
-              <a:t> in Computer </a:t>
-            </a:r>
-            <a:r>
-              <a:rPr lang="nl-BE" sz="1300" dirty="0" err="1">
-                <a:latin typeface="+mj-lt"/>
-              </a:rPr>
-              <a:t>Science</a:t>
-            </a:r>
-            <a:r>
-              <a:rPr lang="nl-BE" sz="1300" dirty="0">
-                <a:latin typeface="+mj-lt"/>
-              </a:rPr>
-              <a:t>(), vol 10513. Springer, </a:t>
-            </a:r>
-            <a:r>
-              <a:rPr lang="pt-BR" sz="1300" dirty="0">
-                <a:latin typeface="+mj-lt"/>
-              </a:rPr>
-              <a:t>Cham. https://doi.org/10.1007/978-3-319-67744-6_29</a:t>
-            </a:r>
-            <a:endParaRPr lang="en-US" sz="1300" b="0" i="0" dirty="0">
-              <a:effectLst/>
-              <a:latin typeface="+mj-lt"/>
-            </a:endParaRPr>
-          </a:p>
-          <a:p>
-            <a:pPr marR="457200"/>
-            <a:endParaRPr lang="en-US" sz="1600" b="0" i="0" dirty="0">
-              <a:solidFill>
-                <a:srgbClr val="2C3E50"/>
-              </a:solidFill>
-              <a:effectLst/>
-              <a:latin typeface="Calibri" panose="020F0502020204030204" pitchFamily="34" charset="0"/>
-            </a:endParaRPr>
-          </a:p>
-        </p:txBody>
-      </p:sp>
       <p:pic>
         <p:nvPicPr>
           <p:cNvPr id="15" name="Afbeelding 14" descr="Afbeelding met tekst, schermopname, Lettertype, nummer&#10;&#10;Door AI gegenereerde inhoud is mogelijk onjuist.">
@@ -4159,7 +3776,7 @@
         </p:blipFill>
         <p:spPr>
           <a:xfrm>
-            <a:off x="15266598" y="14102570"/>
+            <a:off x="15266598" y="14150695"/>
             <a:ext cx="2278904" cy="3963332"/>
           </a:xfrm>
           <a:prstGeom prst="rect">
@@ -4467,7 +4084,7 @@
                 <a:ea typeface="Aptos" panose="020B0004020202020204" pitchFamily="34" charset="0"/>
                 <a:cs typeface="Times New Roman" panose="02020603050405020304" pitchFamily="18" charset="0"/>
               </a:rPr>
-              <a:t>e X show an example for the heart rate gauge.</a:t>
+              <a:t>e 1 shows an example of the heart rate gauge.</a:t>
             </a:r>
             <a:endParaRPr lang="en-US" sz="2000" kern="100" dirty="0">
               <a:solidFill>
@@ -4596,7 +4213,27 @@
                 <a:ea typeface="Aptos" panose="020B0004020202020204" pitchFamily="34" charset="0"/>
                 <a:cs typeface="Times New Roman" panose="02020603050405020304" pitchFamily="18" charset="0"/>
               </a:rPr>
-              <a:t>Users can review past data in a history view, with filters like “Today” or “Last 7 Days.” Bar graphs display daily min/max values to show trends without overwhelming detail—ideal for mobile screens.</a:t>
+              <a:t>Users can review past data in a history view, with filters like “Today” or “Last 7 Days.” As shown in figure 2, </a:t>
+            </a:r>
+            <a:r>
+              <a:rPr lang="en-US" sz="2000" kern="100" dirty="0">
+                <a:latin typeface="Aptos" panose="020B0004020202020204" pitchFamily="34" charset="0"/>
+                <a:ea typeface="Aptos" panose="020B0004020202020204" pitchFamily="34" charset="0"/>
+                <a:cs typeface="Times New Roman" panose="02020603050405020304" pitchFamily="18" charset="0"/>
+              </a:rPr>
+              <a:t>b</a:t>
+            </a:r>
+            <a:r>
+              <a:rPr lang="en-US" sz="2000" kern="100" dirty="0">
+                <a:solidFill>
+                  <a:schemeClr val="tx1"/>
+                </a:solidFill>
+                <a:effectLst/>
+                <a:latin typeface="Aptos" panose="020B0004020202020204" pitchFamily="34" charset="0"/>
+                <a:ea typeface="Aptos" panose="020B0004020202020204" pitchFamily="34" charset="0"/>
+                <a:cs typeface="Times New Roman" panose="02020603050405020304" pitchFamily="18" charset="0"/>
+              </a:rPr>
+              <a:t>ar graphs display daily min/max values to show trends without overwhelming detail, ideal for mobile screens. </a:t>
             </a:r>
           </a:p>
           <a:p>
@@ -4644,7 +4281,7 @@
                 <a:ea typeface="Aptos" panose="020B0004020202020204" pitchFamily="34" charset="0"/>
                 <a:cs typeface="Times New Roman" panose="02020603050405020304" pitchFamily="18" charset="0"/>
               </a:rPr>
-              <a:t>Each health metric has an information button explaining what it measures, how it works, and why it matters. This improves understanding and builds trust in the system. As seen in figure X, it shows the zones and how this parameter is obtained.</a:t>
+              <a:t>Each health metric has an information button explaining what it measures, how it works, and why it matters. This improves understanding and builds trust in the system. As seen in figure 3, it shows the zones and how this parameter is obtained.</a:t>
             </a:r>
             <a:endParaRPr lang="nl-BE" sz="2000" b="1" kern="100" dirty="0">
               <a:solidFill>
@@ -4687,7 +4324,7 @@
         </p:blipFill>
         <p:spPr>
           <a:xfrm>
-            <a:off x="15182538" y="18366149"/>
+            <a:off x="15290488" y="18462399"/>
             <a:ext cx="2278904" cy="2732995"/>
           </a:xfrm>
           <a:prstGeom prst="rect">
@@ -4739,7 +4376,7 @@
         </p:nvSpPr>
         <p:spPr>
           <a:xfrm>
-            <a:off x="15266599" y="18046103"/>
+            <a:off x="15266599" y="18084603"/>
             <a:ext cx="2278904" cy="307777"/>
           </a:xfrm>
           <a:prstGeom prst="rect">
@@ -4846,7 +4483,7 @@
                   <a:schemeClr val="tx1"/>
                 </a:solidFill>
               </a:rPr>
-              <a:t> 2: info panel </a:t>
+              <a:t> 3: info panel </a:t>
             </a:r>
             <a:r>
               <a:rPr lang="nl-BE" sz="1400" dirty="0" err="1">
@@ -4878,7 +4515,7 @@
         </p:nvSpPr>
         <p:spPr>
           <a:xfrm>
-            <a:off x="15028537" y="21104601"/>
+            <a:off x="15136487" y="21162351"/>
             <a:ext cx="2577053" cy="523220"/>
           </a:xfrm>
           <a:prstGeom prst="rect">
@@ -4906,7 +4543,7 @@
                   <a:schemeClr val="tx1"/>
                 </a:solidFill>
               </a:rPr>
-              <a:t> 3: </a:t>
+              <a:t> 2: </a:t>
             </a:r>
             <a:r>
               <a:rPr lang="nl-BE" sz="1400" dirty="0" err="1">

</xml_diff>

<commit_message>
further updates to paper
</commit_message>
<xml_diff>
--- a/Verslagen/poster_BP_INF_Gielkens.pptx
+++ b/Verslagen/poster_BP_INF_Gielkens.pptx
@@ -230,7 +230,7 @@
           <a:p>
             <a:fld id="{A5A46936-730D-204E-AB52-3BEB64B90A85}" type="datetimeFigureOut">
               <a:rPr lang="nl-NL" smtClean="0"/>
-              <a:t>12-5-2025</a:t>
+              <a:t>15-5-2025</a:t>
             </a:fld>
             <a:endParaRPr lang="nl-NL"/>
           </a:p>
@@ -395,7 +395,7 @@
           <a:p>
             <a:fld id="{97349249-6D1C-0748-B1D9-2AF3A057365D}" type="datetimeFigureOut">
               <a:rPr lang="nl-NL" smtClean="0"/>
-              <a:t>12-5-2025</a:t>
+              <a:t>15-5-2025</a:t>
             </a:fld>
             <a:endParaRPr lang="nl-NL"/>
           </a:p>
@@ -1585,7 +1585,7 @@
           <a:p>
             <a:fld id="{A72B7129-FE34-674B-A2EC-97FC337DE4A7}" type="datetimeFigureOut">
               <a:rPr lang="nl-NL" smtClean="0"/>
-              <a:t>12-5-2025</a:t>
+              <a:t>15-5-2025</a:t>
             </a:fld>
             <a:endParaRPr lang="nl-NL"/>
           </a:p>
@@ -2270,7 +2270,7 @@
                 <a:ea typeface="Aptos" panose="020B0004020202020204" pitchFamily="34" charset="0"/>
                 <a:cs typeface="Times New Roman" panose="02020603050405020304" pitchFamily="18" charset="0"/>
               </a:rPr>
-              <a:t>In the modern workplace, employee wellness is becoming ever more acknowledged as a central element in both job satisfaction and productivity. Although commercial products such as smartwatches exist for health monitoring, such solutions tend to be costly, not broadly available, or closed systems with minimal transparency.</a:t>
+              <a:t>In the modern workplace, employee well-being is becoming ever more acknowledged as a central element in both job satisfaction and productivity. Although commercial products such as smartwatches exist for health monitoring, such solutions tend to be costly, not broadly available, or closed systems with minimal transparency.</a:t>
             </a:r>
           </a:p>
           <a:p>
@@ -2489,7 +2489,7 @@
           <a:p>
             <a:r>
               <a:rPr lang="en-US" dirty="0"/>
-              <a:t>Tool for measuring welfare parameters</a:t>
+              <a:t>Designing a tool for measuring welfare parameters</a:t>
             </a:r>
             <a:endParaRPr lang="nl-BE" dirty="0"/>
           </a:p>
@@ -2640,7 +2640,7 @@
                 <a:ea typeface="Verdana" panose="020B0604030504040204" pitchFamily="34" charset="0"/>
                 <a:cs typeface="Verdana" panose="020B0604030504040204" pitchFamily="34" charset="0"/>
               </a:rPr>
-              <a:t>2023-2024</a:t>
+              <a:t>2024-2025</a:t>
             </a:r>
           </a:p>
         </p:txBody>
@@ -4165,7 +4165,7 @@
                 <a:ea typeface="Aptos" panose="020B0004020202020204" pitchFamily="34" charset="0"/>
                 <a:cs typeface="Times New Roman" panose="02020603050405020304" pitchFamily="18" charset="0"/>
               </a:rPr>
-              <a:t>A color-coded stress indicator combines respiration and GSR data. Although exact thresholds aren't the focus, this simplified system by using dummy thresholds allows the interface's usability to be tested and refined.</a:t>
+              <a:t>A color-coded stress indicator combines respiration and GSR data. Although exact thresholds are not the focus, this simplified system by using dummy thresholds allows the interface's usability to be tested and refined.</a:t>
             </a:r>
           </a:p>
           <a:p>
@@ -4407,12 +4407,16 @@
               <a:t> 1: </a:t>
             </a:r>
             <a:r>
+              <a:rPr lang="nl-BE" sz="1400" dirty="0" err="1"/>
+              <a:t>H</a:t>
+            </a:r>
+            <a:r>
               <a:rPr lang="nl-BE" sz="1400" dirty="0" err="1">
                 <a:solidFill>
                   <a:schemeClr val="tx1"/>
                 </a:solidFill>
               </a:rPr>
-              <a:t>heart</a:t>
+              <a:t>eart</a:t>
             </a:r>
             <a:r>
               <a:rPr lang="nl-BE" sz="1400" dirty="0">
@@ -4483,7 +4487,19 @@
                   <a:schemeClr val="tx1"/>
                 </a:solidFill>
               </a:rPr>
-              <a:t> 3: info panel </a:t>
+              <a:t> 3: </a:t>
+            </a:r>
+            <a:r>
+              <a:rPr lang="nl-BE" sz="1400" dirty="0"/>
+              <a:t>I</a:t>
+            </a:r>
+            <a:r>
+              <a:rPr lang="nl-BE" sz="1400" dirty="0">
+                <a:solidFill>
+                  <a:schemeClr val="tx1"/>
+                </a:solidFill>
+              </a:rPr>
+              <a:t>nfo panel </a:t>
             </a:r>
             <a:r>
               <a:rPr lang="nl-BE" sz="1400" dirty="0" err="1">
@@ -4546,12 +4562,16 @@
               <a:t> 2: </a:t>
             </a:r>
             <a:r>
+              <a:rPr lang="nl-BE" sz="1400" dirty="0" err="1"/>
+              <a:t>H</a:t>
+            </a:r>
+            <a:r>
               <a:rPr lang="nl-BE" sz="1400" dirty="0" err="1">
                 <a:solidFill>
                   <a:schemeClr val="tx1"/>
                 </a:solidFill>
               </a:rPr>
-              <a:t>heart</a:t>
+              <a:t>eart</a:t>
             </a:r>
             <a:r>
               <a:rPr lang="nl-BE" sz="1400" dirty="0">
@@ -4609,6 +4629,36 @@
           </a:p>
         </p:txBody>
       </p:sp>
+      <p:pic>
+        <p:nvPicPr>
+          <p:cNvPr id="12" name="Afbeelding 11">
+            <a:extLst>
+              <a:ext uri="{FF2B5EF4-FFF2-40B4-BE49-F238E27FC236}">
+                <a16:creationId xmlns:a16="http://schemas.microsoft.com/office/drawing/2014/main" id="{8FF549AF-B507-2380-69F8-4DB8BE82E0F1}"/>
+              </a:ext>
+            </a:extLst>
+          </p:cNvPr>
+          <p:cNvPicPr>
+            <a:picLocks noChangeAspect="1"/>
+          </p:cNvPicPr>
+          <p:nvPr/>
+        </p:nvPicPr>
+        <p:blipFill>
+          <a:blip r:embed="rId6"/>
+          <a:stretch>
+            <a:fillRect/>
+          </a:stretch>
+        </p:blipFill>
+        <p:spPr>
+          <a:xfrm>
+            <a:off x="646162" y="544047"/>
+            <a:ext cx="14744638" cy="744086"/>
+          </a:xfrm>
+          <a:prstGeom prst="rect">
+            <a:avLst/>
+          </a:prstGeom>
+        </p:spPr>
+      </p:pic>
     </p:spTree>
     <p:extLst>
       <p:ext uri="{BB962C8B-B14F-4D97-AF65-F5344CB8AC3E}">

</xml_diff>